<commit_message>
Ticket #20 : Support discretionary element in case
</commit_message>
<xml_diff>
--- a/Architecture.pptx
+++ b/Architecture.pptx
@@ -7,6 +7,8 @@
   <p:sldIdLst>
     <p:sldId id="256" r:id="rId2"/>
     <p:sldId id="257" r:id="rId3"/>
+    <p:sldId id="259" r:id="rId4"/>
+    <p:sldId id="258" r:id="rId5"/>
   </p:sldIdLst>
   <p:sldSz cx="12192000" cy="6858000"/>
   <p:notesSz cx="6858000" cy="9144000"/>
@@ -242,7 +244,7 @@
           <a:p>
             <a:fld id="{B2814555-0B78-4B78-BD0A-6F287A823B12}" type="datetimeFigureOut">
               <a:rPr lang="en-US" smtClean="0"/>
-              <a:t>1/24/2020</a:t>
+              <a:t>1/28/2020</a:t>
             </a:fld>
             <a:endParaRPr lang="en-US"/>
           </a:p>
@@ -410,7 +412,7 @@
           <a:p>
             <a:fld id="{B2814555-0B78-4B78-BD0A-6F287A823B12}" type="datetimeFigureOut">
               <a:rPr lang="en-US" smtClean="0"/>
-              <a:t>1/24/2020</a:t>
+              <a:t>1/28/2020</a:t>
             </a:fld>
             <a:endParaRPr lang="en-US"/>
           </a:p>
@@ -588,7 +590,7 @@
           <a:p>
             <a:fld id="{B2814555-0B78-4B78-BD0A-6F287A823B12}" type="datetimeFigureOut">
               <a:rPr lang="en-US" smtClean="0"/>
-              <a:t>1/24/2020</a:t>
+              <a:t>1/28/2020</a:t>
             </a:fld>
             <a:endParaRPr lang="en-US"/>
           </a:p>
@@ -756,7 +758,7 @@
           <a:p>
             <a:fld id="{B2814555-0B78-4B78-BD0A-6F287A823B12}" type="datetimeFigureOut">
               <a:rPr lang="en-US" smtClean="0"/>
-              <a:t>1/24/2020</a:t>
+              <a:t>1/28/2020</a:t>
             </a:fld>
             <a:endParaRPr lang="en-US"/>
           </a:p>
@@ -1001,7 +1003,7 @@
           <a:p>
             <a:fld id="{B2814555-0B78-4B78-BD0A-6F287A823B12}" type="datetimeFigureOut">
               <a:rPr lang="en-US" smtClean="0"/>
-              <a:t>1/24/2020</a:t>
+              <a:t>1/28/2020</a:t>
             </a:fld>
             <a:endParaRPr lang="en-US"/>
           </a:p>
@@ -1230,7 +1232,7 @@
           <a:p>
             <a:fld id="{B2814555-0B78-4B78-BD0A-6F287A823B12}" type="datetimeFigureOut">
               <a:rPr lang="en-US" smtClean="0"/>
-              <a:t>1/24/2020</a:t>
+              <a:t>1/28/2020</a:t>
             </a:fld>
             <a:endParaRPr lang="en-US"/>
           </a:p>
@@ -1594,7 +1596,7 @@
           <a:p>
             <a:fld id="{B2814555-0B78-4B78-BD0A-6F287A823B12}" type="datetimeFigureOut">
               <a:rPr lang="en-US" smtClean="0"/>
-              <a:t>1/24/2020</a:t>
+              <a:t>1/28/2020</a:t>
             </a:fld>
             <a:endParaRPr lang="en-US"/>
           </a:p>
@@ -1711,7 +1713,7 @@
           <a:p>
             <a:fld id="{B2814555-0B78-4B78-BD0A-6F287A823B12}" type="datetimeFigureOut">
               <a:rPr lang="en-US" smtClean="0"/>
-              <a:t>1/24/2020</a:t>
+              <a:t>1/28/2020</a:t>
             </a:fld>
             <a:endParaRPr lang="en-US"/>
           </a:p>
@@ -1806,7 +1808,7 @@
           <a:p>
             <a:fld id="{B2814555-0B78-4B78-BD0A-6F287A823B12}" type="datetimeFigureOut">
               <a:rPr lang="en-US" smtClean="0"/>
-              <a:t>1/24/2020</a:t>
+              <a:t>1/28/2020</a:t>
             </a:fld>
             <a:endParaRPr lang="en-US"/>
           </a:p>
@@ -2081,7 +2083,7 @@
           <a:p>
             <a:fld id="{B2814555-0B78-4B78-BD0A-6F287A823B12}" type="datetimeFigureOut">
               <a:rPr lang="en-US" smtClean="0"/>
-              <a:t>1/24/2020</a:t>
+              <a:t>1/28/2020</a:t>
             </a:fld>
             <a:endParaRPr lang="en-US"/>
           </a:p>
@@ -2333,7 +2335,7 @@
           <a:p>
             <a:fld id="{B2814555-0B78-4B78-BD0A-6F287A823B12}" type="datetimeFigureOut">
               <a:rPr lang="en-US" smtClean="0"/>
-              <a:t>1/24/2020</a:t>
+              <a:t>1/28/2020</a:t>
             </a:fld>
             <a:endParaRPr lang="en-US"/>
           </a:p>
@@ -2544,7 +2546,7 @@
           <a:p>
             <a:fld id="{B2814555-0B78-4B78-BD0A-6F287A823B12}" type="datetimeFigureOut">
               <a:rPr lang="en-US" smtClean="0"/>
-              <a:t>1/24/2020</a:t>
+              <a:t>1/28/2020</a:t>
             </a:fld>
             <a:endParaRPr lang="en-US"/>
           </a:p>
@@ -3993,6 +3995,921 @@
 </p:sld>
 </file>
 
+<file path=ppt/slides/slide3.xml><?xml version="1.0" encoding="utf-8"?>
+<p:sld xmlns:a="http://schemas.openxmlformats.org/drawingml/2006/main" xmlns:r="http://schemas.openxmlformats.org/officeDocument/2006/relationships" xmlns:p="http://schemas.openxmlformats.org/presentationml/2006/main">
+  <p:cSld>
+    <p:spTree>
+      <p:nvGrpSpPr>
+        <p:cNvPr id="1" name=""/>
+        <p:cNvGrpSpPr/>
+        <p:nvPr/>
+      </p:nvGrpSpPr>
+      <p:grpSpPr>
+        <a:xfrm>
+          <a:off x="0" y="0"/>
+          <a:ext cx="0" cy="0"/>
+          <a:chOff x="0" y="0"/>
+          <a:chExt cx="0" cy="0"/>
+        </a:xfrm>
+      </p:grpSpPr>
+      <p:sp>
+        <p:nvSpPr>
+          <p:cNvPr id="2" name="Titre 1">
+            <a:extLst>
+              <a:ext uri="{FF2B5EF4-FFF2-40B4-BE49-F238E27FC236}">
+                <a16:creationId xmlns:a16="http://schemas.microsoft.com/office/drawing/2014/main" id="{62AACD15-8741-41DD-80F7-E94D8EBDF363}"/>
+              </a:ext>
+            </a:extLst>
+          </p:cNvPr>
+          <p:cNvSpPr>
+            <a:spLocks noGrp="1"/>
+          </p:cNvSpPr>
+          <p:nvPr>
+            <p:ph type="title"/>
+          </p:nvPr>
+        </p:nvSpPr>
+        <p:spPr/>
+        <p:txBody>
+          <a:bodyPr/>
+          <a:lstStyle/>
+          <a:p>
+            <a:endParaRPr lang="fr-BE" dirty="0"/>
+          </a:p>
+        </p:txBody>
+      </p:sp>
+      <p:sp>
+        <p:nvSpPr>
+          <p:cNvPr id="3" name="Espace réservé du contenu 2">
+            <a:extLst>
+              <a:ext uri="{FF2B5EF4-FFF2-40B4-BE49-F238E27FC236}">
+                <a16:creationId xmlns:a16="http://schemas.microsoft.com/office/drawing/2014/main" id="{932AA2C7-A9A2-48DD-883C-6819D221E061}"/>
+              </a:ext>
+            </a:extLst>
+          </p:cNvPr>
+          <p:cNvSpPr>
+            <a:spLocks noGrp="1"/>
+          </p:cNvSpPr>
+          <p:nvPr>
+            <p:ph idx="1"/>
+          </p:nvPr>
+        </p:nvSpPr>
+        <p:spPr/>
+        <p:txBody>
+          <a:bodyPr/>
+          <a:lstStyle/>
+          <a:p>
+            <a:r>
+              <a:rPr lang="fr-BE" dirty="0" err="1"/>
+              <a:t>Two</a:t>
+            </a:r>
+            <a:r>
+              <a:rPr lang="fr-BE" dirty="0"/>
+              <a:t> </a:t>
+            </a:r>
+            <a:r>
+              <a:rPr lang="fr-BE" dirty="0" err="1"/>
+              <a:t>websites</a:t>
+            </a:r>
+            <a:r>
+              <a:rPr lang="fr-BE" dirty="0"/>
+              <a:t> :</a:t>
+            </a:r>
+          </a:p>
+          <a:p>
+            <a:pPr lvl="1"/>
+            <a:r>
+              <a:rPr lang="fr-BE" dirty="0"/>
+              <a:t>Monitoring : </a:t>
+            </a:r>
+            <a:r>
+              <a:rPr lang="fr-BE" dirty="0" err="1"/>
+              <a:t>view</a:t>
+            </a:r>
+            <a:r>
+              <a:rPr lang="fr-BE" dirty="0"/>
+              <a:t> </a:t>
+            </a:r>
+            <a:r>
+              <a:rPr lang="fr-BE" dirty="0" err="1"/>
+              <a:t>statistics</a:t>
+            </a:r>
+            <a:r>
+              <a:rPr lang="fr-BE" dirty="0"/>
+              <a:t> or performance.</a:t>
+            </a:r>
+          </a:p>
+          <a:p>
+            <a:pPr lvl="2"/>
+            <a:r>
+              <a:rPr lang="fr-BE" dirty="0"/>
+              <a:t>For </a:t>
+            </a:r>
+            <a:r>
+              <a:rPr lang="fr-BE" dirty="0" err="1"/>
+              <a:t>who</a:t>
+            </a:r>
+            <a:r>
+              <a:rPr lang="fr-BE" dirty="0"/>
+              <a:t> ? Administrator.</a:t>
+            </a:r>
+          </a:p>
+          <a:p>
+            <a:pPr lvl="1"/>
+            <a:r>
+              <a:rPr lang="fr-BE" dirty="0" err="1"/>
+              <a:t>CaseManagement</a:t>
+            </a:r>
+            <a:r>
+              <a:rPr lang="fr-BE" dirty="0"/>
+              <a:t> : manage case </a:t>
+            </a:r>
+            <a:r>
+              <a:rPr lang="fr-BE" dirty="0" err="1"/>
+              <a:t>definition</a:t>
+            </a:r>
+            <a:r>
+              <a:rPr lang="fr-BE" dirty="0"/>
+              <a:t> or run </a:t>
+            </a:r>
+            <a:r>
+              <a:rPr lang="fr-BE" dirty="0" err="1"/>
+              <a:t>human</a:t>
+            </a:r>
+            <a:r>
+              <a:rPr lang="fr-BE" dirty="0"/>
+              <a:t> </a:t>
+            </a:r>
+            <a:r>
+              <a:rPr lang="fr-BE" dirty="0" err="1"/>
+              <a:t>tasks</a:t>
+            </a:r>
+            <a:endParaRPr lang="fr-BE" dirty="0"/>
+          </a:p>
+          <a:p>
+            <a:pPr lvl="2"/>
+            <a:r>
+              <a:rPr lang="fr-BE" dirty="0"/>
+              <a:t>For </a:t>
+            </a:r>
+            <a:r>
+              <a:rPr lang="fr-BE" dirty="0" err="1"/>
+              <a:t>who</a:t>
+            </a:r>
+            <a:r>
+              <a:rPr lang="fr-BE" dirty="0"/>
+              <a:t> ? Case </a:t>
+            </a:r>
+            <a:r>
+              <a:rPr lang="fr-BE" dirty="0" err="1"/>
+              <a:t>workers</a:t>
+            </a:r>
+            <a:r>
+              <a:rPr lang="fr-BE" dirty="0"/>
+              <a:t> or business </a:t>
+            </a:r>
+            <a:r>
+              <a:rPr lang="fr-BE" dirty="0" err="1"/>
+              <a:t>analysts</a:t>
+            </a:r>
+            <a:r>
+              <a:rPr lang="fr-BE" dirty="0"/>
+              <a:t>.</a:t>
+            </a:r>
+          </a:p>
+        </p:txBody>
+      </p:sp>
+    </p:spTree>
+    <p:extLst>
+      <p:ext uri="{BB962C8B-B14F-4D97-AF65-F5344CB8AC3E}">
+        <p14:creationId xmlns:p14="http://schemas.microsoft.com/office/powerpoint/2010/main" val="4278263625"/>
+      </p:ext>
+    </p:extLst>
+  </p:cSld>
+  <p:clrMapOvr>
+    <a:masterClrMapping/>
+  </p:clrMapOvr>
+</p:sld>
+</file>
+
+<file path=ppt/slides/slide4.xml><?xml version="1.0" encoding="utf-8"?>
+<p:sld xmlns:a="http://schemas.openxmlformats.org/drawingml/2006/main" xmlns:r="http://schemas.openxmlformats.org/officeDocument/2006/relationships" xmlns:p="http://schemas.openxmlformats.org/presentationml/2006/main">
+  <p:cSld>
+    <p:spTree>
+      <p:nvGrpSpPr>
+        <p:cNvPr id="1" name=""/>
+        <p:cNvGrpSpPr/>
+        <p:nvPr/>
+      </p:nvGrpSpPr>
+      <p:grpSpPr>
+        <a:xfrm>
+          <a:off x="0" y="0"/>
+          <a:ext cx="0" cy="0"/>
+          <a:chOff x="0" y="0"/>
+          <a:chExt cx="0" cy="0"/>
+        </a:xfrm>
+      </p:grpSpPr>
+      <p:sp>
+        <p:nvSpPr>
+          <p:cNvPr id="4" name="Rectangle 3">
+            <a:extLst>
+              <a:ext uri="{FF2B5EF4-FFF2-40B4-BE49-F238E27FC236}">
+                <a16:creationId xmlns:a16="http://schemas.microsoft.com/office/drawing/2014/main" id="{C02348AE-634B-487E-AA83-D9CAEE3B0F77}"/>
+              </a:ext>
+            </a:extLst>
+          </p:cNvPr>
+          <p:cNvSpPr/>
+          <p:nvPr/>
+        </p:nvSpPr>
+        <p:spPr>
+          <a:xfrm>
+            <a:off x="1340528" y="781235"/>
+            <a:ext cx="9277165" cy="1012054"/>
+          </a:xfrm>
+          <a:prstGeom prst="rect">
+            <a:avLst/>
+          </a:prstGeom>
+          <a:noFill/>
+          <a:ln>
+            <a:solidFill>
+              <a:schemeClr val="tx1"/>
+            </a:solidFill>
+          </a:ln>
+        </p:spPr>
+        <p:style>
+          <a:lnRef idx="2">
+            <a:schemeClr val="accent1">
+              <a:shade val="50000"/>
+            </a:schemeClr>
+          </a:lnRef>
+          <a:fillRef idx="1">
+            <a:schemeClr val="accent1"/>
+          </a:fillRef>
+          <a:effectRef idx="0">
+            <a:schemeClr val="accent1"/>
+          </a:effectRef>
+          <a:fontRef idx="minor">
+            <a:schemeClr val="lt1"/>
+          </a:fontRef>
+        </p:style>
+        <p:txBody>
+          <a:bodyPr rtlCol="0" anchor="ctr"/>
+          <a:lstStyle/>
+          <a:p>
+            <a:pPr algn="ctr"/>
+            <a:endParaRPr lang="fr-BE"/>
+          </a:p>
+        </p:txBody>
+      </p:sp>
+      <p:sp>
+        <p:nvSpPr>
+          <p:cNvPr id="5" name="Rectangle 4">
+            <a:extLst>
+              <a:ext uri="{FF2B5EF4-FFF2-40B4-BE49-F238E27FC236}">
+                <a16:creationId xmlns:a16="http://schemas.microsoft.com/office/drawing/2014/main" id="{6673FBA3-A10D-43B6-B090-E3D648508FAA}"/>
+              </a:ext>
+            </a:extLst>
+          </p:cNvPr>
+          <p:cNvSpPr/>
+          <p:nvPr/>
+        </p:nvSpPr>
+        <p:spPr>
+          <a:xfrm>
+            <a:off x="1340527" y="1793289"/>
+            <a:ext cx="1660125" cy="4283476"/>
+          </a:xfrm>
+          <a:prstGeom prst="rect">
+            <a:avLst/>
+          </a:prstGeom>
+          <a:noFill/>
+          <a:ln>
+            <a:solidFill>
+              <a:schemeClr val="tx1"/>
+            </a:solidFill>
+          </a:ln>
+        </p:spPr>
+        <p:style>
+          <a:lnRef idx="2">
+            <a:schemeClr val="accent1">
+              <a:shade val="50000"/>
+            </a:schemeClr>
+          </a:lnRef>
+          <a:fillRef idx="1">
+            <a:schemeClr val="accent1"/>
+          </a:fillRef>
+          <a:effectRef idx="0">
+            <a:schemeClr val="accent1"/>
+          </a:effectRef>
+          <a:fontRef idx="minor">
+            <a:schemeClr val="lt1"/>
+          </a:fontRef>
+        </p:style>
+        <p:txBody>
+          <a:bodyPr rtlCol="0" anchor="ctr"/>
+          <a:lstStyle/>
+          <a:p>
+            <a:pPr algn="ctr"/>
+            <a:endParaRPr lang="fr-BE"/>
+          </a:p>
+        </p:txBody>
+      </p:sp>
+      <p:sp>
+        <p:nvSpPr>
+          <p:cNvPr id="6" name="ZoneTexte 5">
+            <a:extLst>
+              <a:ext uri="{FF2B5EF4-FFF2-40B4-BE49-F238E27FC236}">
+                <a16:creationId xmlns:a16="http://schemas.microsoft.com/office/drawing/2014/main" id="{BA9AE1A8-8CFC-4B76-A5F4-30E13979FD26}"/>
+              </a:ext>
+            </a:extLst>
+          </p:cNvPr>
+          <p:cNvSpPr txBox="1"/>
+          <p:nvPr/>
+        </p:nvSpPr>
+        <p:spPr>
+          <a:xfrm>
+            <a:off x="1827448" y="1102596"/>
+            <a:ext cx="686278" cy="369332"/>
+          </a:xfrm>
+          <a:prstGeom prst="rect">
+            <a:avLst/>
+          </a:prstGeom>
+          <a:noFill/>
+        </p:spPr>
+        <p:txBody>
+          <a:bodyPr wrap="none" rtlCol="0">
+            <a:spAutoFit/>
+          </a:bodyPr>
+          <a:lstStyle/>
+          <a:p>
+            <a:r>
+              <a:rPr lang="fr-BE" b="1" dirty="0" err="1"/>
+              <a:t>Tasks</a:t>
+            </a:r>
+            <a:endParaRPr lang="fr-BE" b="1" dirty="0"/>
+          </a:p>
+        </p:txBody>
+      </p:sp>
+      <p:sp>
+        <p:nvSpPr>
+          <p:cNvPr id="7" name="ZoneTexte 6">
+            <a:extLst>
+              <a:ext uri="{FF2B5EF4-FFF2-40B4-BE49-F238E27FC236}">
+                <a16:creationId xmlns:a16="http://schemas.microsoft.com/office/drawing/2014/main" id="{221A7E4B-9CF9-4E5D-932A-2B15809306D6}"/>
+              </a:ext>
+            </a:extLst>
+          </p:cNvPr>
+          <p:cNvSpPr txBox="1"/>
+          <p:nvPr/>
+        </p:nvSpPr>
+        <p:spPr>
+          <a:xfrm>
+            <a:off x="1663879" y="2018476"/>
+            <a:ext cx="1013419" cy="369332"/>
+          </a:xfrm>
+          <a:prstGeom prst="rect">
+            <a:avLst/>
+          </a:prstGeom>
+          <a:noFill/>
+        </p:spPr>
+        <p:txBody>
+          <a:bodyPr wrap="none" rtlCol="0">
+            <a:spAutoFit/>
+          </a:bodyPr>
+          <a:lstStyle/>
+          <a:p>
+            <a:r>
+              <a:rPr lang="fr-BE" b="1" dirty="0"/>
+              <a:t>Planning</a:t>
+            </a:r>
+          </a:p>
+        </p:txBody>
+      </p:sp>
+      <p:sp>
+        <p:nvSpPr>
+          <p:cNvPr id="8" name="ZoneTexte 7">
+            <a:extLst>
+              <a:ext uri="{FF2B5EF4-FFF2-40B4-BE49-F238E27FC236}">
+                <a16:creationId xmlns:a16="http://schemas.microsoft.com/office/drawing/2014/main" id="{7C6F84D4-10D7-444F-9FDE-1459793DAD88}"/>
+              </a:ext>
+            </a:extLst>
+          </p:cNvPr>
+          <p:cNvSpPr txBox="1"/>
+          <p:nvPr/>
+        </p:nvSpPr>
+        <p:spPr>
+          <a:xfrm>
+            <a:off x="1463182" y="2709169"/>
+            <a:ext cx="1414811" cy="369332"/>
+          </a:xfrm>
+          <a:prstGeom prst="rect">
+            <a:avLst/>
+          </a:prstGeom>
+          <a:noFill/>
+        </p:spPr>
+        <p:txBody>
+          <a:bodyPr wrap="none" rtlCol="0">
+            <a:spAutoFit/>
+          </a:bodyPr>
+          <a:lstStyle/>
+          <a:p>
+            <a:r>
+              <a:rPr lang="fr-BE" dirty="0"/>
+              <a:t>Human </a:t>
+            </a:r>
+            <a:r>
+              <a:rPr lang="fr-BE" dirty="0" err="1"/>
+              <a:t>tasks</a:t>
+            </a:r>
+            <a:endParaRPr lang="fr-BE" dirty="0"/>
+          </a:p>
+        </p:txBody>
+      </p:sp>
+      <p:sp>
+        <p:nvSpPr>
+          <p:cNvPr id="9" name="ZoneTexte 8">
+            <a:extLst>
+              <a:ext uri="{FF2B5EF4-FFF2-40B4-BE49-F238E27FC236}">
+                <a16:creationId xmlns:a16="http://schemas.microsoft.com/office/drawing/2014/main" id="{B021074E-029A-4888-8709-4D9472689AF6}"/>
+              </a:ext>
+            </a:extLst>
+          </p:cNvPr>
+          <p:cNvSpPr txBox="1"/>
+          <p:nvPr/>
+        </p:nvSpPr>
+        <p:spPr>
+          <a:xfrm>
+            <a:off x="1631577" y="3303688"/>
+            <a:ext cx="1414811" cy="646331"/>
+          </a:xfrm>
+          <a:prstGeom prst="rect">
+            <a:avLst/>
+          </a:prstGeom>
+          <a:noFill/>
+        </p:spPr>
+        <p:txBody>
+          <a:bodyPr wrap="square" rtlCol="0">
+            <a:spAutoFit/>
+          </a:bodyPr>
+          <a:lstStyle/>
+          <a:p>
+            <a:r>
+              <a:rPr lang="fr-BE" dirty="0"/>
+              <a:t>Activation </a:t>
+            </a:r>
+            <a:r>
+              <a:rPr lang="fr-BE" dirty="0" err="1"/>
+              <a:t>rules</a:t>
+            </a:r>
+            <a:endParaRPr lang="fr-BE" dirty="0"/>
+          </a:p>
+        </p:txBody>
+      </p:sp>
+      <p:cxnSp>
+        <p:nvCxnSpPr>
+          <p:cNvPr id="11" name="Connecteur droit 10">
+            <a:extLst>
+              <a:ext uri="{FF2B5EF4-FFF2-40B4-BE49-F238E27FC236}">
+                <a16:creationId xmlns:a16="http://schemas.microsoft.com/office/drawing/2014/main" id="{8D622966-0862-4CC0-8A75-E3326BB3ACC1}"/>
+              </a:ext>
+            </a:extLst>
+          </p:cNvPr>
+          <p:cNvCxnSpPr/>
+          <p:nvPr/>
+        </p:nvCxnSpPr>
+        <p:spPr>
+          <a:xfrm>
+            <a:off x="1531394" y="2556483"/>
+            <a:ext cx="1278385" cy="0"/>
+          </a:xfrm>
+          <a:prstGeom prst="line">
+            <a:avLst/>
+          </a:prstGeom>
+          <a:ln>
+            <a:solidFill>
+              <a:schemeClr val="tx1"/>
+            </a:solidFill>
+          </a:ln>
+        </p:spPr>
+        <p:style>
+          <a:lnRef idx="1">
+            <a:schemeClr val="accent1"/>
+          </a:lnRef>
+          <a:fillRef idx="0">
+            <a:schemeClr val="accent1"/>
+          </a:fillRef>
+          <a:effectRef idx="0">
+            <a:schemeClr val="accent1"/>
+          </a:effectRef>
+          <a:fontRef idx="minor">
+            <a:schemeClr val="tx1"/>
+          </a:fontRef>
+        </p:style>
+      </p:cxnSp>
+      <p:cxnSp>
+        <p:nvCxnSpPr>
+          <p:cNvPr id="12" name="Connecteur droit 11">
+            <a:extLst>
+              <a:ext uri="{FF2B5EF4-FFF2-40B4-BE49-F238E27FC236}">
+                <a16:creationId xmlns:a16="http://schemas.microsoft.com/office/drawing/2014/main" id="{7D89C345-CE9C-4C1E-B964-71CDDEBD0520}"/>
+              </a:ext>
+            </a:extLst>
+          </p:cNvPr>
+          <p:cNvCxnSpPr/>
+          <p:nvPr/>
+        </p:nvCxnSpPr>
+        <p:spPr>
+          <a:xfrm>
+            <a:off x="1531393" y="3197155"/>
+            <a:ext cx="1278385" cy="0"/>
+          </a:xfrm>
+          <a:prstGeom prst="line">
+            <a:avLst/>
+          </a:prstGeom>
+          <a:ln>
+            <a:solidFill>
+              <a:schemeClr val="tx1"/>
+            </a:solidFill>
+          </a:ln>
+        </p:spPr>
+        <p:style>
+          <a:lnRef idx="1">
+            <a:schemeClr val="accent1"/>
+          </a:lnRef>
+          <a:fillRef idx="0">
+            <a:schemeClr val="accent1"/>
+          </a:fillRef>
+          <a:effectRef idx="0">
+            <a:schemeClr val="accent1"/>
+          </a:effectRef>
+          <a:fontRef idx="minor">
+            <a:schemeClr val="tx1"/>
+          </a:fontRef>
+        </p:style>
+      </p:cxnSp>
+      <p:cxnSp>
+        <p:nvCxnSpPr>
+          <p:cNvPr id="13" name="Connecteur droit 12">
+            <a:extLst>
+              <a:ext uri="{FF2B5EF4-FFF2-40B4-BE49-F238E27FC236}">
+                <a16:creationId xmlns:a16="http://schemas.microsoft.com/office/drawing/2014/main" id="{6625F495-4201-4A62-932D-BAAB71FF8D3E}"/>
+              </a:ext>
+            </a:extLst>
+          </p:cNvPr>
+          <p:cNvCxnSpPr>
+            <a:cxnSpLocks/>
+          </p:cNvCxnSpPr>
+          <p:nvPr/>
+        </p:nvCxnSpPr>
+        <p:spPr>
+          <a:xfrm>
+            <a:off x="3000652" y="959982"/>
+            <a:ext cx="0" cy="575855"/>
+          </a:xfrm>
+          <a:prstGeom prst="line">
+            <a:avLst/>
+          </a:prstGeom>
+          <a:ln>
+            <a:solidFill>
+              <a:schemeClr val="tx1"/>
+            </a:solidFill>
+          </a:ln>
+        </p:spPr>
+        <p:style>
+          <a:lnRef idx="1">
+            <a:schemeClr val="accent1"/>
+          </a:lnRef>
+          <a:fillRef idx="0">
+            <a:schemeClr val="accent1"/>
+          </a:fillRef>
+          <a:effectRef idx="0">
+            <a:schemeClr val="accent1"/>
+          </a:effectRef>
+          <a:fontRef idx="minor">
+            <a:schemeClr val="tx1"/>
+          </a:fontRef>
+        </p:style>
+      </p:cxnSp>
+      <p:sp>
+        <p:nvSpPr>
+          <p:cNvPr id="16" name="ZoneTexte 15">
+            <a:extLst>
+              <a:ext uri="{FF2B5EF4-FFF2-40B4-BE49-F238E27FC236}">
+                <a16:creationId xmlns:a16="http://schemas.microsoft.com/office/drawing/2014/main" id="{2B8F0C83-BA70-4041-A3A5-FB11AAABAD9D}"/>
+              </a:ext>
+            </a:extLst>
+          </p:cNvPr>
+          <p:cNvSpPr txBox="1"/>
+          <p:nvPr/>
+        </p:nvSpPr>
+        <p:spPr>
+          <a:xfrm>
+            <a:off x="3302621" y="1098754"/>
+            <a:ext cx="627095" cy="369332"/>
+          </a:xfrm>
+          <a:prstGeom prst="rect">
+            <a:avLst/>
+          </a:prstGeom>
+          <a:noFill/>
+        </p:spPr>
+        <p:txBody>
+          <a:bodyPr wrap="none" rtlCol="0">
+            <a:spAutoFit/>
+          </a:bodyPr>
+          <a:lstStyle/>
+          <a:p>
+            <a:r>
+              <a:rPr lang="fr-BE" dirty="0"/>
+              <a:t>Case</a:t>
+            </a:r>
+          </a:p>
+        </p:txBody>
+      </p:sp>
+      <p:sp>
+        <p:nvSpPr>
+          <p:cNvPr id="17" name="Rectangle 16">
+            <a:extLst>
+              <a:ext uri="{FF2B5EF4-FFF2-40B4-BE49-F238E27FC236}">
+                <a16:creationId xmlns:a16="http://schemas.microsoft.com/office/drawing/2014/main" id="{1211C13E-0DE9-44B7-839A-91EE788DAF55}"/>
+              </a:ext>
+            </a:extLst>
+          </p:cNvPr>
+          <p:cNvSpPr/>
+          <p:nvPr/>
+        </p:nvSpPr>
+        <p:spPr>
+          <a:xfrm>
+            <a:off x="3000644" y="1793289"/>
+            <a:ext cx="7617046" cy="4283476"/>
+          </a:xfrm>
+          <a:prstGeom prst="rect">
+            <a:avLst/>
+          </a:prstGeom>
+          <a:noFill/>
+          <a:ln>
+            <a:solidFill>
+              <a:schemeClr val="tx1"/>
+            </a:solidFill>
+          </a:ln>
+        </p:spPr>
+        <p:style>
+          <a:lnRef idx="2">
+            <a:schemeClr val="accent1">
+              <a:shade val="50000"/>
+            </a:schemeClr>
+          </a:lnRef>
+          <a:fillRef idx="1">
+            <a:schemeClr val="accent1"/>
+          </a:fillRef>
+          <a:effectRef idx="0">
+            <a:schemeClr val="accent1"/>
+          </a:effectRef>
+          <a:fontRef idx="minor">
+            <a:schemeClr val="lt1"/>
+          </a:fontRef>
+        </p:style>
+        <p:txBody>
+          <a:bodyPr rtlCol="0" anchor="ctr"/>
+          <a:lstStyle/>
+          <a:p>
+            <a:pPr algn="ctr"/>
+            <a:endParaRPr lang="fr-BE"/>
+          </a:p>
+        </p:txBody>
+      </p:sp>
+      <p:sp>
+        <p:nvSpPr>
+          <p:cNvPr id="18" name="Rectangle 17">
+            <a:extLst>
+              <a:ext uri="{FF2B5EF4-FFF2-40B4-BE49-F238E27FC236}">
+                <a16:creationId xmlns:a16="http://schemas.microsoft.com/office/drawing/2014/main" id="{CB83A205-4052-40F3-B651-A3EE98D1ED41}"/>
+              </a:ext>
+            </a:extLst>
+          </p:cNvPr>
+          <p:cNvSpPr/>
+          <p:nvPr/>
+        </p:nvSpPr>
+        <p:spPr>
+          <a:xfrm>
+            <a:off x="3191517" y="1945689"/>
+            <a:ext cx="7216074" cy="442119"/>
+          </a:xfrm>
+          <a:prstGeom prst="rect">
+            <a:avLst/>
+          </a:prstGeom>
+          <a:noFill/>
+          <a:ln>
+            <a:solidFill>
+              <a:schemeClr val="tx1"/>
+            </a:solidFill>
+          </a:ln>
+        </p:spPr>
+        <p:style>
+          <a:lnRef idx="2">
+            <a:schemeClr val="accent1">
+              <a:shade val="50000"/>
+            </a:schemeClr>
+          </a:lnRef>
+          <a:fillRef idx="1">
+            <a:schemeClr val="accent1"/>
+          </a:fillRef>
+          <a:effectRef idx="0">
+            <a:schemeClr val="accent1"/>
+          </a:effectRef>
+          <a:fontRef idx="minor">
+            <a:schemeClr val="lt1"/>
+          </a:fontRef>
+        </p:style>
+        <p:txBody>
+          <a:bodyPr rtlCol="0" anchor="ctr"/>
+          <a:lstStyle/>
+          <a:p>
+            <a:pPr algn="ctr"/>
+            <a:endParaRPr lang="fr-BE"/>
+          </a:p>
+        </p:txBody>
+      </p:sp>
+      <p:sp>
+        <p:nvSpPr>
+          <p:cNvPr id="19" name="ZoneTexte 18">
+            <a:extLst>
+              <a:ext uri="{FF2B5EF4-FFF2-40B4-BE49-F238E27FC236}">
+                <a16:creationId xmlns:a16="http://schemas.microsoft.com/office/drawing/2014/main" id="{F2820B8B-A46E-4E6B-B753-88FBE6DABFD5}"/>
+              </a:ext>
+            </a:extLst>
+          </p:cNvPr>
+          <p:cNvSpPr txBox="1"/>
+          <p:nvPr/>
+        </p:nvSpPr>
+        <p:spPr>
+          <a:xfrm>
+            <a:off x="3419270" y="1982082"/>
+            <a:ext cx="2660280" cy="369332"/>
+          </a:xfrm>
+          <a:prstGeom prst="rect">
+            <a:avLst/>
+          </a:prstGeom>
+          <a:noFill/>
+        </p:spPr>
+        <p:txBody>
+          <a:bodyPr wrap="none" rtlCol="0">
+            <a:spAutoFit/>
+          </a:bodyPr>
+          <a:lstStyle/>
+          <a:p>
+            <a:r>
+              <a:rPr lang="fr-BE" dirty="0"/>
+              <a:t>Case </a:t>
+            </a:r>
+            <a:r>
+              <a:rPr lang="fr-BE" dirty="0" err="1"/>
+              <a:t>name</a:t>
+            </a:r>
+            <a:r>
+              <a:rPr lang="fr-BE" dirty="0"/>
+              <a:t> : &lt;description&gt;</a:t>
+            </a:r>
+          </a:p>
+        </p:txBody>
+      </p:sp>
+      <p:sp>
+        <p:nvSpPr>
+          <p:cNvPr id="20" name="Rectangle 19">
+            <a:extLst>
+              <a:ext uri="{FF2B5EF4-FFF2-40B4-BE49-F238E27FC236}">
+                <a16:creationId xmlns:a16="http://schemas.microsoft.com/office/drawing/2014/main" id="{85DE11F8-37A5-4E7D-B6AB-0141949999D6}"/>
+              </a:ext>
+            </a:extLst>
+          </p:cNvPr>
+          <p:cNvSpPr/>
+          <p:nvPr/>
+        </p:nvSpPr>
+        <p:spPr>
+          <a:xfrm>
+            <a:off x="3191517" y="2387806"/>
+            <a:ext cx="7216074" cy="809349"/>
+          </a:xfrm>
+          <a:prstGeom prst="rect">
+            <a:avLst/>
+          </a:prstGeom>
+          <a:noFill/>
+          <a:ln>
+            <a:solidFill>
+              <a:schemeClr val="tx1"/>
+            </a:solidFill>
+          </a:ln>
+        </p:spPr>
+        <p:style>
+          <a:lnRef idx="2">
+            <a:schemeClr val="accent1">
+              <a:shade val="50000"/>
+            </a:schemeClr>
+          </a:lnRef>
+          <a:fillRef idx="1">
+            <a:schemeClr val="accent1"/>
+          </a:fillRef>
+          <a:effectRef idx="0">
+            <a:schemeClr val="accent1"/>
+          </a:effectRef>
+          <a:fontRef idx="minor">
+            <a:schemeClr val="lt1"/>
+          </a:fontRef>
+        </p:style>
+        <p:txBody>
+          <a:bodyPr rtlCol="0" anchor="ctr"/>
+          <a:lstStyle/>
+          <a:p>
+            <a:pPr algn="ctr"/>
+            <a:endParaRPr lang="fr-BE"/>
+          </a:p>
+        </p:txBody>
+      </p:sp>
+      <p:sp>
+        <p:nvSpPr>
+          <p:cNvPr id="21" name="ZoneTexte 20">
+            <a:extLst>
+              <a:ext uri="{FF2B5EF4-FFF2-40B4-BE49-F238E27FC236}">
+                <a16:creationId xmlns:a16="http://schemas.microsoft.com/office/drawing/2014/main" id="{71C90221-6573-482D-A02A-31E9A711B91A}"/>
+              </a:ext>
+            </a:extLst>
+          </p:cNvPr>
+          <p:cNvSpPr txBox="1"/>
+          <p:nvPr/>
+        </p:nvSpPr>
+        <p:spPr>
+          <a:xfrm>
+            <a:off x="3419270" y="2424200"/>
+            <a:ext cx="2750561" cy="646331"/>
+          </a:xfrm>
+          <a:prstGeom prst="rect">
+            <a:avLst/>
+          </a:prstGeom>
+          <a:noFill/>
+        </p:spPr>
+        <p:txBody>
+          <a:bodyPr wrap="none" rtlCol="0">
+            <a:spAutoFit/>
+          </a:bodyPr>
+          <a:lstStyle/>
+          <a:p>
+            <a:pPr marL="285750" indent="-285750">
+              <a:buFontTx/>
+              <a:buChar char="-"/>
+            </a:pPr>
+            <a:r>
+              <a:rPr lang="fr-BE" dirty="0"/>
+              <a:t>Case </a:t>
+            </a:r>
+            <a:r>
+              <a:rPr lang="fr-BE" dirty="0" err="1"/>
+              <a:t>element</a:t>
+            </a:r>
+            <a:r>
+              <a:rPr lang="fr-BE" dirty="0"/>
+              <a:t> : </a:t>
+            </a:r>
+            <a:r>
+              <a:rPr lang="fr-BE" dirty="0" err="1"/>
+              <a:t>schedule</a:t>
+            </a:r>
+            <a:endParaRPr lang="fr-BE" dirty="0"/>
+          </a:p>
+          <a:p>
+            <a:pPr marL="285750" indent="-285750">
+              <a:buFontTx/>
+              <a:buChar char="-"/>
+            </a:pPr>
+            <a:r>
+              <a:rPr lang="fr-BE" dirty="0"/>
+              <a:t>Case </a:t>
+            </a:r>
+            <a:r>
+              <a:rPr lang="fr-BE" dirty="0" err="1"/>
+              <a:t>element</a:t>
+            </a:r>
+            <a:r>
+              <a:rPr lang="fr-BE" dirty="0"/>
+              <a:t> : </a:t>
+            </a:r>
+            <a:r>
+              <a:rPr lang="fr-BE" dirty="0" err="1"/>
+              <a:t>schedule</a:t>
+            </a:r>
+            <a:endParaRPr lang="fr-BE" dirty="0"/>
+          </a:p>
+        </p:txBody>
+      </p:sp>
+    </p:spTree>
+    <p:extLst>
+      <p:ext uri="{BB962C8B-B14F-4D97-AF65-F5344CB8AC3E}">
+        <p14:creationId xmlns:p14="http://schemas.microsoft.com/office/powerpoint/2010/main" val="2968991888"/>
+      </p:ext>
+    </p:extLst>
+  </p:cSld>
+  <p:clrMapOvr>
+    <a:masterClrMapping/>
+  </p:clrMapOvr>
+</p:sld>
+</file>
+
 <file path=ppt/theme/theme1.xml><?xml version="1.0" encoding="utf-8"?>
 <a:theme xmlns:a="http://schemas.openxmlformats.org/drawingml/2006/main" name="Office Theme">
   <a:themeElements>

</xml_diff>

<commit_message>
Ticket #21 : Add API to get the list of planning
</commit_message>
<xml_diff>
--- a/Architecture.pptx
+++ b/Architecture.pptx
@@ -4106,7 +4106,7 @@
             </a:r>
             <a:r>
               <a:rPr lang="fr-BE" dirty="0" err="1"/>
-              <a:t>who</a:t>
+              <a:t>whom</a:t>
             </a:r>
             <a:r>
               <a:rPr lang="fr-BE" dirty="0"/>
@@ -4153,7 +4153,7 @@
             </a:r>
             <a:r>
               <a:rPr lang="fr-BE" dirty="0" err="1"/>
-              <a:t>who</a:t>
+              <a:t>whom</a:t>
             </a:r>
             <a:r>
               <a:rPr lang="fr-BE" dirty="0"/>

</xml_diff>

<commit_message>
Ticket #23 : Can add a case file definition
</commit_message>
<xml_diff>
--- a/Architecture.pptx
+++ b/Architecture.pptx
@@ -9,6 +9,7 @@
     <p:sldId id="257" r:id="rId3"/>
     <p:sldId id="259" r:id="rId4"/>
     <p:sldId id="258" r:id="rId5"/>
+    <p:sldId id="260" r:id="rId6"/>
   </p:sldIdLst>
   <p:sldSz cx="12192000" cy="6858000"/>
   <p:notesSz cx="6858000" cy="9144000"/>
@@ -244,7 +245,7 @@
           <a:p>
             <a:fld id="{B2814555-0B78-4B78-BD0A-6F287A823B12}" type="datetimeFigureOut">
               <a:rPr lang="en-US" smtClean="0"/>
-              <a:t>1/28/2020</a:t>
+              <a:t>1/29/2020</a:t>
             </a:fld>
             <a:endParaRPr lang="en-US"/>
           </a:p>
@@ -286,7 +287,7 @@
           <a:p>
             <a:fld id="{F58E7868-A9AD-480A-A6BB-C3687D73A28E}" type="slidenum">
               <a:rPr lang="en-US" smtClean="0"/>
-              <a:t>‹N°›</a:t>
+              <a:t>‹#›</a:t>
             </a:fld>
             <a:endParaRPr lang="en-US"/>
           </a:p>
@@ -412,7 +413,7 @@
           <a:p>
             <a:fld id="{B2814555-0B78-4B78-BD0A-6F287A823B12}" type="datetimeFigureOut">
               <a:rPr lang="en-US" smtClean="0"/>
-              <a:t>1/28/2020</a:t>
+              <a:t>1/29/2020</a:t>
             </a:fld>
             <a:endParaRPr lang="en-US"/>
           </a:p>
@@ -454,7 +455,7 @@
           <a:p>
             <a:fld id="{F58E7868-A9AD-480A-A6BB-C3687D73A28E}" type="slidenum">
               <a:rPr lang="en-US" smtClean="0"/>
-              <a:t>‹N°›</a:t>
+              <a:t>‹#›</a:t>
             </a:fld>
             <a:endParaRPr lang="en-US"/>
           </a:p>
@@ -590,7 +591,7 @@
           <a:p>
             <a:fld id="{B2814555-0B78-4B78-BD0A-6F287A823B12}" type="datetimeFigureOut">
               <a:rPr lang="en-US" smtClean="0"/>
-              <a:t>1/28/2020</a:t>
+              <a:t>1/29/2020</a:t>
             </a:fld>
             <a:endParaRPr lang="en-US"/>
           </a:p>
@@ -632,7 +633,7 @@
           <a:p>
             <a:fld id="{F58E7868-A9AD-480A-A6BB-C3687D73A28E}" type="slidenum">
               <a:rPr lang="en-US" smtClean="0"/>
-              <a:t>‹N°›</a:t>
+              <a:t>‹#›</a:t>
             </a:fld>
             <a:endParaRPr lang="en-US"/>
           </a:p>
@@ -758,7 +759,7 @@
           <a:p>
             <a:fld id="{B2814555-0B78-4B78-BD0A-6F287A823B12}" type="datetimeFigureOut">
               <a:rPr lang="en-US" smtClean="0"/>
-              <a:t>1/28/2020</a:t>
+              <a:t>1/29/2020</a:t>
             </a:fld>
             <a:endParaRPr lang="en-US"/>
           </a:p>
@@ -800,7 +801,7 @@
           <a:p>
             <a:fld id="{F58E7868-A9AD-480A-A6BB-C3687D73A28E}" type="slidenum">
               <a:rPr lang="en-US" smtClean="0"/>
-              <a:t>‹N°›</a:t>
+              <a:t>‹#›</a:t>
             </a:fld>
             <a:endParaRPr lang="en-US"/>
           </a:p>
@@ -1003,7 +1004,7 @@
           <a:p>
             <a:fld id="{B2814555-0B78-4B78-BD0A-6F287A823B12}" type="datetimeFigureOut">
               <a:rPr lang="en-US" smtClean="0"/>
-              <a:t>1/28/2020</a:t>
+              <a:t>1/29/2020</a:t>
             </a:fld>
             <a:endParaRPr lang="en-US"/>
           </a:p>
@@ -1045,7 +1046,7 @@
           <a:p>
             <a:fld id="{F58E7868-A9AD-480A-A6BB-C3687D73A28E}" type="slidenum">
               <a:rPr lang="en-US" smtClean="0"/>
-              <a:t>‹N°›</a:t>
+              <a:t>‹#›</a:t>
             </a:fld>
             <a:endParaRPr lang="en-US"/>
           </a:p>
@@ -1232,7 +1233,7 @@
           <a:p>
             <a:fld id="{B2814555-0B78-4B78-BD0A-6F287A823B12}" type="datetimeFigureOut">
               <a:rPr lang="en-US" smtClean="0"/>
-              <a:t>1/28/2020</a:t>
+              <a:t>1/29/2020</a:t>
             </a:fld>
             <a:endParaRPr lang="en-US"/>
           </a:p>
@@ -1274,7 +1275,7 @@
           <a:p>
             <a:fld id="{F58E7868-A9AD-480A-A6BB-C3687D73A28E}" type="slidenum">
               <a:rPr lang="en-US" smtClean="0"/>
-              <a:t>‹N°›</a:t>
+              <a:t>‹#›</a:t>
             </a:fld>
             <a:endParaRPr lang="en-US"/>
           </a:p>
@@ -1596,7 +1597,7 @@
           <a:p>
             <a:fld id="{B2814555-0B78-4B78-BD0A-6F287A823B12}" type="datetimeFigureOut">
               <a:rPr lang="en-US" smtClean="0"/>
-              <a:t>1/28/2020</a:t>
+              <a:t>1/29/2020</a:t>
             </a:fld>
             <a:endParaRPr lang="en-US"/>
           </a:p>
@@ -1638,7 +1639,7 @@
           <a:p>
             <a:fld id="{F58E7868-A9AD-480A-A6BB-C3687D73A28E}" type="slidenum">
               <a:rPr lang="en-US" smtClean="0"/>
-              <a:t>‹N°›</a:t>
+              <a:t>‹#›</a:t>
             </a:fld>
             <a:endParaRPr lang="en-US"/>
           </a:p>
@@ -1713,7 +1714,7 @@
           <a:p>
             <a:fld id="{B2814555-0B78-4B78-BD0A-6F287A823B12}" type="datetimeFigureOut">
               <a:rPr lang="en-US" smtClean="0"/>
-              <a:t>1/28/2020</a:t>
+              <a:t>1/29/2020</a:t>
             </a:fld>
             <a:endParaRPr lang="en-US"/>
           </a:p>
@@ -1755,7 +1756,7 @@
           <a:p>
             <a:fld id="{F58E7868-A9AD-480A-A6BB-C3687D73A28E}" type="slidenum">
               <a:rPr lang="en-US" smtClean="0"/>
-              <a:t>‹N°›</a:t>
+              <a:t>‹#›</a:t>
             </a:fld>
             <a:endParaRPr lang="en-US"/>
           </a:p>
@@ -1808,7 +1809,7 @@
           <a:p>
             <a:fld id="{B2814555-0B78-4B78-BD0A-6F287A823B12}" type="datetimeFigureOut">
               <a:rPr lang="en-US" smtClean="0"/>
-              <a:t>1/28/2020</a:t>
+              <a:t>1/29/2020</a:t>
             </a:fld>
             <a:endParaRPr lang="en-US"/>
           </a:p>
@@ -1850,7 +1851,7 @@
           <a:p>
             <a:fld id="{F58E7868-A9AD-480A-A6BB-C3687D73A28E}" type="slidenum">
               <a:rPr lang="en-US" smtClean="0"/>
-              <a:t>‹N°›</a:t>
+              <a:t>‹#›</a:t>
             </a:fld>
             <a:endParaRPr lang="en-US"/>
           </a:p>
@@ -2083,7 +2084,7 @@
           <a:p>
             <a:fld id="{B2814555-0B78-4B78-BD0A-6F287A823B12}" type="datetimeFigureOut">
               <a:rPr lang="en-US" smtClean="0"/>
-              <a:t>1/28/2020</a:t>
+              <a:t>1/29/2020</a:t>
             </a:fld>
             <a:endParaRPr lang="en-US"/>
           </a:p>
@@ -2125,7 +2126,7 @@
           <a:p>
             <a:fld id="{F58E7868-A9AD-480A-A6BB-C3687D73A28E}" type="slidenum">
               <a:rPr lang="en-US" smtClean="0"/>
-              <a:t>‹N°›</a:t>
+              <a:t>‹#›</a:t>
             </a:fld>
             <a:endParaRPr lang="en-US"/>
           </a:p>
@@ -2335,7 +2336,7 @@
           <a:p>
             <a:fld id="{B2814555-0B78-4B78-BD0A-6F287A823B12}" type="datetimeFigureOut">
               <a:rPr lang="en-US" smtClean="0"/>
-              <a:t>1/28/2020</a:t>
+              <a:t>1/29/2020</a:t>
             </a:fld>
             <a:endParaRPr lang="en-US"/>
           </a:p>
@@ -2377,7 +2378,7 @@
           <a:p>
             <a:fld id="{F58E7868-A9AD-480A-A6BB-C3687D73A28E}" type="slidenum">
               <a:rPr lang="en-US" smtClean="0"/>
-              <a:t>‹N°›</a:t>
+              <a:t>‹#›</a:t>
             </a:fld>
             <a:endParaRPr lang="en-US"/>
           </a:p>
@@ -2546,7 +2547,7 @@
           <a:p>
             <a:fld id="{B2814555-0B78-4B78-BD0A-6F287A823B12}" type="datetimeFigureOut">
               <a:rPr lang="en-US" smtClean="0"/>
-              <a:t>1/28/2020</a:t>
+              <a:t>1/29/2020</a:t>
             </a:fld>
             <a:endParaRPr lang="en-US"/>
           </a:p>
@@ -2624,7 +2625,7 @@
           <a:p>
             <a:fld id="{F58E7868-A9AD-480A-A6BB-C3687D73A28E}" type="slidenum">
               <a:rPr lang="en-US" smtClean="0"/>
-              <a:t>‹N°›</a:t>
+              <a:t>‹#›</a:t>
             </a:fld>
             <a:endParaRPr lang="en-US"/>
           </a:p>
@@ -4910,6 +4911,135 @@
 </p:sld>
 </file>
 
+<file path=ppt/slides/slide5.xml><?xml version="1.0" encoding="utf-8"?>
+<p:sld xmlns:a="http://schemas.openxmlformats.org/drawingml/2006/main" xmlns:r="http://schemas.openxmlformats.org/officeDocument/2006/relationships" xmlns:p="http://schemas.openxmlformats.org/presentationml/2006/main">
+  <p:cSld>
+    <p:spTree>
+      <p:nvGrpSpPr>
+        <p:cNvPr id="1" name=""/>
+        <p:cNvGrpSpPr/>
+        <p:nvPr/>
+      </p:nvGrpSpPr>
+      <p:grpSpPr>
+        <a:xfrm>
+          <a:off x="0" y="0"/>
+          <a:ext cx="0" cy="0"/>
+          <a:chOff x="0" y="0"/>
+          <a:chExt cx="0" cy="0"/>
+        </a:xfrm>
+      </p:grpSpPr>
+      <p:sp>
+        <p:nvSpPr>
+          <p:cNvPr id="2" name="Title 1"/>
+          <p:cNvSpPr>
+            <a:spLocks noGrp="1"/>
+          </p:cNvSpPr>
+          <p:nvPr>
+            <p:ph type="title"/>
+          </p:nvPr>
+        </p:nvSpPr>
+        <p:spPr/>
+        <p:txBody>
+          <a:bodyPr/>
+          <a:lstStyle/>
+          <a:p>
+            <a:endParaRPr lang="en-US"/>
+          </a:p>
+        </p:txBody>
+      </p:sp>
+      <p:sp>
+        <p:nvSpPr>
+          <p:cNvPr id="3" name="Content Placeholder 2"/>
+          <p:cNvSpPr>
+            <a:spLocks noGrp="1"/>
+          </p:cNvSpPr>
+          <p:nvPr>
+            <p:ph idx="1"/>
+          </p:nvPr>
+        </p:nvSpPr>
+        <p:spPr/>
+        <p:txBody>
+          <a:bodyPr/>
+          <a:lstStyle/>
+          <a:p>
+            <a:r>
+              <a:rPr lang="nl-BE" dirty="0" err="1" smtClean="0"/>
+              <a:t>Authorization</a:t>
+            </a:r>
+            <a:r>
+              <a:rPr lang="nl-BE" dirty="0" smtClean="0"/>
+              <a:t> </a:t>
+            </a:r>
+            <a:r>
+              <a:rPr lang="nl-BE" dirty="0" err="1" smtClean="0"/>
+              <a:t>policies</a:t>
+            </a:r>
+            <a:r>
+              <a:rPr lang="nl-BE" dirty="0" smtClean="0"/>
+              <a:t> (ASP.NET CORE)</a:t>
+            </a:r>
+          </a:p>
+          <a:p>
+            <a:pPr lvl="1"/>
+            <a:r>
+              <a:rPr lang="nl-BE" dirty="0" err="1" smtClean="0"/>
+              <a:t>get_statistic</a:t>
+            </a:r>
+            <a:r>
+              <a:rPr lang="nl-BE" dirty="0" smtClean="0"/>
+              <a:t> : administrator</a:t>
+            </a:r>
+          </a:p>
+          <a:p>
+            <a:pPr lvl="1"/>
+            <a:r>
+              <a:rPr lang="nl-BE" dirty="0" err="1" smtClean="0"/>
+              <a:t>get_performance</a:t>
+            </a:r>
+            <a:r>
+              <a:rPr lang="nl-BE" dirty="0" smtClean="0"/>
+              <a:t> : administrator</a:t>
+            </a:r>
+          </a:p>
+          <a:p>
+            <a:pPr lvl="1"/>
+            <a:r>
+              <a:rPr lang="nl-BE" dirty="0" err="1" smtClean="0"/>
+              <a:t>get_casedefinition</a:t>
+            </a:r>
+            <a:r>
+              <a:rPr lang="nl-BE" dirty="0" smtClean="0"/>
+              <a:t> : business </a:t>
+            </a:r>
+            <a:r>
+              <a:rPr lang="nl-BE" smtClean="0"/>
+              <a:t>analyst</a:t>
+            </a:r>
+            <a:endParaRPr lang="nl-BE" dirty="0" smtClean="0"/>
+          </a:p>
+          <a:p>
+            <a:pPr lvl="1"/>
+            <a:endParaRPr lang="nl-BE" dirty="0" smtClean="0"/>
+          </a:p>
+          <a:p>
+            <a:pPr lvl="1"/>
+            <a:endParaRPr lang="en-US" dirty="0"/>
+          </a:p>
+        </p:txBody>
+      </p:sp>
+    </p:spTree>
+    <p:extLst>
+      <p:ext uri="{BB962C8B-B14F-4D97-AF65-F5344CB8AC3E}">
+        <p14:creationId xmlns:p14="http://schemas.microsoft.com/office/powerpoint/2010/main" val="2296754397"/>
+      </p:ext>
+    </p:extLst>
+  </p:cSld>
+  <p:clrMapOvr>
+    <a:masterClrMapping/>
+  </p:clrMapOvr>
+</p:sld>
+</file>
+
 <file path=ppt/theme/theme1.xml><?xml version="1.0" encoding="utf-8"?>
 <a:theme xmlns:a="http://schemas.openxmlformats.org/drawingml/2006/main" name="Office Theme">
   <a:themeElements>

</xml_diff>

<commit_message>
Ticket 24 : Display case file + display case file history
</commit_message>
<xml_diff>
--- a/Architecture.pptx
+++ b/Architecture.pptx
@@ -245,7 +245,7 @@
           <a:p>
             <a:fld id="{B2814555-0B78-4B78-BD0A-6F287A823B12}" type="datetimeFigureOut">
               <a:rPr lang="en-US" smtClean="0"/>
-              <a:t>2/12/2020</a:t>
+              <a:t>2/14/2020</a:t>
             </a:fld>
             <a:endParaRPr lang="en-US"/>
           </a:p>
@@ -287,7 +287,7 @@
           <a:p>
             <a:fld id="{F58E7868-A9AD-480A-A6BB-C3687D73A28E}" type="slidenum">
               <a:rPr lang="en-US" smtClean="0"/>
-              <a:t>‹N°›</a:t>
+              <a:t>‹#›</a:t>
             </a:fld>
             <a:endParaRPr lang="en-US"/>
           </a:p>
@@ -413,7 +413,7 @@
           <a:p>
             <a:fld id="{B2814555-0B78-4B78-BD0A-6F287A823B12}" type="datetimeFigureOut">
               <a:rPr lang="en-US" smtClean="0"/>
-              <a:t>2/12/2020</a:t>
+              <a:t>2/14/2020</a:t>
             </a:fld>
             <a:endParaRPr lang="en-US"/>
           </a:p>
@@ -455,7 +455,7 @@
           <a:p>
             <a:fld id="{F58E7868-A9AD-480A-A6BB-C3687D73A28E}" type="slidenum">
               <a:rPr lang="en-US" smtClean="0"/>
-              <a:t>‹N°›</a:t>
+              <a:t>‹#›</a:t>
             </a:fld>
             <a:endParaRPr lang="en-US"/>
           </a:p>
@@ -591,7 +591,7 @@
           <a:p>
             <a:fld id="{B2814555-0B78-4B78-BD0A-6F287A823B12}" type="datetimeFigureOut">
               <a:rPr lang="en-US" smtClean="0"/>
-              <a:t>2/12/2020</a:t>
+              <a:t>2/14/2020</a:t>
             </a:fld>
             <a:endParaRPr lang="en-US"/>
           </a:p>
@@ -633,7 +633,7 @@
           <a:p>
             <a:fld id="{F58E7868-A9AD-480A-A6BB-C3687D73A28E}" type="slidenum">
               <a:rPr lang="en-US" smtClean="0"/>
-              <a:t>‹N°›</a:t>
+              <a:t>‹#›</a:t>
             </a:fld>
             <a:endParaRPr lang="en-US"/>
           </a:p>
@@ -759,7 +759,7 @@
           <a:p>
             <a:fld id="{B2814555-0B78-4B78-BD0A-6F287A823B12}" type="datetimeFigureOut">
               <a:rPr lang="en-US" smtClean="0"/>
-              <a:t>2/12/2020</a:t>
+              <a:t>2/14/2020</a:t>
             </a:fld>
             <a:endParaRPr lang="en-US"/>
           </a:p>
@@ -801,7 +801,7 @@
           <a:p>
             <a:fld id="{F58E7868-A9AD-480A-A6BB-C3687D73A28E}" type="slidenum">
               <a:rPr lang="en-US" smtClean="0"/>
-              <a:t>‹N°›</a:t>
+              <a:t>‹#›</a:t>
             </a:fld>
             <a:endParaRPr lang="en-US"/>
           </a:p>
@@ -1004,7 +1004,7 @@
           <a:p>
             <a:fld id="{B2814555-0B78-4B78-BD0A-6F287A823B12}" type="datetimeFigureOut">
               <a:rPr lang="en-US" smtClean="0"/>
-              <a:t>2/12/2020</a:t>
+              <a:t>2/14/2020</a:t>
             </a:fld>
             <a:endParaRPr lang="en-US"/>
           </a:p>
@@ -1046,7 +1046,7 @@
           <a:p>
             <a:fld id="{F58E7868-A9AD-480A-A6BB-C3687D73A28E}" type="slidenum">
               <a:rPr lang="en-US" smtClean="0"/>
-              <a:t>‹N°›</a:t>
+              <a:t>‹#›</a:t>
             </a:fld>
             <a:endParaRPr lang="en-US"/>
           </a:p>
@@ -1233,7 +1233,7 @@
           <a:p>
             <a:fld id="{B2814555-0B78-4B78-BD0A-6F287A823B12}" type="datetimeFigureOut">
               <a:rPr lang="en-US" smtClean="0"/>
-              <a:t>2/12/2020</a:t>
+              <a:t>2/14/2020</a:t>
             </a:fld>
             <a:endParaRPr lang="en-US"/>
           </a:p>
@@ -1275,7 +1275,7 @@
           <a:p>
             <a:fld id="{F58E7868-A9AD-480A-A6BB-C3687D73A28E}" type="slidenum">
               <a:rPr lang="en-US" smtClean="0"/>
-              <a:t>‹N°›</a:t>
+              <a:t>‹#›</a:t>
             </a:fld>
             <a:endParaRPr lang="en-US"/>
           </a:p>
@@ -1597,7 +1597,7 @@
           <a:p>
             <a:fld id="{B2814555-0B78-4B78-BD0A-6F287A823B12}" type="datetimeFigureOut">
               <a:rPr lang="en-US" smtClean="0"/>
-              <a:t>2/12/2020</a:t>
+              <a:t>2/14/2020</a:t>
             </a:fld>
             <a:endParaRPr lang="en-US"/>
           </a:p>
@@ -1639,7 +1639,7 @@
           <a:p>
             <a:fld id="{F58E7868-A9AD-480A-A6BB-C3687D73A28E}" type="slidenum">
               <a:rPr lang="en-US" smtClean="0"/>
-              <a:t>‹N°›</a:t>
+              <a:t>‹#›</a:t>
             </a:fld>
             <a:endParaRPr lang="en-US"/>
           </a:p>
@@ -1714,7 +1714,7 @@
           <a:p>
             <a:fld id="{B2814555-0B78-4B78-BD0A-6F287A823B12}" type="datetimeFigureOut">
               <a:rPr lang="en-US" smtClean="0"/>
-              <a:t>2/12/2020</a:t>
+              <a:t>2/14/2020</a:t>
             </a:fld>
             <a:endParaRPr lang="en-US"/>
           </a:p>
@@ -1756,7 +1756,7 @@
           <a:p>
             <a:fld id="{F58E7868-A9AD-480A-A6BB-C3687D73A28E}" type="slidenum">
               <a:rPr lang="en-US" smtClean="0"/>
-              <a:t>‹N°›</a:t>
+              <a:t>‹#›</a:t>
             </a:fld>
             <a:endParaRPr lang="en-US"/>
           </a:p>
@@ -1809,7 +1809,7 @@
           <a:p>
             <a:fld id="{B2814555-0B78-4B78-BD0A-6F287A823B12}" type="datetimeFigureOut">
               <a:rPr lang="en-US" smtClean="0"/>
-              <a:t>2/12/2020</a:t>
+              <a:t>2/14/2020</a:t>
             </a:fld>
             <a:endParaRPr lang="en-US"/>
           </a:p>
@@ -1851,7 +1851,7 @@
           <a:p>
             <a:fld id="{F58E7868-A9AD-480A-A6BB-C3687D73A28E}" type="slidenum">
               <a:rPr lang="en-US" smtClean="0"/>
-              <a:t>‹N°›</a:t>
+              <a:t>‹#›</a:t>
             </a:fld>
             <a:endParaRPr lang="en-US"/>
           </a:p>
@@ -2084,7 +2084,7 @@
           <a:p>
             <a:fld id="{B2814555-0B78-4B78-BD0A-6F287A823B12}" type="datetimeFigureOut">
               <a:rPr lang="en-US" smtClean="0"/>
-              <a:t>2/12/2020</a:t>
+              <a:t>2/14/2020</a:t>
             </a:fld>
             <a:endParaRPr lang="en-US"/>
           </a:p>
@@ -2126,7 +2126,7 @@
           <a:p>
             <a:fld id="{F58E7868-A9AD-480A-A6BB-C3687D73A28E}" type="slidenum">
               <a:rPr lang="en-US" smtClean="0"/>
-              <a:t>‹N°›</a:t>
+              <a:t>‹#›</a:t>
             </a:fld>
             <a:endParaRPr lang="en-US"/>
           </a:p>
@@ -2336,7 +2336,7 @@
           <a:p>
             <a:fld id="{B2814555-0B78-4B78-BD0A-6F287A823B12}" type="datetimeFigureOut">
               <a:rPr lang="en-US" smtClean="0"/>
-              <a:t>2/12/2020</a:t>
+              <a:t>2/14/2020</a:t>
             </a:fld>
             <a:endParaRPr lang="en-US"/>
           </a:p>
@@ -2378,7 +2378,7 @@
           <a:p>
             <a:fld id="{F58E7868-A9AD-480A-A6BB-C3687D73A28E}" type="slidenum">
               <a:rPr lang="en-US" smtClean="0"/>
-              <a:t>‹N°›</a:t>
+              <a:t>‹#›</a:t>
             </a:fld>
             <a:endParaRPr lang="en-US"/>
           </a:p>
@@ -2547,7 +2547,7 @@
           <a:p>
             <a:fld id="{B2814555-0B78-4B78-BD0A-6F287A823B12}" type="datetimeFigureOut">
               <a:rPr lang="en-US" smtClean="0"/>
-              <a:t>2/12/2020</a:t>
+              <a:t>2/14/2020</a:t>
             </a:fld>
             <a:endParaRPr lang="en-US"/>
           </a:p>
@@ -2625,7 +2625,7 @@
           <a:p>
             <a:fld id="{F58E7868-A9AD-480A-A6BB-C3687D73A28E}" type="slidenum">
               <a:rPr lang="en-US" smtClean="0"/>
-              <a:t>‹N°›</a:t>
+              <a:t>‹#›</a:t>
             </a:fld>
             <a:endParaRPr lang="en-US"/>
           </a:p>
@@ -2967,6 +2967,10 @@
           <a:bodyPr/>
           <a:lstStyle/>
           <a:p>
+            <a:r>
+              <a:rPr lang="nl-BE" smtClean="0"/>
+              <a:t>CaseManagement</a:t>
+            </a:r>
             <a:endParaRPr lang="en-US"/>
           </a:p>
         </p:txBody>
@@ -4787,7 +4791,7 @@
                 <a14:useLocalDpi xmlns:a14="http://schemas.microsoft.com/office/drawing/2010/main" val="0"/>
               </a:ext>
               <a:ext uri="{96DAC541-7B7A-43D3-8B79-37D633B846F1}">
-                <asvg:svgBlip xmlns:asvg="http://schemas.microsoft.com/office/drawing/2016/SVG/main" r:embed="rId6"/>
+                <asvg:svgBlip xmlns:asvg="http://schemas.microsoft.com/office/drawing/2016/SVG/main" xmlns="" r:embed="rId6"/>
               </a:ext>
             </a:extLst>
           </a:blip>

</xml_diff>

<commit_message>
Ticket 24 : Display case plan instances
</commit_message>
<xml_diff>
--- a/Architecture.pptx
+++ b/Architecture.pptx
@@ -9,7 +9,9 @@
     <p:sldId id="257" r:id="rId3"/>
     <p:sldId id="261" r:id="rId4"/>
     <p:sldId id="262" r:id="rId5"/>
-    <p:sldId id="263" r:id="rId6"/>
+    <p:sldId id="265" r:id="rId6"/>
+    <p:sldId id="264" r:id="rId7"/>
+    <p:sldId id="263" r:id="rId8"/>
   </p:sldIdLst>
   <p:sldSz cx="12192000" cy="6858000"/>
   <p:notesSz cx="6858000" cy="9144000"/>
@@ -245,7 +247,7 @@
           <a:p>
             <a:fld id="{B2814555-0B78-4B78-BD0A-6F287A823B12}" type="datetimeFigureOut">
               <a:rPr lang="en-US" smtClean="0"/>
-              <a:t>2/14/2020</a:t>
+              <a:t>2/20/2020</a:t>
             </a:fld>
             <a:endParaRPr lang="en-US"/>
           </a:p>
@@ -413,7 +415,7 @@
           <a:p>
             <a:fld id="{B2814555-0B78-4B78-BD0A-6F287A823B12}" type="datetimeFigureOut">
               <a:rPr lang="en-US" smtClean="0"/>
-              <a:t>2/14/2020</a:t>
+              <a:t>2/20/2020</a:t>
             </a:fld>
             <a:endParaRPr lang="en-US"/>
           </a:p>
@@ -591,7 +593,7 @@
           <a:p>
             <a:fld id="{B2814555-0B78-4B78-BD0A-6F287A823B12}" type="datetimeFigureOut">
               <a:rPr lang="en-US" smtClean="0"/>
-              <a:t>2/14/2020</a:t>
+              <a:t>2/20/2020</a:t>
             </a:fld>
             <a:endParaRPr lang="en-US"/>
           </a:p>
@@ -759,7 +761,7 @@
           <a:p>
             <a:fld id="{B2814555-0B78-4B78-BD0A-6F287A823B12}" type="datetimeFigureOut">
               <a:rPr lang="en-US" smtClean="0"/>
-              <a:t>2/14/2020</a:t>
+              <a:t>2/20/2020</a:t>
             </a:fld>
             <a:endParaRPr lang="en-US"/>
           </a:p>
@@ -1004,7 +1006,7 @@
           <a:p>
             <a:fld id="{B2814555-0B78-4B78-BD0A-6F287A823B12}" type="datetimeFigureOut">
               <a:rPr lang="en-US" smtClean="0"/>
-              <a:t>2/14/2020</a:t>
+              <a:t>2/20/2020</a:t>
             </a:fld>
             <a:endParaRPr lang="en-US"/>
           </a:p>
@@ -1233,7 +1235,7 @@
           <a:p>
             <a:fld id="{B2814555-0B78-4B78-BD0A-6F287A823B12}" type="datetimeFigureOut">
               <a:rPr lang="en-US" smtClean="0"/>
-              <a:t>2/14/2020</a:t>
+              <a:t>2/20/2020</a:t>
             </a:fld>
             <a:endParaRPr lang="en-US"/>
           </a:p>
@@ -1597,7 +1599,7 @@
           <a:p>
             <a:fld id="{B2814555-0B78-4B78-BD0A-6F287A823B12}" type="datetimeFigureOut">
               <a:rPr lang="en-US" smtClean="0"/>
-              <a:t>2/14/2020</a:t>
+              <a:t>2/20/2020</a:t>
             </a:fld>
             <a:endParaRPr lang="en-US"/>
           </a:p>
@@ -1714,7 +1716,7 @@
           <a:p>
             <a:fld id="{B2814555-0B78-4B78-BD0A-6F287A823B12}" type="datetimeFigureOut">
               <a:rPr lang="en-US" smtClean="0"/>
-              <a:t>2/14/2020</a:t>
+              <a:t>2/20/2020</a:t>
             </a:fld>
             <a:endParaRPr lang="en-US"/>
           </a:p>
@@ -1809,7 +1811,7 @@
           <a:p>
             <a:fld id="{B2814555-0B78-4B78-BD0A-6F287A823B12}" type="datetimeFigureOut">
               <a:rPr lang="en-US" smtClean="0"/>
-              <a:t>2/14/2020</a:t>
+              <a:t>2/20/2020</a:t>
             </a:fld>
             <a:endParaRPr lang="en-US"/>
           </a:p>
@@ -2084,7 +2086,7 @@
           <a:p>
             <a:fld id="{B2814555-0B78-4B78-BD0A-6F287A823B12}" type="datetimeFigureOut">
               <a:rPr lang="en-US" smtClean="0"/>
-              <a:t>2/14/2020</a:t>
+              <a:t>2/20/2020</a:t>
             </a:fld>
             <a:endParaRPr lang="en-US"/>
           </a:p>
@@ -2336,7 +2338,7 @@
           <a:p>
             <a:fld id="{B2814555-0B78-4B78-BD0A-6F287A823B12}" type="datetimeFigureOut">
               <a:rPr lang="en-US" smtClean="0"/>
-              <a:t>2/14/2020</a:t>
+              <a:t>2/20/2020</a:t>
             </a:fld>
             <a:endParaRPr lang="en-US"/>
           </a:p>
@@ -2547,7 +2549,7 @@
           <a:p>
             <a:fld id="{B2814555-0B78-4B78-BD0A-6F287A823B12}" type="datetimeFigureOut">
               <a:rPr lang="en-US" smtClean="0"/>
-              <a:t>2/14/2020</a:t>
+              <a:t>2/20/2020</a:t>
             </a:fld>
             <a:endParaRPr lang="en-US"/>
           </a:p>
@@ -4791,7 +4793,7 @@
                 <a14:useLocalDpi xmlns:a14="http://schemas.microsoft.com/office/drawing/2010/main" val="0"/>
               </a:ext>
               <a:ext uri="{96DAC541-7B7A-43D3-8B79-37D633B846F1}">
-                <asvg:svgBlip xmlns:asvg="http://schemas.microsoft.com/office/drawing/2016/SVG/main" xmlns="" r:embed="rId6"/>
+                <asvg:svgBlip xmlns="" xmlns:asvg="http://schemas.microsoft.com/office/drawing/2016/SVG/main" r:embed="rId6"/>
               </a:ext>
             </a:extLst>
           </a:blip>
@@ -5630,6 +5632,93 @@
           </a:fontRef>
         </p:style>
       </p:cxnSp>
+      <p:sp>
+        <p:nvSpPr>
+          <p:cNvPr id="50" name="Cylindre 196">
+            <a:extLst>
+              <a:ext uri="{FF2B5EF4-FFF2-40B4-BE49-F238E27FC236}">
+                <a16:creationId xmlns:a16="http://schemas.microsoft.com/office/drawing/2014/main" id="{264E002D-6B26-4FE8-9DC7-4294CF603EF0}"/>
+              </a:ext>
+            </a:extLst>
+          </p:cNvPr>
+          <p:cNvSpPr/>
+          <p:nvPr/>
+        </p:nvSpPr>
+        <p:spPr>
+          <a:xfrm rot="16200000">
+            <a:off x="6766493" y="1802310"/>
+            <a:ext cx="276999" cy="1462174"/>
+          </a:xfrm>
+          <a:prstGeom prst="can">
+            <a:avLst/>
+          </a:prstGeom>
+          <a:noFill/>
+          <a:ln>
+            <a:solidFill>
+              <a:schemeClr val="tx1"/>
+            </a:solidFill>
+          </a:ln>
+        </p:spPr>
+        <p:style>
+          <a:lnRef idx="2">
+            <a:schemeClr val="accent1">
+              <a:shade val="50000"/>
+            </a:schemeClr>
+          </a:lnRef>
+          <a:fillRef idx="1">
+            <a:schemeClr val="accent1"/>
+          </a:fillRef>
+          <a:effectRef idx="0">
+            <a:schemeClr val="accent1"/>
+          </a:effectRef>
+          <a:fontRef idx="minor">
+            <a:schemeClr val="lt1"/>
+          </a:fontRef>
+        </p:style>
+        <p:txBody>
+          <a:bodyPr rtlCol="0" anchor="ctr"/>
+          <a:lstStyle/>
+          <a:p>
+            <a:pPr algn="ctr"/>
+            <a:endParaRPr lang="fr-BE" dirty="0"/>
+          </a:p>
+        </p:txBody>
+      </p:sp>
+      <p:sp>
+        <p:nvSpPr>
+          <p:cNvPr id="51" name="ZoneTexte 197">
+            <a:extLst>
+              <a:ext uri="{FF2B5EF4-FFF2-40B4-BE49-F238E27FC236}">
+                <a16:creationId xmlns:a16="http://schemas.microsoft.com/office/drawing/2014/main" id="{EAC8BD04-CD4D-4F86-978D-02D0250982ED}"/>
+              </a:ext>
+            </a:extLst>
+          </p:cNvPr>
+          <p:cNvSpPr txBox="1"/>
+          <p:nvPr/>
+        </p:nvSpPr>
+        <p:spPr>
+          <a:xfrm>
+            <a:off x="6237346" y="2388901"/>
+            <a:ext cx="1109840" cy="276999"/>
+          </a:xfrm>
+          <a:prstGeom prst="rect">
+            <a:avLst/>
+          </a:prstGeom>
+          <a:noFill/>
+        </p:spPr>
+        <p:txBody>
+          <a:bodyPr wrap="square" rtlCol="0">
+            <a:spAutoFit/>
+          </a:bodyPr>
+          <a:lstStyle/>
+          <a:p>
+            <a:r>
+              <a:rPr lang="fr-BE" sz="1200" b="1" dirty="0"/>
+              <a:t>Case file</a:t>
+            </a:r>
+          </a:p>
+        </p:txBody>
+      </p:sp>
     </p:spTree>
     <p:extLst>
       <p:ext uri="{BB962C8B-B14F-4D97-AF65-F5344CB8AC3E}">
@@ -5674,7 +5763,7 @@
         </p:nvSpPr>
         <p:spPr>
           <a:xfrm>
-            <a:off x="497149" y="754602"/>
+            <a:off x="324027" y="755698"/>
             <a:ext cx="1606860" cy="457200"/>
           </a:xfrm>
           <a:prstGeom prst="rect">
@@ -5860,7 +5949,7 @@
         </p:nvSpPr>
         <p:spPr>
           <a:xfrm>
-            <a:off x="4919703" y="762370"/>
+            <a:off x="7532700" y="754602"/>
             <a:ext cx="1587624" cy="441663"/>
           </a:xfrm>
           <a:prstGeom prst="rect">
@@ -5948,7 +6037,7 @@
         </p:nvSpPr>
         <p:spPr>
           <a:xfrm>
-            <a:off x="2682541" y="1600200"/>
+            <a:off x="2682540" y="1935998"/>
             <a:ext cx="1491441" cy="601462"/>
           </a:xfrm>
           <a:prstGeom prst="rect">
@@ -6042,9 +6131,9 @@
           <p:nvPr/>
         </p:nvCxnSpPr>
         <p:spPr>
-          <a:xfrm>
-            <a:off x="3428262" y="1211802"/>
-            <a:ext cx="0" cy="388398"/>
+          <a:xfrm flipH="1">
+            <a:off x="3428261" y="1211802"/>
+            <a:ext cx="1" cy="724196"/>
           </a:xfrm>
           <a:prstGeom prst="straightConnector1">
             <a:avLst/>
@@ -6089,8 +6178,8 @@
         </p:nvCxnSpPr>
         <p:spPr>
           <a:xfrm flipH="1">
-            <a:off x="2104009" y="983202"/>
-            <a:ext cx="578532" cy="0"/>
+            <a:off x="1930887" y="983202"/>
+            <a:ext cx="751654" cy="1096"/>
           </a:xfrm>
           <a:prstGeom prst="straightConnector1">
             <a:avLst/>
@@ -6135,8 +6224,8 @@
         </p:nvCxnSpPr>
         <p:spPr>
           <a:xfrm flipH="1">
-            <a:off x="4173982" y="983202"/>
-            <a:ext cx="745721" cy="0"/>
+            <a:off x="4173982" y="975434"/>
+            <a:ext cx="3358718" cy="7768"/>
           </a:xfrm>
           <a:prstGeom prst="straightConnector1">
             <a:avLst/>
@@ -6286,9 +6375,9 @@
           <p:nvPr/>
         </p:nvCxnSpPr>
         <p:spPr>
-          <a:xfrm>
-            <a:off x="5713515" y="1204033"/>
-            <a:ext cx="0" cy="385068"/>
+          <a:xfrm flipH="1">
+            <a:off x="5713515" y="1196265"/>
+            <a:ext cx="2612997" cy="392836"/>
           </a:xfrm>
           <a:prstGeom prst="straightConnector1">
             <a:avLst/>
@@ -6426,9 +6515,9 @@
           <p:nvPr/>
         </p:nvCxnSpPr>
         <p:spPr>
-          <a:xfrm>
-            <a:off x="5713515" y="1204033"/>
-            <a:ext cx="1679359" cy="385068"/>
+          <a:xfrm flipH="1">
+            <a:off x="7392874" y="1196265"/>
+            <a:ext cx="933638" cy="392836"/>
           </a:xfrm>
           <a:prstGeom prst="straightConnector1">
             <a:avLst/>
@@ -6862,8 +6951,8 @@
         </p:nvCxnSpPr>
         <p:spPr>
           <a:xfrm>
-            <a:off x="5713515" y="1204033"/>
-            <a:ext cx="3358718" cy="385068"/>
+            <a:off x="8326512" y="1196265"/>
+            <a:ext cx="745721" cy="392836"/>
           </a:xfrm>
           <a:prstGeom prst="straightConnector1">
             <a:avLst/>
@@ -7007,8 +7096,8 @@
         </p:nvCxnSpPr>
         <p:spPr>
           <a:xfrm>
-            <a:off x="5713515" y="1204033"/>
-            <a:ext cx="5039545" cy="385068"/>
+            <a:off x="8326512" y="1196265"/>
+            <a:ext cx="2426548" cy="392836"/>
           </a:xfrm>
           <a:prstGeom prst="straightConnector1">
             <a:avLst/>
@@ -7595,13 +7684,13 @@
           <p:nvPr/>
         </p:nvCxnSpPr>
         <p:spPr>
-          <a:xfrm rot="10800000">
-            <a:off x="4919703" y="983203"/>
-            <a:ext cx="297672" cy="2687161"/>
+          <a:xfrm rot="10800000" flipH="1">
+            <a:off x="5217374" y="975435"/>
+            <a:ext cx="2315325" cy="2694929"/>
           </a:xfrm>
           <a:prstGeom prst="bentConnector3">
             <a:avLst>
-              <a:gd name="adj1" fmla="val 176796"/>
+              <a:gd name="adj1" fmla="val -21721"/>
             </a:avLst>
           </a:prstGeom>
           <a:ln>
@@ -7640,7 +7729,7 @@
         </p:nvSpPr>
         <p:spPr>
           <a:xfrm>
-            <a:off x="987635" y="5995114"/>
+            <a:off x="987635" y="6024974"/>
             <a:ext cx="1587624" cy="441663"/>
           </a:xfrm>
           <a:prstGeom prst="rect">
@@ -7821,7 +7910,7 @@
         </p:nvSpPr>
         <p:spPr>
           <a:xfrm>
-            <a:off x="987635" y="3449531"/>
+            <a:off x="2735194" y="3444982"/>
             <a:ext cx="1587624" cy="441663"/>
           </a:xfrm>
           <a:prstGeom prst="rect">
@@ -7941,12 +8030,12 @@
         </p:nvCxnSpPr>
         <p:spPr>
           <a:xfrm flipV="1">
-            <a:off x="2575259" y="983202"/>
-            <a:ext cx="2344444" cy="2687161"/>
+            <a:off x="4322818" y="975434"/>
+            <a:ext cx="3209882" cy="2690380"/>
           </a:xfrm>
           <a:prstGeom prst="bentConnector3">
             <a:avLst>
-              <a:gd name="adj1" fmla="val 79536"/>
+              <a:gd name="adj1" fmla="val 5198"/>
             </a:avLst>
           </a:prstGeom>
           <a:ln>
@@ -9784,6 +9873,2122 @@
 </file>
 
 <file path=ppt/slides/slide5.xml><?xml version="1.0" encoding="utf-8"?>
+<p:sld xmlns:a="http://schemas.openxmlformats.org/drawingml/2006/main" xmlns:r="http://schemas.openxmlformats.org/officeDocument/2006/relationships" xmlns:p="http://schemas.openxmlformats.org/presentationml/2006/main">
+  <p:cSld>
+    <p:spTree>
+      <p:nvGrpSpPr>
+        <p:cNvPr id="1" name=""/>
+        <p:cNvGrpSpPr/>
+        <p:nvPr/>
+      </p:nvGrpSpPr>
+      <p:grpSpPr>
+        <a:xfrm>
+          <a:off x="0" y="0"/>
+          <a:ext cx="0" cy="0"/>
+          <a:chOff x="0" y="0"/>
+          <a:chExt cx="0" cy="0"/>
+        </a:xfrm>
+      </p:grpSpPr>
+      <p:sp>
+        <p:nvSpPr>
+          <p:cNvPr id="5" name="Hexagon 4"/>
+          <p:cNvSpPr/>
+          <p:nvPr/>
+        </p:nvSpPr>
+        <p:spPr>
+          <a:xfrm>
+            <a:off x="2169621" y="249380"/>
+            <a:ext cx="7198823" cy="5627717"/>
+          </a:xfrm>
+          <a:prstGeom prst="hexagon">
+            <a:avLst/>
+          </a:prstGeom>
+          <a:noFill/>
+          <a:ln>
+            <a:solidFill>
+              <a:schemeClr val="tx1"/>
+            </a:solidFill>
+          </a:ln>
+        </p:spPr>
+        <p:style>
+          <a:lnRef idx="2">
+            <a:schemeClr val="accent1">
+              <a:shade val="50000"/>
+            </a:schemeClr>
+          </a:lnRef>
+          <a:fillRef idx="1">
+            <a:schemeClr val="accent1"/>
+          </a:fillRef>
+          <a:effectRef idx="0">
+            <a:schemeClr val="accent1"/>
+          </a:effectRef>
+          <a:fontRef idx="minor">
+            <a:schemeClr val="lt1"/>
+          </a:fontRef>
+        </p:style>
+        <p:txBody>
+          <a:bodyPr rtlCol="0" anchor="ctr"/>
+          <a:lstStyle/>
+          <a:p>
+            <a:pPr algn="ctr"/>
+            <a:endParaRPr lang="en-US"/>
+          </a:p>
+        </p:txBody>
+      </p:sp>
+      <p:sp>
+        <p:nvSpPr>
+          <p:cNvPr id="6" name="Hexagon 5"/>
+          <p:cNvSpPr/>
+          <p:nvPr/>
+        </p:nvSpPr>
+        <p:spPr>
+          <a:xfrm>
+            <a:off x="2952402" y="870062"/>
+            <a:ext cx="5633259" cy="4386351"/>
+          </a:xfrm>
+          <a:prstGeom prst="hexagon">
+            <a:avLst/>
+          </a:prstGeom>
+          <a:noFill/>
+          <a:ln>
+            <a:solidFill>
+              <a:schemeClr val="tx1"/>
+            </a:solidFill>
+          </a:ln>
+        </p:spPr>
+        <p:style>
+          <a:lnRef idx="2">
+            <a:schemeClr val="accent1">
+              <a:shade val="50000"/>
+            </a:schemeClr>
+          </a:lnRef>
+          <a:fillRef idx="1">
+            <a:schemeClr val="accent1"/>
+          </a:fillRef>
+          <a:effectRef idx="0">
+            <a:schemeClr val="accent1"/>
+          </a:effectRef>
+          <a:fontRef idx="minor">
+            <a:schemeClr val="lt1"/>
+          </a:fontRef>
+        </p:style>
+        <p:txBody>
+          <a:bodyPr rtlCol="0" anchor="ctr"/>
+          <a:lstStyle/>
+          <a:p>
+            <a:pPr algn="ctr"/>
+            <a:endParaRPr lang="en-US"/>
+          </a:p>
+        </p:txBody>
+      </p:sp>
+      <p:sp>
+        <p:nvSpPr>
+          <p:cNvPr id="7" name="Rectangle 6">
+            <a:extLst>
+              <a:ext uri="{FF2B5EF4-FFF2-40B4-BE49-F238E27FC236}">
+                <a16:creationId xmlns:a16="http://schemas.microsoft.com/office/drawing/2014/main" id="{29B44116-52B5-492D-8C36-54507C947C11}"/>
+              </a:ext>
+            </a:extLst>
+          </p:cNvPr>
+          <p:cNvSpPr/>
+          <p:nvPr/>
+        </p:nvSpPr>
+        <p:spPr>
+          <a:xfrm>
+            <a:off x="7682729" y="372328"/>
+            <a:ext cx="1294323" cy="646331"/>
+          </a:xfrm>
+          <a:prstGeom prst="rect">
+            <a:avLst/>
+          </a:prstGeom>
+          <a:solidFill>
+            <a:schemeClr val="bg1"/>
+          </a:solidFill>
+          <a:ln>
+            <a:solidFill>
+              <a:schemeClr val="tx1"/>
+            </a:solidFill>
+          </a:ln>
+        </p:spPr>
+        <p:style>
+          <a:lnRef idx="2">
+            <a:schemeClr val="accent1">
+              <a:shade val="50000"/>
+            </a:schemeClr>
+          </a:lnRef>
+          <a:fillRef idx="1">
+            <a:schemeClr val="accent1"/>
+          </a:fillRef>
+          <a:effectRef idx="0">
+            <a:schemeClr val="accent1"/>
+          </a:effectRef>
+          <a:fontRef idx="minor">
+            <a:schemeClr val="lt1"/>
+          </a:fontRef>
+        </p:style>
+        <p:txBody>
+          <a:bodyPr rtlCol="0" anchor="ctr"/>
+          <a:lstStyle/>
+          <a:p>
+            <a:pPr algn="ctr"/>
+            <a:r>
+              <a:rPr lang="nl-BE" sz="1200" b="1" dirty="0" err="1" smtClean="0">
+                <a:solidFill>
+                  <a:schemeClr val="tx1"/>
+                </a:solidFill>
+              </a:rPr>
+              <a:t>CaseFile</a:t>
+            </a:r>
+            <a:endParaRPr lang="nl-BE" sz="1200" b="1" dirty="0" smtClean="0">
+              <a:solidFill>
+                <a:schemeClr val="tx1"/>
+              </a:solidFill>
+            </a:endParaRPr>
+          </a:p>
+          <a:p>
+            <a:pPr algn="ctr"/>
+            <a:r>
+              <a:rPr lang="nl-BE" sz="1200" b="1" dirty="0" err="1" smtClean="0">
+                <a:solidFill>
+                  <a:schemeClr val="tx1"/>
+                </a:solidFill>
+              </a:rPr>
+              <a:t>EventConsumer</a:t>
+            </a:r>
+            <a:endParaRPr lang="en-US" sz="1200" b="1" dirty="0">
+              <a:solidFill>
+                <a:schemeClr val="tx1"/>
+              </a:solidFill>
+            </a:endParaRPr>
+          </a:p>
+        </p:txBody>
+      </p:sp>
+      <p:sp>
+        <p:nvSpPr>
+          <p:cNvPr id="8" name="Cylindre 196">
+            <a:extLst>
+              <a:ext uri="{FF2B5EF4-FFF2-40B4-BE49-F238E27FC236}">
+                <a16:creationId xmlns:a16="http://schemas.microsoft.com/office/drawing/2014/main" id="{264E002D-6B26-4FE8-9DC7-4294CF603EF0}"/>
+              </a:ext>
+            </a:extLst>
+          </p:cNvPr>
+          <p:cNvSpPr/>
+          <p:nvPr/>
+        </p:nvSpPr>
+        <p:spPr>
+          <a:xfrm rot="16200000">
+            <a:off x="10365906" y="-367361"/>
+            <a:ext cx="276999" cy="1462174"/>
+          </a:xfrm>
+          <a:prstGeom prst="can">
+            <a:avLst/>
+          </a:prstGeom>
+          <a:noFill/>
+          <a:ln>
+            <a:solidFill>
+              <a:schemeClr val="tx1"/>
+            </a:solidFill>
+          </a:ln>
+        </p:spPr>
+        <p:style>
+          <a:lnRef idx="2">
+            <a:schemeClr val="accent1">
+              <a:shade val="50000"/>
+            </a:schemeClr>
+          </a:lnRef>
+          <a:fillRef idx="1">
+            <a:schemeClr val="accent1"/>
+          </a:fillRef>
+          <a:effectRef idx="0">
+            <a:schemeClr val="accent1"/>
+          </a:effectRef>
+          <a:fontRef idx="minor">
+            <a:schemeClr val="lt1"/>
+          </a:fontRef>
+        </p:style>
+        <p:txBody>
+          <a:bodyPr rtlCol="0" anchor="ctr"/>
+          <a:lstStyle/>
+          <a:p>
+            <a:pPr algn="ctr"/>
+            <a:endParaRPr lang="fr-BE" dirty="0"/>
+          </a:p>
+        </p:txBody>
+      </p:sp>
+      <p:sp>
+        <p:nvSpPr>
+          <p:cNvPr id="9" name="ZoneTexte 197">
+            <a:extLst>
+              <a:ext uri="{FF2B5EF4-FFF2-40B4-BE49-F238E27FC236}">
+                <a16:creationId xmlns:a16="http://schemas.microsoft.com/office/drawing/2014/main" id="{EAC8BD04-CD4D-4F86-978D-02D0250982ED}"/>
+              </a:ext>
+            </a:extLst>
+          </p:cNvPr>
+          <p:cNvSpPr txBox="1"/>
+          <p:nvPr/>
+        </p:nvSpPr>
+        <p:spPr>
+          <a:xfrm>
+            <a:off x="9836759" y="219230"/>
+            <a:ext cx="1109840" cy="276999"/>
+          </a:xfrm>
+          <a:prstGeom prst="rect">
+            <a:avLst/>
+          </a:prstGeom>
+          <a:noFill/>
+        </p:spPr>
+        <p:txBody>
+          <a:bodyPr wrap="square" rtlCol="0">
+            <a:spAutoFit/>
+          </a:bodyPr>
+          <a:lstStyle/>
+          <a:p>
+            <a:r>
+              <a:rPr lang="fr-BE" sz="1200" b="1" dirty="0" smtClean="0"/>
+              <a:t>Case file</a:t>
+            </a:r>
+            <a:endParaRPr lang="fr-BE" sz="1200" b="1" dirty="0"/>
+          </a:p>
+        </p:txBody>
+      </p:sp>
+      <p:cxnSp>
+        <p:nvCxnSpPr>
+          <p:cNvPr id="11" name="Elbow Connector 10"/>
+          <p:cNvCxnSpPr>
+            <a:stCxn id="9" idx="2"/>
+            <a:endCxn id="7" idx="3"/>
+          </p:cNvCxnSpPr>
+          <p:nvPr/>
+        </p:nvCxnSpPr>
+        <p:spPr>
+          <a:xfrm rot="5400000">
+            <a:off x="9584734" y="-111452"/>
+            <a:ext cx="199265" cy="1414627"/>
+          </a:xfrm>
+          <a:prstGeom prst="bentConnector2">
+            <a:avLst/>
+          </a:prstGeom>
+          <a:ln>
+            <a:solidFill>
+              <a:schemeClr val="tx1"/>
+            </a:solidFill>
+            <a:tailEnd type="triangle"/>
+          </a:ln>
+        </p:spPr>
+        <p:style>
+          <a:lnRef idx="1">
+            <a:schemeClr val="accent1"/>
+          </a:lnRef>
+          <a:fillRef idx="0">
+            <a:schemeClr val="accent1"/>
+          </a:fillRef>
+          <a:effectRef idx="0">
+            <a:schemeClr val="accent1"/>
+          </a:effectRef>
+          <a:fontRef idx="minor">
+            <a:schemeClr val="tx1"/>
+          </a:fontRef>
+        </p:style>
+      </p:cxnSp>
+      <p:sp>
+        <p:nvSpPr>
+          <p:cNvPr id="14" name="Rectangle 13">
+            <a:extLst>
+              <a:ext uri="{FF2B5EF4-FFF2-40B4-BE49-F238E27FC236}">
+                <a16:creationId xmlns:a16="http://schemas.microsoft.com/office/drawing/2014/main" id="{29B44116-52B5-492D-8C36-54507C947C11}"/>
+              </a:ext>
+            </a:extLst>
+          </p:cNvPr>
+          <p:cNvSpPr/>
+          <p:nvPr/>
+        </p:nvSpPr>
+        <p:spPr>
+          <a:xfrm>
+            <a:off x="5033739" y="1522255"/>
+            <a:ext cx="1294323" cy="646331"/>
+          </a:xfrm>
+          <a:prstGeom prst="rect">
+            <a:avLst/>
+          </a:prstGeom>
+          <a:solidFill>
+            <a:schemeClr val="bg1"/>
+          </a:solidFill>
+          <a:ln>
+            <a:solidFill>
+              <a:schemeClr val="tx1"/>
+            </a:solidFill>
+          </a:ln>
+        </p:spPr>
+        <p:style>
+          <a:lnRef idx="2">
+            <a:schemeClr val="accent1">
+              <a:shade val="50000"/>
+            </a:schemeClr>
+          </a:lnRef>
+          <a:fillRef idx="1">
+            <a:schemeClr val="accent1"/>
+          </a:fillRef>
+          <a:effectRef idx="0">
+            <a:schemeClr val="accent1"/>
+          </a:effectRef>
+          <a:fontRef idx="minor">
+            <a:schemeClr val="lt1"/>
+          </a:fontRef>
+        </p:style>
+        <p:txBody>
+          <a:bodyPr rtlCol="0" anchor="ctr"/>
+          <a:lstStyle/>
+          <a:p>
+            <a:pPr algn="ctr"/>
+            <a:r>
+              <a:rPr lang="nl-BE" sz="1200" b="1" dirty="0" err="1" smtClean="0">
+                <a:solidFill>
+                  <a:schemeClr val="tx1"/>
+                </a:solidFill>
+              </a:rPr>
+              <a:t>CasePlanService</a:t>
+            </a:r>
+            <a:endParaRPr lang="en-US" sz="1200" b="1" dirty="0">
+              <a:solidFill>
+                <a:schemeClr val="tx1"/>
+              </a:solidFill>
+            </a:endParaRPr>
+          </a:p>
+        </p:txBody>
+      </p:sp>
+      <p:sp>
+        <p:nvSpPr>
+          <p:cNvPr id="15" name="Rectangle 14">
+            <a:extLst>
+              <a:ext uri="{FF2B5EF4-FFF2-40B4-BE49-F238E27FC236}">
+                <a16:creationId xmlns:a16="http://schemas.microsoft.com/office/drawing/2014/main" id="{29B44116-52B5-492D-8C36-54507C947C11}"/>
+              </a:ext>
+            </a:extLst>
+          </p:cNvPr>
+          <p:cNvSpPr/>
+          <p:nvPr/>
+        </p:nvSpPr>
+        <p:spPr>
+          <a:xfrm>
+            <a:off x="3332900" y="2740071"/>
+            <a:ext cx="1630298" cy="646331"/>
+          </a:xfrm>
+          <a:prstGeom prst="rect">
+            <a:avLst/>
+          </a:prstGeom>
+          <a:solidFill>
+            <a:schemeClr val="bg1"/>
+          </a:solidFill>
+          <a:ln>
+            <a:solidFill>
+              <a:schemeClr val="tx1"/>
+            </a:solidFill>
+          </a:ln>
+        </p:spPr>
+        <p:style>
+          <a:lnRef idx="2">
+            <a:schemeClr val="accent1">
+              <a:shade val="50000"/>
+            </a:schemeClr>
+          </a:lnRef>
+          <a:fillRef idx="1">
+            <a:schemeClr val="accent1"/>
+          </a:fillRef>
+          <a:effectRef idx="0">
+            <a:schemeClr val="accent1"/>
+          </a:effectRef>
+          <a:fontRef idx="minor">
+            <a:schemeClr val="lt1"/>
+          </a:fontRef>
+        </p:style>
+        <p:txBody>
+          <a:bodyPr rtlCol="0" anchor="ctr"/>
+          <a:lstStyle/>
+          <a:p>
+            <a:pPr algn="ctr"/>
+            <a:r>
+              <a:rPr lang="nl-BE" sz="1200" b="1" dirty="0" smtClean="0">
+                <a:solidFill>
+                  <a:schemeClr val="tx1"/>
+                </a:solidFill>
+              </a:rPr>
+              <a:t>&lt;&lt;</a:t>
+            </a:r>
+            <a:r>
+              <a:rPr lang="nl-BE" sz="1200" b="1" dirty="0" err="1" smtClean="0">
+                <a:solidFill>
+                  <a:schemeClr val="tx1"/>
+                </a:solidFill>
+              </a:rPr>
+              <a:t>Aggregate</a:t>
+            </a:r>
+            <a:r>
+              <a:rPr lang="nl-BE" sz="1200" b="1" dirty="0" smtClean="0">
+                <a:solidFill>
+                  <a:schemeClr val="tx1"/>
+                </a:solidFill>
+              </a:rPr>
+              <a:t> root&gt;&gt;</a:t>
+            </a:r>
+          </a:p>
+          <a:p>
+            <a:pPr algn="ctr"/>
+            <a:r>
+              <a:rPr lang="nl-BE" sz="1200" b="1" dirty="0" smtClean="0">
+                <a:solidFill>
+                  <a:schemeClr val="tx1"/>
+                </a:solidFill>
+              </a:rPr>
+              <a:t>Case plan</a:t>
+            </a:r>
+            <a:endParaRPr lang="en-US" sz="1200" b="1" dirty="0">
+              <a:solidFill>
+                <a:schemeClr val="tx1"/>
+              </a:solidFill>
+            </a:endParaRPr>
+          </a:p>
+        </p:txBody>
+      </p:sp>
+      <p:cxnSp>
+        <p:nvCxnSpPr>
+          <p:cNvPr id="17" name="Straight Arrow Connector 16"/>
+          <p:cNvCxnSpPr>
+            <a:stCxn id="14" idx="2"/>
+            <a:endCxn id="15" idx="0"/>
+          </p:cNvCxnSpPr>
+          <p:nvPr/>
+        </p:nvCxnSpPr>
+        <p:spPr>
+          <a:xfrm flipH="1">
+            <a:off x="4148049" y="2168586"/>
+            <a:ext cx="1532852" cy="571485"/>
+          </a:xfrm>
+          <a:prstGeom prst="straightConnector1">
+            <a:avLst/>
+          </a:prstGeom>
+          <a:ln>
+            <a:solidFill>
+              <a:schemeClr val="tx1"/>
+            </a:solidFill>
+            <a:tailEnd type="triangle"/>
+          </a:ln>
+        </p:spPr>
+        <p:style>
+          <a:lnRef idx="1">
+            <a:schemeClr val="accent1"/>
+          </a:lnRef>
+          <a:fillRef idx="0">
+            <a:schemeClr val="accent1"/>
+          </a:fillRef>
+          <a:effectRef idx="0">
+            <a:schemeClr val="accent1"/>
+          </a:effectRef>
+          <a:fontRef idx="minor">
+            <a:schemeClr val="tx1"/>
+          </a:fontRef>
+        </p:style>
+      </p:cxnSp>
+      <p:sp>
+        <p:nvSpPr>
+          <p:cNvPr id="18" name="Rectangle 17">
+            <a:extLst>
+              <a:ext uri="{FF2B5EF4-FFF2-40B4-BE49-F238E27FC236}">
+                <a16:creationId xmlns:a16="http://schemas.microsoft.com/office/drawing/2014/main" id="{29B44116-52B5-492D-8C36-54507C947C11}"/>
+              </a:ext>
+            </a:extLst>
+          </p:cNvPr>
+          <p:cNvSpPr/>
+          <p:nvPr/>
+        </p:nvSpPr>
+        <p:spPr>
+          <a:xfrm>
+            <a:off x="3942536" y="3884136"/>
+            <a:ext cx="1630298" cy="646331"/>
+          </a:xfrm>
+          <a:prstGeom prst="rect">
+            <a:avLst/>
+          </a:prstGeom>
+          <a:solidFill>
+            <a:schemeClr val="bg1"/>
+          </a:solidFill>
+          <a:ln>
+            <a:solidFill>
+              <a:schemeClr val="tx1"/>
+            </a:solidFill>
+          </a:ln>
+        </p:spPr>
+        <p:style>
+          <a:lnRef idx="2">
+            <a:schemeClr val="accent1">
+              <a:shade val="50000"/>
+            </a:schemeClr>
+          </a:lnRef>
+          <a:fillRef idx="1">
+            <a:schemeClr val="accent1"/>
+          </a:fillRef>
+          <a:effectRef idx="0">
+            <a:schemeClr val="accent1"/>
+          </a:effectRef>
+          <a:fontRef idx="minor">
+            <a:schemeClr val="lt1"/>
+          </a:fontRef>
+        </p:style>
+        <p:txBody>
+          <a:bodyPr rtlCol="0" anchor="ctr"/>
+          <a:lstStyle/>
+          <a:p>
+            <a:pPr algn="ctr"/>
+            <a:r>
+              <a:rPr lang="nl-BE" sz="1200" b="1" dirty="0" err="1" smtClean="0">
+                <a:solidFill>
+                  <a:schemeClr val="tx1"/>
+                </a:solidFill>
+              </a:rPr>
+              <a:t>CasePlanQuery</a:t>
+            </a:r>
+            <a:endParaRPr lang="nl-BE" sz="1200" b="1" dirty="0" smtClean="0">
+              <a:solidFill>
+                <a:schemeClr val="tx1"/>
+              </a:solidFill>
+            </a:endParaRPr>
+          </a:p>
+          <a:p>
+            <a:pPr algn="ctr"/>
+            <a:r>
+              <a:rPr lang="nl-BE" sz="1200" b="1" dirty="0" err="1" smtClean="0">
+                <a:solidFill>
+                  <a:schemeClr val="tx1"/>
+                </a:solidFill>
+              </a:rPr>
+              <a:t>Repository</a:t>
+            </a:r>
+            <a:endParaRPr lang="en-US" sz="1200" b="1" dirty="0">
+              <a:solidFill>
+                <a:schemeClr val="tx1"/>
+              </a:solidFill>
+            </a:endParaRPr>
+          </a:p>
+        </p:txBody>
+      </p:sp>
+      <p:sp>
+        <p:nvSpPr>
+          <p:cNvPr id="19" name="Rectangle 18">
+            <a:extLst>
+              <a:ext uri="{FF2B5EF4-FFF2-40B4-BE49-F238E27FC236}">
+                <a16:creationId xmlns:a16="http://schemas.microsoft.com/office/drawing/2014/main" id="{29B44116-52B5-492D-8C36-54507C947C11}"/>
+              </a:ext>
+            </a:extLst>
+          </p:cNvPr>
+          <p:cNvSpPr/>
+          <p:nvPr/>
+        </p:nvSpPr>
+        <p:spPr>
+          <a:xfrm>
+            <a:off x="5780921" y="3909776"/>
+            <a:ext cx="1630298" cy="646331"/>
+          </a:xfrm>
+          <a:prstGeom prst="rect">
+            <a:avLst/>
+          </a:prstGeom>
+          <a:solidFill>
+            <a:schemeClr val="bg1"/>
+          </a:solidFill>
+          <a:ln>
+            <a:solidFill>
+              <a:schemeClr val="tx1"/>
+            </a:solidFill>
+          </a:ln>
+        </p:spPr>
+        <p:style>
+          <a:lnRef idx="2">
+            <a:schemeClr val="accent1">
+              <a:shade val="50000"/>
+            </a:schemeClr>
+          </a:lnRef>
+          <a:fillRef idx="1">
+            <a:schemeClr val="accent1"/>
+          </a:fillRef>
+          <a:effectRef idx="0">
+            <a:schemeClr val="accent1"/>
+          </a:effectRef>
+          <a:fontRef idx="minor">
+            <a:schemeClr val="lt1"/>
+          </a:fontRef>
+        </p:style>
+        <p:txBody>
+          <a:bodyPr rtlCol="0" anchor="ctr"/>
+          <a:lstStyle/>
+          <a:p>
+            <a:pPr algn="ctr"/>
+            <a:r>
+              <a:rPr lang="nl-BE" sz="1200" b="1" dirty="0" err="1" smtClean="0">
+                <a:solidFill>
+                  <a:schemeClr val="tx1"/>
+                </a:solidFill>
+              </a:rPr>
+              <a:t>CasePlanCommand</a:t>
+            </a:r>
+            <a:endParaRPr lang="nl-BE" sz="1200" b="1" dirty="0" smtClean="0">
+              <a:solidFill>
+                <a:schemeClr val="tx1"/>
+              </a:solidFill>
+            </a:endParaRPr>
+          </a:p>
+          <a:p>
+            <a:pPr algn="ctr"/>
+            <a:r>
+              <a:rPr lang="nl-BE" sz="1200" b="1" dirty="0" err="1" smtClean="0">
+                <a:solidFill>
+                  <a:schemeClr val="tx1"/>
+                </a:solidFill>
+              </a:rPr>
+              <a:t>Repository</a:t>
+            </a:r>
+            <a:endParaRPr lang="en-US" sz="1200" b="1" dirty="0">
+              <a:solidFill>
+                <a:schemeClr val="tx1"/>
+              </a:solidFill>
+            </a:endParaRPr>
+          </a:p>
+        </p:txBody>
+      </p:sp>
+      <p:sp>
+        <p:nvSpPr>
+          <p:cNvPr id="20" name="Rectangle 19">
+            <a:extLst>
+              <a:ext uri="{FF2B5EF4-FFF2-40B4-BE49-F238E27FC236}">
+                <a16:creationId xmlns:a16="http://schemas.microsoft.com/office/drawing/2014/main" id="{29B44116-52B5-492D-8C36-54507C947C11}"/>
+              </a:ext>
+            </a:extLst>
+          </p:cNvPr>
+          <p:cNvSpPr/>
+          <p:nvPr/>
+        </p:nvSpPr>
+        <p:spPr>
+          <a:xfrm>
+            <a:off x="5133759" y="5351366"/>
+            <a:ext cx="1294323" cy="646331"/>
+          </a:xfrm>
+          <a:prstGeom prst="rect">
+            <a:avLst/>
+          </a:prstGeom>
+          <a:solidFill>
+            <a:schemeClr val="bg1"/>
+          </a:solidFill>
+          <a:ln>
+            <a:solidFill>
+              <a:schemeClr val="tx1"/>
+            </a:solidFill>
+          </a:ln>
+        </p:spPr>
+        <p:style>
+          <a:lnRef idx="2">
+            <a:schemeClr val="accent1">
+              <a:shade val="50000"/>
+            </a:schemeClr>
+          </a:lnRef>
+          <a:fillRef idx="1">
+            <a:schemeClr val="accent1"/>
+          </a:fillRef>
+          <a:effectRef idx="0">
+            <a:schemeClr val="accent1"/>
+          </a:effectRef>
+          <a:fontRef idx="minor">
+            <a:schemeClr val="lt1"/>
+          </a:fontRef>
+        </p:style>
+        <p:txBody>
+          <a:bodyPr rtlCol="0" anchor="ctr"/>
+          <a:lstStyle/>
+          <a:p>
+            <a:pPr algn="ctr"/>
+            <a:r>
+              <a:rPr lang="nl-BE" sz="1200" b="1" dirty="0" smtClean="0">
+                <a:solidFill>
+                  <a:schemeClr val="tx1"/>
+                </a:solidFill>
+              </a:rPr>
+              <a:t>Database adapter</a:t>
+            </a:r>
+            <a:endParaRPr lang="en-US" sz="1200" b="1" dirty="0">
+              <a:solidFill>
+                <a:schemeClr val="tx1"/>
+              </a:solidFill>
+            </a:endParaRPr>
+          </a:p>
+        </p:txBody>
+      </p:sp>
+      <p:sp>
+        <p:nvSpPr>
+          <p:cNvPr id="21" name="Can 7">
+            <a:extLst>
+              <a:ext uri="{FF2B5EF4-FFF2-40B4-BE49-F238E27FC236}">
+                <a16:creationId xmlns:a16="http://schemas.microsoft.com/office/drawing/2014/main" id="{3073FF87-BBB1-4674-831A-FD9063FA876B}"/>
+              </a:ext>
+            </a:extLst>
+          </p:cNvPr>
+          <p:cNvSpPr/>
+          <p:nvPr/>
+        </p:nvSpPr>
+        <p:spPr>
+          <a:xfrm>
+            <a:off x="5167627" y="6233418"/>
+            <a:ext cx="1026546" cy="528722"/>
+          </a:xfrm>
+          <a:prstGeom prst="can">
+            <a:avLst/>
+          </a:prstGeom>
+          <a:noFill/>
+          <a:ln>
+            <a:solidFill>
+              <a:schemeClr val="tx1"/>
+            </a:solidFill>
+            <a:prstDash val="dash"/>
+          </a:ln>
+        </p:spPr>
+        <p:style>
+          <a:lnRef idx="2">
+            <a:schemeClr val="accent1">
+              <a:shade val="50000"/>
+            </a:schemeClr>
+          </a:lnRef>
+          <a:fillRef idx="1">
+            <a:schemeClr val="accent1"/>
+          </a:fillRef>
+          <a:effectRef idx="0">
+            <a:schemeClr val="accent1"/>
+          </a:effectRef>
+          <a:fontRef idx="minor">
+            <a:schemeClr val="lt1"/>
+          </a:fontRef>
+        </p:style>
+        <p:txBody>
+          <a:bodyPr rtlCol="0" anchor="ctr"/>
+          <a:lstStyle/>
+          <a:p>
+            <a:pPr algn="ctr"/>
+            <a:r>
+              <a:rPr lang="nl-BE" sz="1200" b="1" dirty="0" err="1" smtClean="0">
+                <a:solidFill>
+                  <a:schemeClr val="tx1"/>
+                </a:solidFill>
+              </a:rPr>
+              <a:t>CasePlan</a:t>
+            </a:r>
+            <a:r>
+              <a:rPr lang="nl-BE" sz="1200" b="1" dirty="0" smtClean="0">
+                <a:solidFill>
+                  <a:schemeClr val="tx1"/>
+                </a:solidFill>
+              </a:rPr>
+              <a:t> DB</a:t>
+            </a:r>
+            <a:endParaRPr lang="en-US" sz="1200" b="1" dirty="0">
+              <a:solidFill>
+                <a:schemeClr val="tx1"/>
+              </a:solidFill>
+            </a:endParaRPr>
+          </a:p>
+        </p:txBody>
+      </p:sp>
+      <p:cxnSp>
+        <p:nvCxnSpPr>
+          <p:cNvPr id="23" name="Straight Arrow Connector 22"/>
+          <p:cNvCxnSpPr>
+            <a:stCxn id="14" idx="2"/>
+            <a:endCxn id="19" idx="0"/>
+          </p:cNvCxnSpPr>
+          <p:nvPr/>
+        </p:nvCxnSpPr>
+        <p:spPr>
+          <a:xfrm>
+            <a:off x="5680901" y="2168586"/>
+            <a:ext cx="915169" cy="1741190"/>
+          </a:xfrm>
+          <a:prstGeom prst="straightConnector1">
+            <a:avLst/>
+          </a:prstGeom>
+          <a:ln>
+            <a:solidFill>
+              <a:schemeClr val="tx1"/>
+            </a:solidFill>
+            <a:tailEnd type="triangle"/>
+          </a:ln>
+        </p:spPr>
+        <p:style>
+          <a:lnRef idx="1">
+            <a:schemeClr val="accent1"/>
+          </a:lnRef>
+          <a:fillRef idx="0">
+            <a:schemeClr val="accent1"/>
+          </a:fillRef>
+          <a:effectRef idx="0">
+            <a:schemeClr val="accent1"/>
+          </a:effectRef>
+          <a:fontRef idx="minor">
+            <a:schemeClr val="tx1"/>
+          </a:fontRef>
+        </p:style>
+      </p:cxnSp>
+      <p:cxnSp>
+        <p:nvCxnSpPr>
+          <p:cNvPr id="24" name="Straight Arrow Connector 23"/>
+          <p:cNvCxnSpPr>
+            <a:stCxn id="14" idx="2"/>
+            <a:endCxn id="18" idx="0"/>
+          </p:cNvCxnSpPr>
+          <p:nvPr/>
+        </p:nvCxnSpPr>
+        <p:spPr>
+          <a:xfrm flipH="1">
+            <a:off x="4757685" y="2168586"/>
+            <a:ext cx="923216" cy="1715550"/>
+          </a:xfrm>
+          <a:prstGeom prst="straightConnector1">
+            <a:avLst/>
+          </a:prstGeom>
+          <a:ln>
+            <a:solidFill>
+              <a:schemeClr val="tx1"/>
+            </a:solidFill>
+            <a:tailEnd type="triangle"/>
+          </a:ln>
+        </p:spPr>
+        <p:style>
+          <a:lnRef idx="1">
+            <a:schemeClr val="accent1"/>
+          </a:lnRef>
+          <a:fillRef idx="0">
+            <a:schemeClr val="accent1"/>
+          </a:fillRef>
+          <a:effectRef idx="0">
+            <a:schemeClr val="accent1"/>
+          </a:effectRef>
+          <a:fontRef idx="minor">
+            <a:schemeClr val="tx1"/>
+          </a:fontRef>
+        </p:style>
+      </p:cxnSp>
+      <p:cxnSp>
+        <p:nvCxnSpPr>
+          <p:cNvPr id="28" name="Straight Arrow Connector 27"/>
+          <p:cNvCxnSpPr>
+            <a:stCxn id="20" idx="0"/>
+            <a:endCxn id="19" idx="2"/>
+          </p:cNvCxnSpPr>
+          <p:nvPr/>
+        </p:nvCxnSpPr>
+        <p:spPr>
+          <a:xfrm flipV="1">
+            <a:off x="5780921" y="4556107"/>
+            <a:ext cx="815149" cy="795259"/>
+          </a:xfrm>
+          <a:prstGeom prst="straightConnector1">
+            <a:avLst/>
+          </a:prstGeom>
+          <a:ln>
+            <a:solidFill>
+              <a:schemeClr val="tx1"/>
+            </a:solidFill>
+            <a:tailEnd type="triangle"/>
+          </a:ln>
+        </p:spPr>
+        <p:style>
+          <a:lnRef idx="1">
+            <a:schemeClr val="accent1"/>
+          </a:lnRef>
+          <a:fillRef idx="0">
+            <a:schemeClr val="accent1"/>
+          </a:fillRef>
+          <a:effectRef idx="0">
+            <a:schemeClr val="accent1"/>
+          </a:effectRef>
+          <a:fontRef idx="minor">
+            <a:schemeClr val="tx1"/>
+          </a:fontRef>
+        </p:style>
+      </p:cxnSp>
+      <p:cxnSp>
+        <p:nvCxnSpPr>
+          <p:cNvPr id="31" name="Straight Arrow Connector 30"/>
+          <p:cNvCxnSpPr>
+            <a:stCxn id="20" idx="0"/>
+            <a:endCxn id="18" idx="2"/>
+          </p:cNvCxnSpPr>
+          <p:nvPr/>
+        </p:nvCxnSpPr>
+        <p:spPr>
+          <a:xfrm flipH="1" flipV="1">
+            <a:off x="4757685" y="4530467"/>
+            <a:ext cx="1023236" cy="820899"/>
+          </a:xfrm>
+          <a:prstGeom prst="straightConnector1">
+            <a:avLst/>
+          </a:prstGeom>
+          <a:ln>
+            <a:solidFill>
+              <a:schemeClr val="tx1"/>
+            </a:solidFill>
+            <a:tailEnd type="triangle"/>
+          </a:ln>
+        </p:spPr>
+        <p:style>
+          <a:lnRef idx="1">
+            <a:schemeClr val="accent1"/>
+          </a:lnRef>
+          <a:fillRef idx="0">
+            <a:schemeClr val="accent1"/>
+          </a:fillRef>
+          <a:effectRef idx="0">
+            <a:schemeClr val="accent1"/>
+          </a:effectRef>
+          <a:fontRef idx="minor">
+            <a:schemeClr val="tx1"/>
+          </a:fontRef>
+        </p:style>
+      </p:cxnSp>
+      <p:cxnSp>
+        <p:nvCxnSpPr>
+          <p:cNvPr id="34" name="Straight Arrow Connector 33"/>
+          <p:cNvCxnSpPr>
+            <a:stCxn id="20" idx="2"/>
+            <a:endCxn id="21" idx="1"/>
+          </p:cNvCxnSpPr>
+          <p:nvPr/>
+        </p:nvCxnSpPr>
+        <p:spPr>
+          <a:xfrm flipH="1">
+            <a:off x="5680900" y="5997697"/>
+            <a:ext cx="100021" cy="235721"/>
+          </a:xfrm>
+          <a:prstGeom prst="straightConnector1">
+            <a:avLst/>
+          </a:prstGeom>
+          <a:ln>
+            <a:solidFill>
+              <a:schemeClr val="tx1"/>
+            </a:solidFill>
+            <a:tailEnd type="triangle"/>
+          </a:ln>
+        </p:spPr>
+        <p:style>
+          <a:lnRef idx="1">
+            <a:schemeClr val="accent1"/>
+          </a:lnRef>
+          <a:fillRef idx="0">
+            <a:schemeClr val="accent1"/>
+          </a:fillRef>
+          <a:effectRef idx="0">
+            <a:schemeClr val="accent1"/>
+          </a:effectRef>
+          <a:fontRef idx="minor">
+            <a:schemeClr val="tx1"/>
+          </a:fontRef>
+        </p:style>
+      </p:cxnSp>
+      <p:cxnSp>
+        <p:nvCxnSpPr>
+          <p:cNvPr id="37" name="Straight Arrow Connector 36"/>
+          <p:cNvCxnSpPr>
+            <a:stCxn id="7" idx="1"/>
+            <a:endCxn id="14" idx="3"/>
+          </p:cNvCxnSpPr>
+          <p:nvPr/>
+        </p:nvCxnSpPr>
+        <p:spPr>
+          <a:xfrm flipH="1">
+            <a:off x="6328062" y="695494"/>
+            <a:ext cx="1354667" cy="1149927"/>
+          </a:xfrm>
+          <a:prstGeom prst="straightConnector1">
+            <a:avLst/>
+          </a:prstGeom>
+          <a:ln>
+            <a:solidFill>
+              <a:schemeClr val="tx1"/>
+            </a:solidFill>
+            <a:tailEnd type="triangle"/>
+          </a:ln>
+        </p:spPr>
+        <p:style>
+          <a:lnRef idx="1">
+            <a:schemeClr val="accent1"/>
+          </a:lnRef>
+          <a:fillRef idx="0">
+            <a:schemeClr val="accent1"/>
+          </a:fillRef>
+          <a:effectRef idx="0">
+            <a:schemeClr val="accent1"/>
+          </a:effectRef>
+          <a:fontRef idx="minor">
+            <a:schemeClr val="tx1"/>
+          </a:fontRef>
+        </p:style>
+      </p:cxnSp>
+    </p:spTree>
+    <p:extLst>
+      <p:ext uri="{BB962C8B-B14F-4D97-AF65-F5344CB8AC3E}">
+        <p14:creationId xmlns:p14="http://schemas.microsoft.com/office/powerpoint/2010/main" val="2140891646"/>
+      </p:ext>
+    </p:extLst>
+  </p:cSld>
+  <p:clrMapOvr>
+    <a:masterClrMapping/>
+  </p:clrMapOvr>
+</p:sld>
+</file>
+
+<file path=ppt/slides/slide6.xml><?xml version="1.0" encoding="utf-8"?>
+<p:sld xmlns:a="http://schemas.openxmlformats.org/drawingml/2006/main" xmlns:r="http://schemas.openxmlformats.org/officeDocument/2006/relationships" xmlns:p="http://schemas.openxmlformats.org/presentationml/2006/main">
+  <p:cSld>
+    <p:spTree>
+      <p:nvGrpSpPr>
+        <p:cNvPr id="1" name=""/>
+        <p:cNvGrpSpPr/>
+        <p:nvPr/>
+      </p:nvGrpSpPr>
+      <p:grpSpPr>
+        <a:xfrm>
+          <a:off x="0" y="0"/>
+          <a:ext cx="0" cy="0"/>
+          <a:chOff x="0" y="0"/>
+          <a:chExt cx="0" cy="0"/>
+        </a:xfrm>
+      </p:grpSpPr>
+      <p:sp>
+        <p:nvSpPr>
+          <p:cNvPr id="5" name="Hexagon 4"/>
+          <p:cNvSpPr/>
+          <p:nvPr/>
+        </p:nvSpPr>
+        <p:spPr>
+          <a:xfrm>
+            <a:off x="2169621" y="249380"/>
+            <a:ext cx="7198823" cy="5627717"/>
+          </a:xfrm>
+          <a:prstGeom prst="hexagon">
+            <a:avLst/>
+          </a:prstGeom>
+          <a:noFill/>
+          <a:ln>
+            <a:solidFill>
+              <a:schemeClr val="tx1"/>
+            </a:solidFill>
+          </a:ln>
+        </p:spPr>
+        <p:style>
+          <a:lnRef idx="2">
+            <a:schemeClr val="accent1">
+              <a:shade val="50000"/>
+            </a:schemeClr>
+          </a:lnRef>
+          <a:fillRef idx="1">
+            <a:schemeClr val="accent1"/>
+          </a:fillRef>
+          <a:effectRef idx="0">
+            <a:schemeClr val="accent1"/>
+          </a:effectRef>
+          <a:fontRef idx="minor">
+            <a:schemeClr val="lt1"/>
+          </a:fontRef>
+        </p:style>
+        <p:txBody>
+          <a:bodyPr rtlCol="0" anchor="ctr"/>
+          <a:lstStyle/>
+          <a:p>
+            <a:pPr algn="ctr"/>
+            <a:endParaRPr lang="en-US"/>
+          </a:p>
+        </p:txBody>
+      </p:sp>
+      <p:sp>
+        <p:nvSpPr>
+          <p:cNvPr id="6" name="Hexagon 5"/>
+          <p:cNvSpPr/>
+          <p:nvPr/>
+        </p:nvSpPr>
+        <p:spPr>
+          <a:xfrm>
+            <a:off x="2952402" y="870062"/>
+            <a:ext cx="5633259" cy="4386351"/>
+          </a:xfrm>
+          <a:prstGeom prst="hexagon">
+            <a:avLst/>
+          </a:prstGeom>
+          <a:noFill/>
+          <a:ln>
+            <a:solidFill>
+              <a:schemeClr val="tx1"/>
+            </a:solidFill>
+          </a:ln>
+        </p:spPr>
+        <p:style>
+          <a:lnRef idx="2">
+            <a:schemeClr val="accent1">
+              <a:shade val="50000"/>
+            </a:schemeClr>
+          </a:lnRef>
+          <a:fillRef idx="1">
+            <a:schemeClr val="accent1"/>
+          </a:fillRef>
+          <a:effectRef idx="0">
+            <a:schemeClr val="accent1"/>
+          </a:effectRef>
+          <a:fontRef idx="minor">
+            <a:schemeClr val="lt1"/>
+          </a:fontRef>
+        </p:style>
+        <p:txBody>
+          <a:bodyPr rtlCol="0" anchor="ctr"/>
+          <a:lstStyle/>
+          <a:p>
+            <a:pPr algn="ctr"/>
+            <a:endParaRPr lang="en-US"/>
+          </a:p>
+        </p:txBody>
+      </p:sp>
+      <p:sp>
+        <p:nvSpPr>
+          <p:cNvPr id="7" name="Rectangle 6">
+            <a:extLst>
+              <a:ext uri="{FF2B5EF4-FFF2-40B4-BE49-F238E27FC236}">
+                <a16:creationId xmlns:a16="http://schemas.microsoft.com/office/drawing/2014/main" id="{29B44116-52B5-492D-8C36-54507C947C11}"/>
+              </a:ext>
+            </a:extLst>
+          </p:cNvPr>
+          <p:cNvSpPr/>
+          <p:nvPr/>
+        </p:nvSpPr>
+        <p:spPr>
+          <a:xfrm>
+            <a:off x="7682729" y="372328"/>
+            <a:ext cx="1294323" cy="646331"/>
+          </a:xfrm>
+          <a:prstGeom prst="rect">
+            <a:avLst/>
+          </a:prstGeom>
+          <a:solidFill>
+            <a:schemeClr val="bg1"/>
+          </a:solidFill>
+          <a:ln>
+            <a:solidFill>
+              <a:schemeClr val="tx1"/>
+            </a:solidFill>
+          </a:ln>
+        </p:spPr>
+        <p:style>
+          <a:lnRef idx="2">
+            <a:schemeClr val="accent1">
+              <a:shade val="50000"/>
+            </a:schemeClr>
+          </a:lnRef>
+          <a:fillRef idx="1">
+            <a:schemeClr val="accent1"/>
+          </a:fillRef>
+          <a:effectRef idx="0">
+            <a:schemeClr val="accent1"/>
+          </a:effectRef>
+          <a:fontRef idx="minor">
+            <a:schemeClr val="lt1"/>
+          </a:fontRef>
+        </p:style>
+        <p:txBody>
+          <a:bodyPr rtlCol="0" anchor="ctr"/>
+          <a:lstStyle/>
+          <a:p>
+            <a:pPr algn="ctr"/>
+            <a:r>
+              <a:rPr lang="nl-BE" sz="1200" b="1" dirty="0" err="1" smtClean="0">
+                <a:solidFill>
+                  <a:schemeClr val="tx1"/>
+                </a:solidFill>
+              </a:rPr>
+              <a:t>CasePlanEventConsumer</a:t>
+            </a:r>
+            <a:endParaRPr lang="en-US" sz="1200" b="1" dirty="0">
+              <a:solidFill>
+                <a:schemeClr val="tx1"/>
+              </a:solidFill>
+            </a:endParaRPr>
+          </a:p>
+        </p:txBody>
+      </p:sp>
+      <p:sp>
+        <p:nvSpPr>
+          <p:cNvPr id="8" name="Cylindre 196">
+            <a:extLst>
+              <a:ext uri="{FF2B5EF4-FFF2-40B4-BE49-F238E27FC236}">
+                <a16:creationId xmlns:a16="http://schemas.microsoft.com/office/drawing/2014/main" id="{264E002D-6B26-4FE8-9DC7-4294CF603EF0}"/>
+              </a:ext>
+            </a:extLst>
+          </p:cNvPr>
+          <p:cNvSpPr/>
+          <p:nvPr/>
+        </p:nvSpPr>
+        <p:spPr>
+          <a:xfrm rot="16200000">
+            <a:off x="10365906" y="-367361"/>
+            <a:ext cx="276999" cy="1462174"/>
+          </a:xfrm>
+          <a:prstGeom prst="can">
+            <a:avLst/>
+          </a:prstGeom>
+          <a:noFill/>
+          <a:ln>
+            <a:solidFill>
+              <a:schemeClr val="tx1"/>
+            </a:solidFill>
+          </a:ln>
+        </p:spPr>
+        <p:style>
+          <a:lnRef idx="2">
+            <a:schemeClr val="accent1">
+              <a:shade val="50000"/>
+            </a:schemeClr>
+          </a:lnRef>
+          <a:fillRef idx="1">
+            <a:schemeClr val="accent1"/>
+          </a:fillRef>
+          <a:effectRef idx="0">
+            <a:schemeClr val="accent1"/>
+          </a:effectRef>
+          <a:fontRef idx="minor">
+            <a:schemeClr val="lt1"/>
+          </a:fontRef>
+        </p:style>
+        <p:txBody>
+          <a:bodyPr rtlCol="0" anchor="ctr"/>
+          <a:lstStyle/>
+          <a:p>
+            <a:pPr algn="ctr"/>
+            <a:endParaRPr lang="fr-BE" dirty="0"/>
+          </a:p>
+        </p:txBody>
+      </p:sp>
+      <p:sp>
+        <p:nvSpPr>
+          <p:cNvPr id="9" name="ZoneTexte 197">
+            <a:extLst>
+              <a:ext uri="{FF2B5EF4-FFF2-40B4-BE49-F238E27FC236}">
+                <a16:creationId xmlns:a16="http://schemas.microsoft.com/office/drawing/2014/main" id="{EAC8BD04-CD4D-4F86-978D-02D0250982ED}"/>
+              </a:ext>
+            </a:extLst>
+          </p:cNvPr>
+          <p:cNvSpPr txBox="1"/>
+          <p:nvPr/>
+        </p:nvSpPr>
+        <p:spPr>
+          <a:xfrm>
+            <a:off x="9836759" y="219230"/>
+            <a:ext cx="1109840" cy="276999"/>
+          </a:xfrm>
+          <a:prstGeom prst="rect">
+            <a:avLst/>
+          </a:prstGeom>
+          <a:noFill/>
+        </p:spPr>
+        <p:txBody>
+          <a:bodyPr wrap="square" rtlCol="0">
+            <a:spAutoFit/>
+          </a:bodyPr>
+          <a:lstStyle/>
+          <a:p>
+            <a:r>
+              <a:rPr lang="fr-BE" sz="1200" b="1" dirty="0" smtClean="0"/>
+              <a:t>Case plan</a:t>
+            </a:r>
+            <a:endParaRPr lang="fr-BE" sz="1200" b="1" dirty="0"/>
+          </a:p>
+        </p:txBody>
+      </p:sp>
+      <p:cxnSp>
+        <p:nvCxnSpPr>
+          <p:cNvPr id="11" name="Elbow Connector 10"/>
+          <p:cNvCxnSpPr>
+            <a:stCxn id="9" idx="2"/>
+            <a:endCxn id="7" idx="3"/>
+          </p:cNvCxnSpPr>
+          <p:nvPr/>
+        </p:nvCxnSpPr>
+        <p:spPr>
+          <a:xfrm rot="5400000">
+            <a:off x="9584734" y="-111452"/>
+            <a:ext cx="199265" cy="1414627"/>
+          </a:xfrm>
+          <a:prstGeom prst="bentConnector2">
+            <a:avLst/>
+          </a:prstGeom>
+          <a:ln>
+            <a:solidFill>
+              <a:schemeClr val="tx1"/>
+            </a:solidFill>
+            <a:tailEnd type="triangle"/>
+          </a:ln>
+        </p:spPr>
+        <p:style>
+          <a:lnRef idx="1">
+            <a:schemeClr val="accent1"/>
+          </a:lnRef>
+          <a:fillRef idx="0">
+            <a:schemeClr val="accent1"/>
+          </a:fillRef>
+          <a:effectRef idx="0">
+            <a:schemeClr val="accent1"/>
+          </a:effectRef>
+          <a:fontRef idx="minor">
+            <a:schemeClr val="tx1"/>
+          </a:fontRef>
+        </p:style>
+      </p:cxnSp>
+      <p:sp>
+        <p:nvSpPr>
+          <p:cNvPr id="14" name="Rectangle 13">
+            <a:extLst>
+              <a:ext uri="{FF2B5EF4-FFF2-40B4-BE49-F238E27FC236}">
+                <a16:creationId xmlns:a16="http://schemas.microsoft.com/office/drawing/2014/main" id="{29B44116-52B5-492D-8C36-54507C947C11}"/>
+              </a:ext>
+            </a:extLst>
+          </p:cNvPr>
+          <p:cNvSpPr/>
+          <p:nvPr/>
+        </p:nvSpPr>
+        <p:spPr>
+          <a:xfrm>
+            <a:off x="5033739" y="1522255"/>
+            <a:ext cx="1294323" cy="646331"/>
+          </a:xfrm>
+          <a:prstGeom prst="rect">
+            <a:avLst/>
+          </a:prstGeom>
+          <a:solidFill>
+            <a:schemeClr val="bg1"/>
+          </a:solidFill>
+          <a:ln>
+            <a:solidFill>
+              <a:schemeClr val="tx1"/>
+            </a:solidFill>
+          </a:ln>
+        </p:spPr>
+        <p:style>
+          <a:lnRef idx="2">
+            <a:schemeClr val="accent1">
+              <a:shade val="50000"/>
+            </a:schemeClr>
+          </a:lnRef>
+          <a:fillRef idx="1">
+            <a:schemeClr val="accent1"/>
+          </a:fillRef>
+          <a:effectRef idx="0">
+            <a:schemeClr val="accent1"/>
+          </a:effectRef>
+          <a:fontRef idx="minor">
+            <a:schemeClr val="lt1"/>
+          </a:fontRef>
+        </p:style>
+        <p:txBody>
+          <a:bodyPr rtlCol="0" anchor="ctr"/>
+          <a:lstStyle/>
+          <a:p>
+            <a:pPr algn="ctr"/>
+            <a:r>
+              <a:rPr lang="nl-BE" sz="1200" b="1" dirty="0" err="1" smtClean="0">
+                <a:solidFill>
+                  <a:schemeClr val="tx1"/>
+                </a:solidFill>
+              </a:rPr>
+              <a:t>RoleService</a:t>
+            </a:r>
+            <a:endParaRPr lang="en-US" sz="1200" b="1" dirty="0">
+              <a:solidFill>
+                <a:schemeClr val="tx1"/>
+              </a:solidFill>
+            </a:endParaRPr>
+          </a:p>
+        </p:txBody>
+      </p:sp>
+      <p:sp>
+        <p:nvSpPr>
+          <p:cNvPr id="15" name="Rectangle 14">
+            <a:extLst>
+              <a:ext uri="{FF2B5EF4-FFF2-40B4-BE49-F238E27FC236}">
+                <a16:creationId xmlns:a16="http://schemas.microsoft.com/office/drawing/2014/main" id="{29B44116-52B5-492D-8C36-54507C947C11}"/>
+              </a:ext>
+            </a:extLst>
+          </p:cNvPr>
+          <p:cNvSpPr/>
+          <p:nvPr/>
+        </p:nvSpPr>
+        <p:spPr>
+          <a:xfrm>
+            <a:off x="3332900" y="2740071"/>
+            <a:ext cx="1630298" cy="646331"/>
+          </a:xfrm>
+          <a:prstGeom prst="rect">
+            <a:avLst/>
+          </a:prstGeom>
+          <a:solidFill>
+            <a:schemeClr val="bg1"/>
+          </a:solidFill>
+          <a:ln>
+            <a:solidFill>
+              <a:schemeClr val="tx1"/>
+            </a:solidFill>
+          </a:ln>
+        </p:spPr>
+        <p:style>
+          <a:lnRef idx="2">
+            <a:schemeClr val="accent1">
+              <a:shade val="50000"/>
+            </a:schemeClr>
+          </a:lnRef>
+          <a:fillRef idx="1">
+            <a:schemeClr val="accent1"/>
+          </a:fillRef>
+          <a:effectRef idx="0">
+            <a:schemeClr val="accent1"/>
+          </a:effectRef>
+          <a:fontRef idx="minor">
+            <a:schemeClr val="lt1"/>
+          </a:fontRef>
+        </p:style>
+        <p:txBody>
+          <a:bodyPr rtlCol="0" anchor="ctr"/>
+          <a:lstStyle/>
+          <a:p>
+            <a:pPr algn="ctr"/>
+            <a:r>
+              <a:rPr lang="nl-BE" sz="1200" b="1" dirty="0" smtClean="0">
+                <a:solidFill>
+                  <a:schemeClr val="tx1"/>
+                </a:solidFill>
+              </a:rPr>
+              <a:t>&lt;&lt;</a:t>
+            </a:r>
+            <a:r>
+              <a:rPr lang="nl-BE" sz="1200" b="1" dirty="0" err="1" smtClean="0">
+                <a:solidFill>
+                  <a:schemeClr val="tx1"/>
+                </a:solidFill>
+              </a:rPr>
+              <a:t>Aggregate</a:t>
+            </a:r>
+            <a:r>
+              <a:rPr lang="nl-BE" sz="1200" b="1" dirty="0" smtClean="0">
+                <a:solidFill>
+                  <a:schemeClr val="tx1"/>
+                </a:solidFill>
+              </a:rPr>
+              <a:t> root&gt;&gt;</a:t>
+            </a:r>
+          </a:p>
+          <a:p>
+            <a:pPr algn="ctr"/>
+            <a:r>
+              <a:rPr lang="nl-BE" sz="1200" b="1" dirty="0" err="1" smtClean="0">
+                <a:solidFill>
+                  <a:schemeClr val="tx1"/>
+                </a:solidFill>
+              </a:rPr>
+              <a:t>Role</a:t>
+            </a:r>
+            <a:endParaRPr lang="en-US" sz="1200" b="1" dirty="0">
+              <a:solidFill>
+                <a:schemeClr val="tx1"/>
+              </a:solidFill>
+            </a:endParaRPr>
+          </a:p>
+        </p:txBody>
+      </p:sp>
+      <p:cxnSp>
+        <p:nvCxnSpPr>
+          <p:cNvPr id="17" name="Straight Arrow Connector 16"/>
+          <p:cNvCxnSpPr>
+            <a:stCxn id="14" idx="2"/>
+            <a:endCxn id="15" idx="0"/>
+          </p:cNvCxnSpPr>
+          <p:nvPr/>
+        </p:nvCxnSpPr>
+        <p:spPr>
+          <a:xfrm flipH="1">
+            <a:off x="4148049" y="2168586"/>
+            <a:ext cx="1532852" cy="571485"/>
+          </a:xfrm>
+          <a:prstGeom prst="straightConnector1">
+            <a:avLst/>
+          </a:prstGeom>
+          <a:ln>
+            <a:solidFill>
+              <a:schemeClr val="tx1"/>
+            </a:solidFill>
+            <a:tailEnd type="triangle"/>
+          </a:ln>
+        </p:spPr>
+        <p:style>
+          <a:lnRef idx="1">
+            <a:schemeClr val="accent1"/>
+          </a:lnRef>
+          <a:fillRef idx="0">
+            <a:schemeClr val="accent1"/>
+          </a:fillRef>
+          <a:effectRef idx="0">
+            <a:schemeClr val="accent1"/>
+          </a:effectRef>
+          <a:fontRef idx="minor">
+            <a:schemeClr val="tx1"/>
+          </a:fontRef>
+        </p:style>
+      </p:cxnSp>
+      <p:sp>
+        <p:nvSpPr>
+          <p:cNvPr id="18" name="Rectangle 17">
+            <a:extLst>
+              <a:ext uri="{FF2B5EF4-FFF2-40B4-BE49-F238E27FC236}">
+                <a16:creationId xmlns:a16="http://schemas.microsoft.com/office/drawing/2014/main" id="{29B44116-52B5-492D-8C36-54507C947C11}"/>
+              </a:ext>
+            </a:extLst>
+          </p:cNvPr>
+          <p:cNvSpPr/>
+          <p:nvPr/>
+        </p:nvSpPr>
+        <p:spPr>
+          <a:xfrm>
+            <a:off x="3942536" y="3884136"/>
+            <a:ext cx="1630298" cy="646331"/>
+          </a:xfrm>
+          <a:prstGeom prst="rect">
+            <a:avLst/>
+          </a:prstGeom>
+          <a:solidFill>
+            <a:schemeClr val="bg1"/>
+          </a:solidFill>
+          <a:ln>
+            <a:solidFill>
+              <a:schemeClr val="tx1"/>
+            </a:solidFill>
+          </a:ln>
+        </p:spPr>
+        <p:style>
+          <a:lnRef idx="2">
+            <a:schemeClr val="accent1">
+              <a:shade val="50000"/>
+            </a:schemeClr>
+          </a:lnRef>
+          <a:fillRef idx="1">
+            <a:schemeClr val="accent1"/>
+          </a:fillRef>
+          <a:effectRef idx="0">
+            <a:schemeClr val="accent1"/>
+          </a:effectRef>
+          <a:fontRef idx="minor">
+            <a:schemeClr val="lt1"/>
+          </a:fontRef>
+        </p:style>
+        <p:txBody>
+          <a:bodyPr rtlCol="0" anchor="ctr"/>
+          <a:lstStyle/>
+          <a:p>
+            <a:pPr algn="ctr"/>
+            <a:r>
+              <a:rPr lang="nl-BE" sz="1200" b="1" dirty="0" err="1" smtClean="0">
+                <a:solidFill>
+                  <a:schemeClr val="tx1"/>
+                </a:solidFill>
+              </a:rPr>
+              <a:t>RoleQuery</a:t>
+            </a:r>
+            <a:endParaRPr lang="nl-BE" sz="1200" b="1" dirty="0" smtClean="0">
+              <a:solidFill>
+                <a:schemeClr val="tx1"/>
+              </a:solidFill>
+            </a:endParaRPr>
+          </a:p>
+          <a:p>
+            <a:pPr algn="ctr"/>
+            <a:r>
+              <a:rPr lang="nl-BE" sz="1200" b="1" dirty="0" err="1" smtClean="0">
+                <a:solidFill>
+                  <a:schemeClr val="tx1"/>
+                </a:solidFill>
+              </a:rPr>
+              <a:t>Repository</a:t>
+            </a:r>
+            <a:endParaRPr lang="en-US" sz="1200" b="1" dirty="0">
+              <a:solidFill>
+                <a:schemeClr val="tx1"/>
+              </a:solidFill>
+            </a:endParaRPr>
+          </a:p>
+        </p:txBody>
+      </p:sp>
+      <p:sp>
+        <p:nvSpPr>
+          <p:cNvPr id="19" name="Rectangle 18">
+            <a:extLst>
+              <a:ext uri="{FF2B5EF4-FFF2-40B4-BE49-F238E27FC236}">
+                <a16:creationId xmlns:a16="http://schemas.microsoft.com/office/drawing/2014/main" id="{29B44116-52B5-492D-8C36-54507C947C11}"/>
+              </a:ext>
+            </a:extLst>
+          </p:cNvPr>
+          <p:cNvSpPr/>
+          <p:nvPr/>
+        </p:nvSpPr>
+        <p:spPr>
+          <a:xfrm>
+            <a:off x="5780921" y="3909776"/>
+            <a:ext cx="1630298" cy="646331"/>
+          </a:xfrm>
+          <a:prstGeom prst="rect">
+            <a:avLst/>
+          </a:prstGeom>
+          <a:solidFill>
+            <a:schemeClr val="bg1"/>
+          </a:solidFill>
+          <a:ln>
+            <a:solidFill>
+              <a:schemeClr val="tx1"/>
+            </a:solidFill>
+          </a:ln>
+        </p:spPr>
+        <p:style>
+          <a:lnRef idx="2">
+            <a:schemeClr val="accent1">
+              <a:shade val="50000"/>
+            </a:schemeClr>
+          </a:lnRef>
+          <a:fillRef idx="1">
+            <a:schemeClr val="accent1"/>
+          </a:fillRef>
+          <a:effectRef idx="0">
+            <a:schemeClr val="accent1"/>
+          </a:effectRef>
+          <a:fontRef idx="minor">
+            <a:schemeClr val="lt1"/>
+          </a:fontRef>
+        </p:style>
+        <p:txBody>
+          <a:bodyPr rtlCol="0" anchor="ctr"/>
+          <a:lstStyle/>
+          <a:p>
+            <a:pPr algn="ctr"/>
+            <a:r>
+              <a:rPr lang="nl-BE" sz="1200" b="1" dirty="0" err="1" smtClean="0">
+                <a:solidFill>
+                  <a:schemeClr val="tx1"/>
+                </a:solidFill>
+              </a:rPr>
+              <a:t>RoleCommand</a:t>
+            </a:r>
+            <a:endParaRPr lang="nl-BE" sz="1200" b="1" dirty="0" smtClean="0">
+              <a:solidFill>
+                <a:schemeClr val="tx1"/>
+              </a:solidFill>
+            </a:endParaRPr>
+          </a:p>
+          <a:p>
+            <a:pPr algn="ctr"/>
+            <a:r>
+              <a:rPr lang="nl-BE" sz="1200" b="1" dirty="0" err="1" smtClean="0">
+                <a:solidFill>
+                  <a:schemeClr val="tx1"/>
+                </a:solidFill>
+              </a:rPr>
+              <a:t>Repository</a:t>
+            </a:r>
+            <a:endParaRPr lang="en-US" sz="1200" b="1" dirty="0">
+              <a:solidFill>
+                <a:schemeClr val="tx1"/>
+              </a:solidFill>
+            </a:endParaRPr>
+          </a:p>
+        </p:txBody>
+      </p:sp>
+      <p:sp>
+        <p:nvSpPr>
+          <p:cNvPr id="20" name="Rectangle 19">
+            <a:extLst>
+              <a:ext uri="{FF2B5EF4-FFF2-40B4-BE49-F238E27FC236}">
+                <a16:creationId xmlns:a16="http://schemas.microsoft.com/office/drawing/2014/main" id="{29B44116-52B5-492D-8C36-54507C947C11}"/>
+              </a:ext>
+            </a:extLst>
+          </p:cNvPr>
+          <p:cNvSpPr/>
+          <p:nvPr/>
+        </p:nvSpPr>
+        <p:spPr>
+          <a:xfrm>
+            <a:off x="5133759" y="5351366"/>
+            <a:ext cx="1294323" cy="646331"/>
+          </a:xfrm>
+          <a:prstGeom prst="rect">
+            <a:avLst/>
+          </a:prstGeom>
+          <a:solidFill>
+            <a:schemeClr val="bg1"/>
+          </a:solidFill>
+          <a:ln>
+            <a:solidFill>
+              <a:schemeClr val="tx1"/>
+            </a:solidFill>
+          </a:ln>
+        </p:spPr>
+        <p:style>
+          <a:lnRef idx="2">
+            <a:schemeClr val="accent1">
+              <a:shade val="50000"/>
+            </a:schemeClr>
+          </a:lnRef>
+          <a:fillRef idx="1">
+            <a:schemeClr val="accent1"/>
+          </a:fillRef>
+          <a:effectRef idx="0">
+            <a:schemeClr val="accent1"/>
+          </a:effectRef>
+          <a:fontRef idx="minor">
+            <a:schemeClr val="lt1"/>
+          </a:fontRef>
+        </p:style>
+        <p:txBody>
+          <a:bodyPr rtlCol="0" anchor="ctr"/>
+          <a:lstStyle/>
+          <a:p>
+            <a:pPr algn="ctr"/>
+            <a:r>
+              <a:rPr lang="nl-BE" sz="1200" b="1" dirty="0" smtClean="0">
+                <a:solidFill>
+                  <a:schemeClr val="tx1"/>
+                </a:solidFill>
+              </a:rPr>
+              <a:t>Database adapter</a:t>
+            </a:r>
+            <a:endParaRPr lang="en-US" sz="1200" b="1" dirty="0">
+              <a:solidFill>
+                <a:schemeClr val="tx1"/>
+              </a:solidFill>
+            </a:endParaRPr>
+          </a:p>
+        </p:txBody>
+      </p:sp>
+      <p:sp>
+        <p:nvSpPr>
+          <p:cNvPr id="21" name="Can 7">
+            <a:extLst>
+              <a:ext uri="{FF2B5EF4-FFF2-40B4-BE49-F238E27FC236}">
+                <a16:creationId xmlns:a16="http://schemas.microsoft.com/office/drawing/2014/main" id="{3073FF87-BBB1-4674-831A-FD9063FA876B}"/>
+              </a:ext>
+            </a:extLst>
+          </p:cNvPr>
+          <p:cNvSpPr/>
+          <p:nvPr/>
+        </p:nvSpPr>
+        <p:spPr>
+          <a:xfrm>
+            <a:off x="5167627" y="6233418"/>
+            <a:ext cx="1026546" cy="528722"/>
+          </a:xfrm>
+          <a:prstGeom prst="can">
+            <a:avLst/>
+          </a:prstGeom>
+          <a:noFill/>
+          <a:ln>
+            <a:solidFill>
+              <a:schemeClr val="tx1"/>
+            </a:solidFill>
+            <a:prstDash val="dash"/>
+          </a:ln>
+        </p:spPr>
+        <p:style>
+          <a:lnRef idx="2">
+            <a:schemeClr val="accent1">
+              <a:shade val="50000"/>
+            </a:schemeClr>
+          </a:lnRef>
+          <a:fillRef idx="1">
+            <a:schemeClr val="accent1"/>
+          </a:fillRef>
+          <a:effectRef idx="0">
+            <a:schemeClr val="accent1"/>
+          </a:effectRef>
+          <a:fontRef idx="minor">
+            <a:schemeClr val="lt1"/>
+          </a:fontRef>
+        </p:style>
+        <p:txBody>
+          <a:bodyPr rtlCol="0" anchor="ctr"/>
+          <a:lstStyle/>
+          <a:p>
+            <a:pPr algn="ctr"/>
+            <a:r>
+              <a:rPr lang="nl-BE" sz="1200" b="1" dirty="0" err="1" smtClean="0">
+                <a:solidFill>
+                  <a:schemeClr val="tx1"/>
+                </a:solidFill>
+              </a:rPr>
+              <a:t>Role</a:t>
+            </a:r>
+            <a:r>
+              <a:rPr lang="nl-BE" sz="1200" b="1" dirty="0" smtClean="0">
+                <a:solidFill>
+                  <a:schemeClr val="tx1"/>
+                </a:solidFill>
+              </a:rPr>
+              <a:t> DB</a:t>
+            </a:r>
+            <a:endParaRPr lang="en-US" sz="1200" b="1" dirty="0">
+              <a:solidFill>
+                <a:schemeClr val="tx1"/>
+              </a:solidFill>
+            </a:endParaRPr>
+          </a:p>
+        </p:txBody>
+      </p:sp>
+      <p:cxnSp>
+        <p:nvCxnSpPr>
+          <p:cNvPr id="23" name="Straight Arrow Connector 22"/>
+          <p:cNvCxnSpPr>
+            <a:stCxn id="14" idx="2"/>
+            <a:endCxn id="19" idx="0"/>
+          </p:cNvCxnSpPr>
+          <p:nvPr/>
+        </p:nvCxnSpPr>
+        <p:spPr>
+          <a:xfrm>
+            <a:off x="5680901" y="2168586"/>
+            <a:ext cx="915169" cy="1741190"/>
+          </a:xfrm>
+          <a:prstGeom prst="straightConnector1">
+            <a:avLst/>
+          </a:prstGeom>
+          <a:ln>
+            <a:solidFill>
+              <a:schemeClr val="tx1"/>
+            </a:solidFill>
+            <a:tailEnd type="triangle"/>
+          </a:ln>
+        </p:spPr>
+        <p:style>
+          <a:lnRef idx="1">
+            <a:schemeClr val="accent1"/>
+          </a:lnRef>
+          <a:fillRef idx="0">
+            <a:schemeClr val="accent1"/>
+          </a:fillRef>
+          <a:effectRef idx="0">
+            <a:schemeClr val="accent1"/>
+          </a:effectRef>
+          <a:fontRef idx="minor">
+            <a:schemeClr val="tx1"/>
+          </a:fontRef>
+        </p:style>
+      </p:cxnSp>
+      <p:cxnSp>
+        <p:nvCxnSpPr>
+          <p:cNvPr id="24" name="Straight Arrow Connector 23"/>
+          <p:cNvCxnSpPr>
+            <a:stCxn id="14" idx="2"/>
+            <a:endCxn id="18" idx="0"/>
+          </p:cNvCxnSpPr>
+          <p:nvPr/>
+        </p:nvCxnSpPr>
+        <p:spPr>
+          <a:xfrm flipH="1">
+            <a:off x="4757685" y="2168586"/>
+            <a:ext cx="923216" cy="1715550"/>
+          </a:xfrm>
+          <a:prstGeom prst="straightConnector1">
+            <a:avLst/>
+          </a:prstGeom>
+          <a:ln>
+            <a:solidFill>
+              <a:schemeClr val="tx1"/>
+            </a:solidFill>
+            <a:tailEnd type="triangle"/>
+          </a:ln>
+        </p:spPr>
+        <p:style>
+          <a:lnRef idx="1">
+            <a:schemeClr val="accent1"/>
+          </a:lnRef>
+          <a:fillRef idx="0">
+            <a:schemeClr val="accent1"/>
+          </a:fillRef>
+          <a:effectRef idx="0">
+            <a:schemeClr val="accent1"/>
+          </a:effectRef>
+          <a:fontRef idx="minor">
+            <a:schemeClr val="tx1"/>
+          </a:fontRef>
+        </p:style>
+      </p:cxnSp>
+      <p:cxnSp>
+        <p:nvCxnSpPr>
+          <p:cNvPr id="28" name="Straight Arrow Connector 27"/>
+          <p:cNvCxnSpPr>
+            <a:stCxn id="20" idx="0"/>
+            <a:endCxn id="19" idx="2"/>
+          </p:cNvCxnSpPr>
+          <p:nvPr/>
+        </p:nvCxnSpPr>
+        <p:spPr>
+          <a:xfrm flipV="1">
+            <a:off x="5780921" y="4556107"/>
+            <a:ext cx="815149" cy="795259"/>
+          </a:xfrm>
+          <a:prstGeom prst="straightConnector1">
+            <a:avLst/>
+          </a:prstGeom>
+          <a:ln>
+            <a:solidFill>
+              <a:schemeClr val="tx1"/>
+            </a:solidFill>
+            <a:tailEnd type="triangle"/>
+          </a:ln>
+        </p:spPr>
+        <p:style>
+          <a:lnRef idx="1">
+            <a:schemeClr val="accent1"/>
+          </a:lnRef>
+          <a:fillRef idx="0">
+            <a:schemeClr val="accent1"/>
+          </a:fillRef>
+          <a:effectRef idx="0">
+            <a:schemeClr val="accent1"/>
+          </a:effectRef>
+          <a:fontRef idx="minor">
+            <a:schemeClr val="tx1"/>
+          </a:fontRef>
+        </p:style>
+      </p:cxnSp>
+      <p:cxnSp>
+        <p:nvCxnSpPr>
+          <p:cNvPr id="31" name="Straight Arrow Connector 30"/>
+          <p:cNvCxnSpPr>
+            <a:stCxn id="20" idx="0"/>
+            <a:endCxn id="18" idx="2"/>
+          </p:cNvCxnSpPr>
+          <p:nvPr/>
+        </p:nvCxnSpPr>
+        <p:spPr>
+          <a:xfrm flipH="1" flipV="1">
+            <a:off x="4757685" y="4530467"/>
+            <a:ext cx="1023236" cy="820899"/>
+          </a:xfrm>
+          <a:prstGeom prst="straightConnector1">
+            <a:avLst/>
+          </a:prstGeom>
+          <a:ln>
+            <a:solidFill>
+              <a:schemeClr val="tx1"/>
+            </a:solidFill>
+            <a:tailEnd type="triangle"/>
+          </a:ln>
+        </p:spPr>
+        <p:style>
+          <a:lnRef idx="1">
+            <a:schemeClr val="accent1"/>
+          </a:lnRef>
+          <a:fillRef idx="0">
+            <a:schemeClr val="accent1"/>
+          </a:fillRef>
+          <a:effectRef idx="0">
+            <a:schemeClr val="accent1"/>
+          </a:effectRef>
+          <a:fontRef idx="minor">
+            <a:schemeClr val="tx1"/>
+          </a:fontRef>
+        </p:style>
+      </p:cxnSp>
+      <p:cxnSp>
+        <p:nvCxnSpPr>
+          <p:cNvPr id="34" name="Straight Arrow Connector 33"/>
+          <p:cNvCxnSpPr>
+            <a:stCxn id="20" idx="2"/>
+            <a:endCxn id="21" idx="1"/>
+          </p:cNvCxnSpPr>
+          <p:nvPr/>
+        </p:nvCxnSpPr>
+        <p:spPr>
+          <a:xfrm flipH="1">
+            <a:off x="5680900" y="5997697"/>
+            <a:ext cx="100021" cy="235721"/>
+          </a:xfrm>
+          <a:prstGeom prst="straightConnector1">
+            <a:avLst/>
+          </a:prstGeom>
+          <a:ln>
+            <a:solidFill>
+              <a:schemeClr val="tx1"/>
+            </a:solidFill>
+            <a:tailEnd type="triangle"/>
+          </a:ln>
+        </p:spPr>
+        <p:style>
+          <a:lnRef idx="1">
+            <a:schemeClr val="accent1"/>
+          </a:lnRef>
+          <a:fillRef idx="0">
+            <a:schemeClr val="accent1"/>
+          </a:fillRef>
+          <a:effectRef idx="0">
+            <a:schemeClr val="accent1"/>
+          </a:effectRef>
+          <a:fontRef idx="minor">
+            <a:schemeClr val="tx1"/>
+          </a:fontRef>
+        </p:style>
+      </p:cxnSp>
+      <p:cxnSp>
+        <p:nvCxnSpPr>
+          <p:cNvPr id="37" name="Straight Arrow Connector 36"/>
+          <p:cNvCxnSpPr>
+            <a:stCxn id="7" idx="1"/>
+            <a:endCxn id="14" idx="3"/>
+          </p:cNvCxnSpPr>
+          <p:nvPr/>
+        </p:nvCxnSpPr>
+        <p:spPr>
+          <a:xfrm flipH="1">
+            <a:off x="6328062" y="695494"/>
+            <a:ext cx="1354667" cy="1149927"/>
+          </a:xfrm>
+          <a:prstGeom prst="straightConnector1">
+            <a:avLst/>
+          </a:prstGeom>
+          <a:ln>
+            <a:solidFill>
+              <a:schemeClr val="tx1"/>
+            </a:solidFill>
+            <a:tailEnd type="triangle"/>
+          </a:ln>
+        </p:spPr>
+        <p:style>
+          <a:lnRef idx="1">
+            <a:schemeClr val="accent1"/>
+          </a:lnRef>
+          <a:fillRef idx="0">
+            <a:schemeClr val="accent1"/>
+          </a:fillRef>
+          <a:effectRef idx="0">
+            <a:schemeClr val="accent1"/>
+          </a:effectRef>
+          <a:fontRef idx="minor">
+            <a:schemeClr val="tx1"/>
+          </a:fontRef>
+        </p:style>
+      </p:cxnSp>
+    </p:spTree>
+    <p:extLst>
+      <p:ext uri="{BB962C8B-B14F-4D97-AF65-F5344CB8AC3E}">
+        <p14:creationId xmlns:p14="http://schemas.microsoft.com/office/powerpoint/2010/main" val="1744303207"/>
+      </p:ext>
+    </p:extLst>
+  </p:cSld>
+  <p:clrMapOvr>
+    <a:masterClrMapping/>
+  </p:clrMapOvr>
+</p:sld>
+</file>
+
+<file path=ppt/slides/slide7.xml><?xml version="1.0" encoding="utf-8"?>
 <p:sld xmlns:a="http://schemas.openxmlformats.org/drawingml/2006/main" xmlns:r="http://schemas.openxmlformats.org/officeDocument/2006/relationships" xmlns:p="http://schemas.openxmlformats.org/presentationml/2006/main">
   <p:cSld>
     <p:spTree>

</xml_diff>

<commit_message>
Ticket 25 : Start to display the case plan instance
</commit_message>
<xml_diff>
--- a/Architecture.pptx
+++ b/Architecture.pptx
@@ -247,7 +247,7 @@
           <a:p>
             <a:fld id="{B2814555-0B78-4B78-BD0A-6F287A823B12}" type="datetimeFigureOut">
               <a:rPr lang="en-US" smtClean="0"/>
-              <a:t>2/20/2020</a:t>
+              <a:t>2/21/2020</a:t>
             </a:fld>
             <a:endParaRPr lang="en-US"/>
           </a:p>
@@ -289,7 +289,7 @@
           <a:p>
             <a:fld id="{F58E7868-A9AD-480A-A6BB-C3687D73A28E}" type="slidenum">
               <a:rPr lang="en-US" smtClean="0"/>
-              <a:t>‹#›</a:t>
+              <a:t>‹N°›</a:t>
             </a:fld>
             <a:endParaRPr lang="en-US"/>
           </a:p>
@@ -415,7 +415,7 @@
           <a:p>
             <a:fld id="{B2814555-0B78-4B78-BD0A-6F287A823B12}" type="datetimeFigureOut">
               <a:rPr lang="en-US" smtClean="0"/>
-              <a:t>2/20/2020</a:t>
+              <a:t>2/21/2020</a:t>
             </a:fld>
             <a:endParaRPr lang="en-US"/>
           </a:p>
@@ -457,7 +457,7 @@
           <a:p>
             <a:fld id="{F58E7868-A9AD-480A-A6BB-C3687D73A28E}" type="slidenum">
               <a:rPr lang="en-US" smtClean="0"/>
-              <a:t>‹#›</a:t>
+              <a:t>‹N°›</a:t>
             </a:fld>
             <a:endParaRPr lang="en-US"/>
           </a:p>
@@ -593,7 +593,7 @@
           <a:p>
             <a:fld id="{B2814555-0B78-4B78-BD0A-6F287A823B12}" type="datetimeFigureOut">
               <a:rPr lang="en-US" smtClean="0"/>
-              <a:t>2/20/2020</a:t>
+              <a:t>2/21/2020</a:t>
             </a:fld>
             <a:endParaRPr lang="en-US"/>
           </a:p>
@@ -635,7 +635,7 @@
           <a:p>
             <a:fld id="{F58E7868-A9AD-480A-A6BB-C3687D73A28E}" type="slidenum">
               <a:rPr lang="en-US" smtClean="0"/>
-              <a:t>‹#›</a:t>
+              <a:t>‹N°›</a:t>
             </a:fld>
             <a:endParaRPr lang="en-US"/>
           </a:p>
@@ -761,7 +761,7 @@
           <a:p>
             <a:fld id="{B2814555-0B78-4B78-BD0A-6F287A823B12}" type="datetimeFigureOut">
               <a:rPr lang="en-US" smtClean="0"/>
-              <a:t>2/20/2020</a:t>
+              <a:t>2/21/2020</a:t>
             </a:fld>
             <a:endParaRPr lang="en-US"/>
           </a:p>
@@ -803,7 +803,7 @@
           <a:p>
             <a:fld id="{F58E7868-A9AD-480A-A6BB-C3687D73A28E}" type="slidenum">
               <a:rPr lang="en-US" smtClean="0"/>
-              <a:t>‹#›</a:t>
+              <a:t>‹N°›</a:t>
             </a:fld>
             <a:endParaRPr lang="en-US"/>
           </a:p>
@@ -1006,7 +1006,7 @@
           <a:p>
             <a:fld id="{B2814555-0B78-4B78-BD0A-6F287A823B12}" type="datetimeFigureOut">
               <a:rPr lang="en-US" smtClean="0"/>
-              <a:t>2/20/2020</a:t>
+              <a:t>2/21/2020</a:t>
             </a:fld>
             <a:endParaRPr lang="en-US"/>
           </a:p>
@@ -1048,7 +1048,7 @@
           <a:p>
             <a:fld id="{F58E7868-A9AD-480A-A6BB-C3687D73A28E}" type="slidenum">
               <a:rPr lang="en-US" smtClean="0"/>
-              <a:t>‹#›</a:t>
+              <a:t>‹N°›</a:t>
             </a:fld>
             <a:endParaRPr lang="en-US"/>
           </a:p>
@@ -1235,7 +1235,7 @@
           <a:p>
             <a:fld id="{B2814555-0B78-4B78-BD0A-6F287A823B12}" type="datetimeFigureOut">
               <a:rPr lang="en-US" smtClean="0"/>
-              <a:t>2/20/2020</a:t>
+              <a:t>2/21/2020</a:t>
             </a:fld>
             <a:endParaRPr lang="en-US"/>
           </a:p>
@@ -1277,7 +1277,7 @@
           <a:p>
             <a:fld id="{F58E7868-A9AD-480A-A6BB-C3687D73A28E}" type="slidenum">
               <a:rPr lang="en-US" smtClean="0"/>
-              <a:t>‹#›</a:t>
+              <a:t>‹N°›</a:t>
             </a:fld>
             <a:endParaRPr lang="en-US"/>
           </a:p>
@@ -1599,7 +1599,7 @@
           <a:p>
             <a:fld id="{B2814555-0B78-4B78-BD0A-6F287A823B12}" type="datetimeFigureOut">
               <a:rPr lang="en-US" smtClean="0"/>
-              <a:t>2/20/2020</a:t>
+              <a:t>2/21/2020</a:t>
             </a:fld>
             <a:endParaRPr lang="en-US"/>
           </a:p>
@@ -1641,7 +1641,7 @@
           <a:p>
             <a:fld id="{F58E7868-A9AD-480A-A6BB-C3687D73A28E}" type="slidenum">
               <a:rPr lang="en-US" smtClean="0"/>
-              <a:t>‹#›</a:t>
+              <a:t>‹N°›</a:t>
             </a:fld>
             <a:endParaRPr lang="en-US"/>
           </a:p>
@@ -1716,7 +1716,7 @@
           <a:p>
             <a:fld id="{B2814555-0B78-4B78-BD0A-6F287A823B12}" type="datetimeFigureOut">
               <a:rPr lang="en-US" smtClean="0"/>
-              <a:t>2/20/2020</a:t>
+              <a:t>2/21/2020</a:t>
             </a:fld>
             <a:endParaRPr lang="en-US"/>
           </a:p>
@@ -1758,7 +1758,7 @@
           <a:p>
             <a:fld id="{F58E7868-A9AD-480A-A6BB-C3687D73A28E}" type="slidenum">
               <a:rPr lang="en-US" smtClean="0"/>
-              <a:t>‹#›</a:t>
+              <a:t>‹N°›</a:t>
             </a:fld>
             <a:endParaRPr lang="en-US"/>
           </a:p>
@@ -1811,7 +1811,7 @@
           <a:p>
             <a:fld id="{B2814555-0B78-4B78-BD0A-6F287A823B12}" type="datetimeFigureOut">
               <a:rPr lang="en-US" smtClean="0"/>
-              <a:t>2/20/2020</a:t>
+              <a:t>2/21/2020</a:t>
             </a:fld>
             <a:endParaRPr lang="en-US"/>
           </a:p>
@@ -1853,7 +1853,7 @@
           <a:p>
             <a:fld id="{F58E7868-A9AD-480A-A6BB-C3687D73A28E}" type="slidenum">
               <a:rPr lang="en-US" smtClean="0"/>
-              <a:t>‹#›</a:t>
+              <a:t>‹N°›</a:t>
             </a:fld>
             <a:endParaRPr lang="en-US"/>
           </a:p>
@@ -2086,7 +2086,7 @@
           <a:p>
             <a:fld id="{B2814555-0B78-4B78-BD0A-6F287A823B12}" type="datetimeFigureOut">
               <a:rPr lang="en-US" smtClean="0"/>
-              <a:t>2/20/2020</a:t>
+              <a:t>2/21/2020</a:t>
             </a:fld>
             <a:endParaRPr lang="en-US"/>
           </a:p>
@@ -2128,7 +2128,7 @@
           <a:p>
             <a:fld id="{F58E7868-A9AD-480A-A6BB-C3687D73A28E}" type="slidenum">
               <a:rPr lang="en-US" smtClean="0"/>
-              <a:t>‹#›</a:t>
+              <a:t>‹N°›</a:t>
             </a:fld>
             <a:endParaRPr lang="en-US"/>
           </a:p>
@@ -2338,7 +2338,7 @@
           <a:p>
             <a:fld id="{B2814555-0B78-4B78-BD0A-6F287A823B12}" type="datetimeFigureOut">
               <a:rPr lang="en-US" smtClean="0"/>
-              <a:t>2/20/2020</a:t>
+              <a:t>2/21/2020</a:t>
             </a:fld>
             <a:endParaRPr lang="en-US"/>
           </a:p>
@@ -2380,7 +2380,7 @@
           <a:p>
             <a:fld id="{F58E7868-A9AD-480A-A6BB-C3687D73A28E}" type="slidenum">
               <a:rPr lang="en-US" smtClean="0"/>
-              <a:t>‹#›</a:t>
+              <a:t>‹N°›</a:t>
             </a:fld>
             <a:endParaRPr lang="en-US"/>
           </a:p>
@@ -2549,7 +2549,7 @@
           <a:p>
             <a:fld id="{B2814555-0B78-4B78-BD0A-6F287A823B12}" type="datetimeFigureOut">
               <a:rPr lang="en-US" smtClean="0"/>
-              <a:t>2/20/2020</a:t>
+              <a:t>2/21/2020</a:t>
             </a:fld>
             <a:endParaRPr lang="en-US"/>
           </a:p>
@@ -2627,7 +2627,7 @@
           <a:p>
             <a:fld id="{F58E7868-A9AD-480A-A6BB-C3687D73A28E}" type="slidenum">
               <a:rPr lang="en-US" smtClean="0"/>
-              <a:t>‹#›</a:t>
+              <a:t>‹N°›</a:t>
             </a:fld>
             <a:endParaRPr lang="en-US"/>
           </a:p>
@@ -2970,7 +2970,7 @@
           <a:lstStyle/>
           <a:p>
             <a:r>
-              <a:rPr lang="nl-BE" smtClean="0"/>
+              <a:rPr lang="nl-BE"/>
               <a:t>CaseManagement</a:t>
             </a:r>
             <a:endParaRPr lang="en-US"/>
@@ -4793,7 +4793,7 @@
                 <a14:useLocalDpi xmlns:a14="http://schemas.microsoft.com/office/drawing/2010/main" val="0"/>
               </a:ext>
               <a:ext uri="{96DAC541-7B7A-43D3-8B79-37D633B846F1}">
-                <asvg:svgBlip xmlns="" xmlns:asvg="http://schemas.microsoft.com/office/drawing/2016/SVG/main" r:embed="rId6"/>
+                <asvg:svgBlip xmlns:asvg="http://schemas.microsoft.com/office/drawing/2016/SVG/main" r:embed="rId6"/>
               </a:ext>
             </a:extLst>
           </a:blip>
@@ -10032,14 +10032,14 @@
           <a:p>
             <a:pPr algn="ctr"/>
             <a:r>
-              <a:rPr lang="nl-BE" sz="1200" b="1" dirty="0" err="1" smtClean="0">
+              <a:rPr lang="nl-BE" sz="1200" b="1" dirty="0" err="1">
                 <a:solidFill>
                   <a:schemeClr val="tx1"/>
                 </a:solidFill>
               </a:rPr>
               <a:t>CaseFile</a:t>
             </a:r>
-            <a:endParaRPr lang="nl-BE" sz="1200" b="1" dirty="0" smtClean="0">
+            <a:endParaRPr lang="nl-BE" sz="1200" b="1" dirty="0">
               <a:solidFill>
                 <a:schemeClr val="tx1"/>
               </a:solidFill>
@@ -10048,7 +10048,7 @@
           <a:p>
             <a:pPr algn="ctr"/>
             <a:r>
-              <a:rPr lang="nl-BE" sz="1200" b="1" dirty="0" err="1" smtClean="0">
+              <a:rPr lang="nl-BE" sz="1200" b="1" dirty="0" err="1">
                 <a:solidFill>
                   <a:schemeClr val="tx1"/>
                 </a:solidFill>
@@ -10144,10 +10144,9 @@
           <a:lstStyle/>
           <a:p>
             <a:r>
-              <a:rPr lang="fr-BE" sz="1200" b="1" dirty="0" smtClean="0"/>
+              <a:rPr lang="fr-BE" sz="1200" b="1" dirty="0"/>
               <a:t>Case file</a:t>
             </a:r>
-            <a:endParaRPr lang="fr-BE" sz="1200" b="1" dirty="0"/>
           </a:p>
         </p:txBody>
       </p:sp>
@@ -10241,7 +10240,7 @@
           <a:p>
             <a:pPr algn="ctr"/>
             <a:r>
-              <a:rPr lang="nl-BE" sz="1200" b="1" dirty="0" err="1" smtClean="0">
+              <a:rPr lang="nl-BE" sz="1200" b="1" dirty="0" err="1">
                 <a:solidFill>
                   <a:schemeClr val="tx1"/>
                 </a:solidFill>
@@ -10307,7 +10306,7 @@
           <a:p>
             <a:pPr algn="ctr"/>
             <a:r>
-              <a:rPr lang="nl-BE" sz="1200" b="1" dirty="0" smtClean="0">
+              <a:rPr lang="nl-BE" sz="1200" b="1" dirty="0">
                 <a:solidFill>
                   <a:schemeClr val="tx1"/>
                 </a:solidFill>
@@ -10315,7 +10314,7 @@
               <a:t>&lt;&lt;</a:t>
             </a:r>
             <a:r>
-              <a:rPr lang="nl-BE" sz="1200" b="1" dirty="0" err="1" smtClean="0">
+              <a:rPr lang="nl-BE" sz="1200" b="1" dirty="0" err="1">
                 <a:solidFill>
                   <a:schemeClr val="tx1"/>
                 </a:solidFill>
@@ -10323,7 +10322,7 @@
               <a:t>Aggregate</a:t>
             </a:r>
             <a:r>
-              <a:rPr lang="nl-BE" sz="1200" b="1" dirty="0" smtClean="0">
+              <a:rPr lang="nl-BE" sz="1200" b="1" dirty="0">
                 <a:solidFill>
                   <a:schemeClr val="tx1"/>
                 </a:solidFill>
@@ -10334,7 +10333,7 @@
           <a:p>
             <a:pPr algn="ctr"/>
             <a:r>
-              <a:rPr lang="nl-BE" sz="1200" b="1" dirty="0" smtClean="0">
+              <a:rPr lang="nl-BE" sz="1200" b="1" dirty="0">
                 <a:solidFill>
                   <a:schemeClr val="tx1"/>
                 </a:solidFill>
@@ -10439,14 +10438,14 @@
           <a:p>
             <a:pPr algn="ctr"/>
             <a:r>
-              <a:rPr lang="nl-BE" sz="1200" b="1" dirty="0" err="1" smtClean="0">
+              <a:rPr lang="nl-BE" sz="1200" b="1" dirty="0" err="1">
                 <a:solidFill>
                   <a:schemeClr val="tx1"/>
                 </a:solidFill>
               </a:rPr>
               <a:t>CasePlanQuery</a:t>
             </a:r>
-            <a:endParaRPr lang="nl-BE" sz="1200" b="1" dirty="0" smtClean="0">
+            <a:endParaRPr lang="nl-BE" sz="1200" b="1" dirty="0">
               <a:solidFill>
                 <a:schemeClr val="tx1"/>
               </a:solidFill>
@@ -10455,7 +10454,7 @@
           <a:p>
             <a:pPr algn="ctr"/>
             <a:r>
-              <a:rPr lang="nl-BE" sz="1200" b="1" dirty="0" err="1" smtClean="0">
+              <a:rPr lang="nl-BE" sz="1200" b="1" dirty="0" err="1">
                 <a:solidFill>
                   <a:schemeClr val="tx1"/>
                 </a:solidFill>
@@ -10521,14 +10520,14 @@
           <a:p>
             <a:pPr algn="ctr"/>
             <a:r>
-              <a:rPr lang="nl-BE" sz="1200" b="1" dirty="0" err="1" smtClean="0">
+              <a:rPr lang="nl-BE" sz="1200" b="1" dirty="0" err="1">
                 <a:solidFill>
                   <a:schemeClr val="tx1"/>
                 </a:solidFill>
               </a:rPr>
               <a:t>CasePlanCommand</a:t>
             </a:r>
-            <a:endParaRPr lang="nl-BE" sz="1200" b="1" dirty="0" smtClean="0">
+            <a:endParaRPr lang="nl-BE" sz="1200" b="1" dirty="0">
               <a:solidFill>
                 <a:schemeClr val="tx1"/>
               </a:solidFill>
@@ -10537,7 +10536,7 @@
           <a:p>
             <a:pPr algn="ctr"/>
             <a:r>
-              <a:rPr lang="nl-BE" sz="1200" b="1" dirty="0" err="1" smtClean="0">
+              <a:rPr lang="nl-BE" sz="1200" b="1" dirty="0" err="1">
                 <a:solidFill>
                   <a:schemeClr val="tx1"/>
                 </a:solidFill>
@@ -10603,7 +10602,7 @@
           <a:p>
             <a:pPr algn="ctr"/>
             <a:r>
-              <a:rPr lang="nl-BE" sz="1200" b="1" dirty="0" smtClean="0">
+              <a:rPr lang="nl-BE" sz="1200" b="1" dirty="0">
                 <a:solidFill>
                   <a:schemeClr val="tx1"/>
                 </a:solidFill>
@@ -10668,7 +10667,7 @@
           <a:p>
             <a:pPr algn="ctr"/>
             <a:r>
-              <a:rPr lang="nl-BE" sz="1200" b="1" dirty="0" err="1" smtClean="0">
+              <a:rPr lang="nl-BE" sz="1200" b="1" dirty="0" err="1">
                 <a:solidFill>
                   <a:schemeClr val="tx1"/>
                 </a:solidFill>
@@ -10676,7 +10675,7 @@
               <a:t>CasePlan</a:t>
             </a:r>
             <a:r>
-              <a:rPr lang="nl-BE" sz="1200" b="1" dirty="0" smtClean="0">
+              <a:rPr lang="nl-BE" sz="1200" b="1" dirty="0">
                 <a:solidFill>
                   <a:schemeClr val="tx1"/>
                 </a:solidFill>
@@ -11098,7 +11097,7 @@
           <a:p>
             <a:pPr algn="ctr"/>
             <a:r>
-              <a:rPr lang="nl-BE" sz="1200" b="1" dirty="0" err="1" smtClean="0">
+              <a:rPr lang="nl-BE" sz="1200" b="1" dirty="0" err="1">
                 <a:solidFill>
                   <a:schemeClr val="tx1"/>
                 </a:solidFill>
@@ -11194,10 +11193,9 @@
           <a:lstStyle/>
           <a:p>
             <a:r>
-              <a:rPr lang="fr-BE" sz="1200" b="1" dirty="0" smtClean="0"/>
+              <a:rPr lang="fr-BE" sz="1200" b="1" dirty="0"/>
               <a:t>Case plan</a:t>
             </a:r>
-            <a:endParaRPr lang="fr-BE" sz="1200" b="1" dirty="0"/>
           </a:p>
         </p:txBody>
       </p:sp>
@@ -11291,7 +11289,7 @@
           <a:p>
             <a:pPr algn="ctr"/>
             <a:r>
-              <a:rPr lang="nl-BE" sz="1200" b="1" dirty="0" err="1" smtClean="0">
+              <a:rPr lang="nl-BE" sz="1200" b="1" dirty="0" err="1">
                 <a:solidFill>
                   <a:schemeClr val="tx1"/>
                 </a:solidFill>
@@ -11357,7 +11355,7 @@
           <a:p>
             <a:pPr algn="ctr"/>
             <a:r>
-              <a:rPr lang="nl-BE" sz="1200" b="1" dirty="0" smtClean="0">
+              <a:rPr lang="nl-BE" sz="1200" b="1" dirty="0">
                 <a:solidFill>
                   <a:schemeClr val="tx1"/>
                 </a:solidFill>
@@ -11365,7 +11363,7 @@
               <a:t>&lt;&lt;</a:t>
             </a:r>
             <a:r>
-              <a:rPr lang="nl-BE" sz="1200" b="1" dirty="0" err="1" smtClean="0">
+              <a:rPr lang="nl-BE" sz="1200" b="1" dirty="0" err="1">
                 <a:solidFill>
                   <a:schemeClr val="tx1"/>
                 </a:solidFill>
@@ -11373,7 +11371,7 @@
               <a:t>Aggregate</a:t>
             </a:r>
             <a:r>
-              <a:rPr lang="nl-BE" sz="1200" b="1" dirty="0" smtClean="0">
+              <a:rPr lang="nl-BE" sz="1200" b="1" dirty="0">
                 <a:solidFill>
                   <a:schemeClr val="tx1"/>
                 </a:solidFill>
@@ -11384,7 +11382,7 @@
           <a:p>
             <a:pPr algn="ctr"/>
             <a:r>
-              <a:rPr lang="nl-BE" sz="1200" b="1" dirty="0" err="1" smtClean="0">
+              <a:rPr lang="nl-BE" sz="1200" b="1" dirty="0" err="1">
                 <a:solidFill>
                   <a:schemeClr val="tx1"/>
                 </a:solidFill>
@@ -11489,14 +11487,14 @@
           <a:p>
             <a:pPr algn="ctr"/>
             <a:r>
-              <a:rPr lang="nl-BE" sz="1200" b="1" dirty="0" err="1" smtClean="0">
+              <a:rPr lang="nl-BE" sz="1200" b="1" dirty="0" err="1">
                 <a:solidFill>
                   <a:schemeClr val="tx1"/>
                 </a:solidFill>
               </a:rPr>
               <a:t>RoleQuery</a:t>
             </a:r>
-            <a:endParaRPr lang="nl-BE" sz="1200" b="1" dirty="0" smtClean="0">
+            <a:endParaRPr lang="nl-BE" sz="1200" b="1" dirty="0">
               <a:solidFill>
                 <a:schemeClr val="tx1"/>
               </a:solidFill>
@@ -11505,7 +11503,7 @@
           <a:p>
             <a:pPr algn="ctr"/>
             <a:r>
-              <a:rPr lang="nl-BE" sz="1200" b="1" dirty="0" err="1" smtClean="0">
+              <a:rPr lang="nl-BE" sz="1200" b="1" dirty="0" err="1">
                 <a:solidFill>
                   <a:schemeClr val="tx1"/>
                 </a:solidFill>
@@ -11571,14 +11569,14 @@
           <a:p>
             <a:pPr algn="ctr"/>
             <a:r>
-              <a:rPr lang="nl-BE" sz="1200" b="1" dirty="0" err="1" smtClean="0">
+              <a:rPr lang="nl-BE" sz="1200" b="1" dirty="0" err="1">
                 <a:solidFill>
                   <a:schemeClr val="tx1"/>
                 </a:solidFill>
               </a:rPr>
               <a:t>RoleCommand</a:t>
             </a:r>
-            <a:endParaRPr lang="nl-BE" sz="1200" b="1" dirty="0" smtClean="0">
+            <a:endParaRPr lang="nl-BE" sz="1200" b="1" dirty="0">
               <a:solidFill>
                 <a:schemeClr val="tx1"/>
               </a:solidFill>
@@ -11587,7 +11585,7 @@
           <a:p>
             <a:pPr algn="ctr"/>
             <a:r>
-              <a:rPr lang="nl-BE" sz="1200" b="1" dirty="0" err="1" smtClean="0">
+              <a:rPr lang="nl-BE" sz="1200" b="1" dirty="0" err="1">
                 <a:solidFill>
                   <a:schemeClr val="tx1"/>
                 </a:solidFill>
@@ -11653,7 +11651,7 @@
           <a:p>
             <a:pPr algn="ctr"/>
             <a:r>
-              <a:rPr lang="nl-BE" sz="1200" b="1" dirty="0" smtClean="0">
+              <a:rPr lang="nl-BE" sz="1200" b="1" dirty="0">
                 <a:solidFill>
                   <a:schemeClr val="tx1"/>
                 </a:solidFill>
@@ -11718,7 +11716,7 @@
           <a:p>
             <a:pPr algn="ctr"/>
             <a:r>
-              <a:rPr lang="nl-BE" sz="1200" b="1" dirty="0" err="1" smtClean="0">
+              <a:rPr lang="nl-BE" sz="1200" b="1" dirty="0" err="1">
                 <a:solidFill>
                   <a:schemeClr val="tx1"/>
                 </a:solidFill>
@@ -11726,7 +11724,7 @@
               <a:t>Role</a:t>
             </a:r>
             <a:r>
-              <a:rPr lang="nl-BE" sz="1200" b="1" dirty="0" smtClean="0">
+              <a:rPr lang="nl-BE" sz="1200" b="1" dirty="0">
                 <a:solidFill>
                   <a:schemeClr val="tx1"/>
                 </a:solidFill>
@@ -12045,35 +12043,7 @@
           <a:p>
             <a:r>
               <a:rPr lang="en-US" dirty="0" err="1"/>
-              <a:t>Finir</a:t>
-            </a:r>
-            <a:r>
-              <a:rPr lang="en-US" dirty="0"/>
-              <a:t> les tests </a:t>
-            </a:r>
-            <a:r>
-              <a:rPr lang="en-US" dirty="0" err="1"/>
-              <a:t>unitaires</a:t>
-            </a:r>
-            <a:r>
-              <a:rPr lang="en-US" dirty="0"/>
-              <a:t> : OK</a:t>
-            </a:r>
-          </a:p>
-          <a:p>
-            <a:r>
-              <a:rPr lang="en-US" dirty="0" err="1"/>
-              <a:t>Ajouter</a:t>
-            </a:r>
-            <a:r>
-              <a:rPr lang="en-US" dirty="0"/>
-              <a:t> Gateway API pour le site internet : OK</a:t>
-            </a:r>
-          </a:p>
-          <a:p>
-            <a:r>
-              <a:rPr lang="en-US" dirty="0" err="1"/>
-              <a:t>Ajouter</a:t>
+              <a:t>Afficher</a:t>
             </a:r>
             <a:r>
               <a:rPr lang="en-US" dirty="0"/>
@@ -12081,25 +12051,111 @@
             </a:r>
             <a:r>
               <a:rPr lang="en-US" dirty="0" err="1"/>
-              <a:t>d’autres</a:t>
+              <a:t>l’écran</a:t>
             </a:r>
             <a:r>
               <a:rPr lang="en-US" dirty="0"/>
-              <a:t> operation à la GATEWAY : TODO</a:t>
-            </a:r>
-          </a:p>
-          <a:p>
+              <a:t> </a:t>
+            </a:r>
+            <a:r>
+              <a:rPr lang="en-US" dirty="0" err="1"/>
+              <a:t>d’une</a:t>
+            </a:r>
             <a:r>
               <a:rPr lang="en-US" dirty="0"/>
-              <a:t>Modifier UI pour </a:t>
-            </a:r>
+              <a:t> instance de case</a:t>
+            </a:r>
+          </a:p>
+          <a:p>
+            <a:pPr lvl="1"/>
             <a:r>
               <a:rPr lang="en-US" dirty="0" err="1"/>
-              <a:t>intéragir</a:t>
+              <a:t>Afficher</a:t>
             </a:r>
             <a:r>
               <a:rPr lang="en-US" dirty="0"/>
-              <a:t> avec les Nouvelles operations. </a:t>
+              <a:t> la </a:t>
+            </a:r>
+            <a:r>
+              <a:rPr lang="en-US" dirty="0" err="1"/>
+              <a:t>liste</a:t>
+            </a:r>
+            <a:r>
+              <a:rPr lang="en-US" dirty="0"/>
+              <a:t> des </a:t>
+            </a:r>
+            <a:r>
+              <a:rPr lang="en-US" dirty="0" err="1"/>
+              <a:t>tâches</a:t>
+            </a:r>
+            <a:r>
+              <a:rPr lang="en-US" dirty="0"/>
+              <a:t> actives</a:t>
+            </a:r>
+          </a:p>
+          <a:p>
+            <a:pPr lvl="1"/>
+            <a:r>
+              <a:rPr lang="en-US" dirty="0" err="1"/>
+              <a:t>Afficher</a:t>
+            </a:r>
+            <a:r>
+              <a:rPr lang="en-US" dirty="0"/>
+              <a:t> la </a:t>
+            </a:r>
+            <a:r>
+              <a:rPr lang="en-US" dirty="0" err="1"/>
+              <a:t>liste</a:t>
+            </a:r>
+            <a:r>
+              <a:rPr lang="en-US" dirty="0"/>
+              <a:t> des </a:t>
+            </a:r>
+            <a:r>
+              <a:rPr lang="en-US" dirty="0" err="1"/>
+              <a:t>tâches</a:t>
+            </a:r>
+            <a:r>
+              <a:rPr lang="en-US" dirty="0"/>
+              <a:t> completed.</a:t>
+            </a:r>
+          </a:p>
+          <a:p>
+            <a:pPr lvl="1"/>
+            <a:r>
+              <a:rPr lang="en-US" dirty="0"/>
+              <a:t>HTTP GET /case-plan-instances/:id</a:t>
+            </a:r>
+          </a:p>
+          <a:p>
+            <a:pPr lvl="1"/>
+            <a:r>
+              <a:rPr lang="en-US" dirty="0" err="1"/>
+              <a:t>Récupérer</a:t>
+            </a:r>
+            <a:r>
+              <a:rPr lang="en-US" dirty="0"/>
+              <a:t> la </a:t>
+            </a:r>
+            <a:r>
+              <a:rPr lang="en-US" dirty="0" err="1"/>
+              <a:t>liste</a:t>
+            </a:r>
+            <a:r>
+              <a:rPr lang="en-US" dirty="0"/>
+              <a:t> des taches à (active) </a:t>
+            </a:r>
+            <a:r>
+              <a:rPr lang="en-US"/>
+              <a:t>: /case-workers…</a:t>
+            </a:r>
+            <a:endParaRPr lang="en-US" dirty="0"/>
+          </a:p>
+          <a:p>
+            <a:pPr lvl="1"/>
+            <a:r>
+              <a:rPr lang="en-US" dirty="0"/>
+              <a:t> </a:t>
             </a:r>
           </a:p>
         </p:txBody>

</xml_diff>

<commit_message>
Ticket #32 & #30 : Add SQLServer repository + change case engine
</commit_message>
<xml_diff>
--- a/Architecture.pptx
+++ b/Architecture.pptx
@@ -243,7 +243,7 @@
           <a:p>
             <a:fld id="{B2814555-0B78-4B78-BD0A-6F287A823B12}" type="datetimeFigureOut">
               <a:rPr lang="en-US" smtClean="0"/>
-              <a:t>2/26/2020</a:t>
+              <a:t>9/16/2020</a:t>
             </a:fld>
             <a:endParaRPr lang="en-US"/>
           </a:p>
@@ -411,7 +411,7 @@
           <a:p>
             <a:fld id="{B2814555-0B78-4B78-BD0A-6F287A823B12}" type="datetimeFigureOut">
               <a:rPr lang="en-US" smtClean="0"/>
-              <a:t>2/26/2020</a:t>
+              <a:t>9/16/2020</a:t>
             </a:fld>
             <a:endParaRPr lang="en-US"/>
           </a:p>
@@ -589,7 +589,7 @@
           <a:p>
             <a:fld id="{B2814555-0B78-4B78-BD0A-6F287A823B12}" type="datetimeFigureOut">
               <a:rPr lang="en-US" smtClean="0"/>
-              <a:t>2/26/2020</a:t>
+              <a:t>9/16/2020</a:t>
             </a:fld>
             <a:endParaRPr lang="en-US"/>
           </a:p>
@@ -757,7 +757,7 @@
           <a:p>
             <a:fld id="{B2814555-0B78-4B78-BD0A-6F287A823B12}" type="datetimeFigureOut">
               <a:rPr lang="en-US" smtClean="0"/>
-              <a:t>2/26/2020</a:t>
+              <a:t>9/16/2020</a:t>
             </a:fld>
             <a:endParaRPr lang="en-US"/>
           </a:p>
@@ -1002,7 +1002,7 @@
           <a:p>
             <a:fld id="{B2814555-0B78-4B78-BD0A-6F287A823B12}" type="datetimeFigureOut">
               <a:rPr lang="en-US" smtClean="0"/>
-              <a:t>2/26/2020</a:t>
+              <a:t>9/16/2020</a:t>
             </a:fld>
             <a:endParaRPr lang="en-US"/>
           </a:p>
@@ -1231,7 +1231,7 @@
           <a:p>
             <a:fld id="{B2814555-0B78-4B78-BD0A-6F287A823B12}" type="datetimeFigureOut">
               <a:rPr lang="en-US" smtClean="0"/>
-              <a:t>2/26/2020</a:t>
+              <a:t>9/16/2020</a:t>
             </a:fld>
             <a:endParaRPr lang="en-US"/>
           </a:p>
@@ -1595,7 +1595,7 @@
           <a:p>
             <a:fld id="{B2814555-0B78-4B78-BD0A-6F287A823B12}" type="datetimeFigureOut">
               <a:rPr lang="en-US" smtClean="0"/>
-              <a:t>2/26/2020</a:t>
+              <a:t>9/16/2020</a:t>
             </a:fld>
             <a:endParaRPr lang="en-US"/>
           </a:p>
@@ -1712,7 +1712,7 @@
           <a:p>
             <a:fld id="{B2814555-0B78-4B78-BD0A-6F287A823B12}" type="datetimeFigureOut">
               <a:rPr lang="en-US" smtClean="0"/>
-              <a:t>2/26/2020</a:t>
+              <a:t>9/16/2020</a:t>
             </a:fld>
             <a:endParaRPr lang="en-US"/>
           </a:p>
@@ -1807,7 +1807,7 @@
           <a:p>
             <a:fld id="{B2814555-0B78-4B78-BD0A-6F287A823B12}" type="datetimeFigureOut">
               <a:rPr lang="en-US" smtClean="0"/>
-              <a:t>2/26/2020</a:t>
+              <a:t>9/16/2020</a:t>
             </a:fld>
             <a:endParaRPr lang="en-US"/>
           </a:p>
@@ -2082,7 +2082,7 @@
           <a:p>
             <a:fld id="{B2814555-0B78-4B78-BD0A-6F287A823B12}" type="datetimeFigureOut">
               <a:rPr lang="en-US" smtClean="0"/>
-              <a:t>2/26/2020</a:t>
+              <a:t>9/16/2020</a:t>
             </a:fld>
             <a:endParaRPr lang="en-US"/>
           </a:p>
@@ -2334,7 +2334,7 @@
           <a:p>
             <a:fld id="{B2814555-0B78-4B78-BD0A-6F287A823B12}" type="datetimeFigureOut">
               <a:rPr lang="en-US" smtClean="0"/>
-              <a:t>2/26/2020</a:t>
+              <a:t>9/16/2020</a:t>
             </a:fld>
             <a:endParaRPr lang="en-US"/>
           </a:p>
@@ -2545,7 +2545,7 @@
           <a:p>
             <a:fld id="{B2814555-0B78-4B78-BD0A-6F287A823B12}" type="datetimeFigureOut">
               <a:rPr lang="en-US" smtClean="0"/>
-              <a:t>2/26/2020</a:t>
+              <a:t>9/16/2020</a:t>
             </a:fld>
             <a:endParaRPr lang="en-US"/>
           </a:p>
@@ -3103,7 +3103,7 @@
         </p:nvSpPr>
         <p:spPr>
           <a:xfrm>
-            <a:off x="6738265" y="115148"/>
+            <a:off x="4849852" y="117429"/>
             <a:ext cx="1294323" cy="558784"/>
           </a:xfrm>
           <a:prstGeom prst="rect">
@@ -3172,7 +3172,7 @@
         </p:nvSpPr>
         <p:spPr>
           <a:xfrm>
-            <a:off x="4861840" y="2016967"/>
+            <a:off x="4849852" y="1114764"/>
             <a:ext cx="1294323" cy="666053"/>
           </a:xfrm>
           <a:prstGeom prst="rect">
@@ -3241,7 +3241,7 @@
         </p:nvSpPr>
         <p:spPr>
           <a:xfrm>
-            <a:off x="4861841" y="5482777"/>
+            <a:off x="4847778" y="5482775"/>
             <a:ext cx="1294323" cy="646330"/>
           </a:xfrm>
           <a:prstGeom prst="rect">
@@ -3316,8 +3316,8 @@
         </p:nvSpPr>
         <p:spPr>
           <a:xfrm rot="16200000">
-            <a:off x="4939474" y="996150"/>
-            <a:ext cx="1139057" cy="5290946"/>
+            <a:off x="4927485" y="1424539"/>
+            <a:ext cx="1139057" cy="4081165"/>
           </a:xfrm>
           <a:prstGeom prst="can">
             <a:avLst/>
@@ -3368,7 +3368,7 @@
         </p:nvSpPr>
         <p:spPr>
           <a:xfrm>
-            <a:off x="3120781" y="3093637"/>
+            <a:off x="3620447" y="2909325"/>
             <a:ext cx="1688303" cy="276999"/>
           </a:xfrm>
           <a:prstGeom prst="rect">
@@ -3446,81 +3446,6 @@
               </a:rPr>
               <a:t>Query store</a:t>
             </a:r>
-            <a:endParaRPr lang="en-US" sz="1200" b="1" dirty="0">
-              <a:solidFill>
-                <a:schemeClr val="tx1"/>
-              </a:solidFill>
-            </a:endParaRPr>
-          </a:p>
-        </p:txBody>
-      </p:sp>
-      <p:sp>
-        <p:nvSpPr>
-          <p:cNvPr id="26" name="Rectangle 25">
-            <a:extLst>
-              <a:ext uri="{FF2B5EF4-FFF2-40B4-BE49-F238E27FC236}">
-                <a16:creationId xmlns:a16="http://schemas.microsoft.com/office/drawing/2014/main" id="{29B44116-52B5-492D-8C36-54507C947C11}"/>
-              </a:ext>
-            </a:extLst>
-          </p:cNvPr>
-          <p:cNvSpPr/>
-          <p:nvPr/>
-        </p:nvSpPr>
-        <p:spPr>
-          <a:xfrm>
-            <a:off x="4861841" y="1083584"/>
-            <a:ext cx="1294323" cy="646331"/>
-          </a:xfrm>
-          <a:prstGeom prst="rect">
-            <a:avLst/>
-          </a:prstGeom>
-          <a:noFill/>
-          <a:ln>
-            <a:solidFill>
-              <a:schemeClr val="tx1"/>
-            </a:solidFill>
-          </a:ln>
-        </p:spPr>
-        <p:style>
-          <a:lnRef idx="2">
-            <a:schemeClr val="accent1">
-              <a:shade val="50000"/>
-            </a:schemeClr>
-          </a:lnRef>
-          <a:fillRef idx="1">
-            <a:schemeClr val="accent1"/>
-          </a:fillRef>
-          <a:effectRef idx="0">
-            <a:schemeClr val="accent1"/>
-          </a:effectRef>
-          <a:fontRef idx="minor">
-            <a:schemeClr val="lt1"/>
-          </a:fontRef>
-        </p:style>
-        <p:txBody>
-          <a:bodyPr rtlCol="0" anchor="ctr"/>
-          <a:lstStyle/>
-          <a:p>
-            <a:pPr algn="ctr"/>
-            <a:r>
-              <a:rPr lang="nl-BE" sz="1200" b="1" dirty="0">
-                <a:solidFill>
-                  <a:schemeClr val="tx1"/>
-                </a:solidFill>
-              </a:rPr>
-              <a:t>Gateway</a:t>
-            </a:r>
-          </a:p>
-          <a:p>
-            <a:pPr algn="ctr"/>
-            <a:endParaRPr lang="nl-BE" sz="1200" b="1" dirty="0">
-              <a:solidFill>
-                <a:schemeClr val="tx1"/>
-              </a:solidFill>
-            </a:endParaRPr>
-          </a:p>
-          <a:p>
-            <a:pPr algn="ctr"/>
             <a:endParaRPr lang="en-US" sz="1200" b="1" dirty="0">
               <a:solidFill>
                 <a:schemeClr val="tx1"/>
@@ -3546,9 +3471,9 @@
           <p:nvPr/>
         </p:nvCxnSpPr>
         <p:spPr>
-          <a:xfrm flipV="1">
-            <a:off x="6156164" y="5805941"/>
-            <a:ext cx="1328557" cy="1"/>
+          <a:xfrm>
+            <a:off x="6142101" y="5805940"/>
+            <a:ext cx="1342620" cy="1"/>
           </a:xfrm>
           <a:prstGeom prst="straightConnector1">
             <a:avLst/>
@@ -3593,8 +3518,8 @@
         </p:nvCxnSpPr>
         <p:spPr>
           <a:xfrm flipH="1">
-            <a:off x="3428941" y="5805942"/>
-            <a:ext cx="1432900" cy="0"/>
+            <a:off x="3428941" y="5805940"/>
+            <a:ext cx="1418837" cy="2"/>
           </a:xfrm>
           <a:prstGeom prst="straightConnector1">
             <a:avLst/>
@@ -3632,18 +3557,20 @@
           </p:cNvPr>
           <p:cNvCxnSpPr>
             <a:cxnSpLocks/>
-            <a:stCxn id="5" idx="1"/>
+            <a:stCxn id="212" idx="2"/>
             <a:endCxn id="21" idx="1"/>
           </p:cNvCxnSpPr>
           <p:nvPr/>
         </p:nvCxnSpPr>
         <p:spPr>
-          <a:xfrm rot="10800000" flipV="1">
-            <a:off x="2630920" y="2349993"/>
-            <a:ext cx="2230920" cy="2973809"/>
-          </a:xfrm>
-          <a:prstGeom prst="bentConnector2">
-            <a:avLst/>
+          <a:xfrm rot="5400000">
+            <a:off x="2275869" y="2104731"/>
+            <a:ext cx="3574123" cy="2864020"/>
+          </a:xfrm>
+          <a:prstGeom prst="bentConnector3">
+            <a:avLst>
+              <a:gd name="adj1" fmla="val 8925"/>
+            </a:avLst>
           </a:prstGeom>
           <a:ln>
             <a:solidFill>
@@ -3681,7 +3608,7 @@
         </p:nvSpPr>
         <p:spPr>
           <a:xfrm>
-            <a:off x="5561110" y="4461802"/>
+            <a:off x="5509000" y="4454332"/>
             <a:ext cx="2347069" cy="553998"/>
           </a:xfrm>
           <a:prstGeom prst="rect">
@@ -3770,7 +3697,7 @@
         </p:nvSpPr>
         <p:spPr>
           <a:xfrm>
-            <a:off x="5485442" y="2736762"/>
+            <a:off x="5469789" y="2240093"/>
             <a:ext cx="2347069" cy="246221"/>
           </a:xfrm>
           <a:prstGeom prst="rect">
@@ -3833,8 +3760,8 @@
         </p:nvCxnSpPr>
         <p:spPr>
           <a:xfrm>
-            <a:off x="6156163" y="2349994"/>
-            <a:ext cx="2126580" cy="2973808"/>
+            <a:off x="6144175" y="1447791"/>
+            <a:ext cx="2138568" cy="3876011"/>
           </a:xfrm>
           <a:prstGeom prst="bentConnector2">
             <a:avLst/>
@@ -4001,7 +3928,7 @@
         </p:nvSpPr>
         <p:spPr>
           <a:xfrm>
-            <a:off x="2608063" y="2067907"/>
+            <a:off x="2677104" y="2136986"/>
             <a:ext cx="1850442" cy="246221"/>
           </a:xfrm>
           <a:prstGeom prst="rect">
@@ -4053,7 +3980,7 @@
         </p:nvSpPr>
         <p:spPr>
           <a:xfrm>
-            <a:off x="5488629" y="1747622"/>
+            <a:off x="5469789" y="781888"/>
             <a:ext cx="2965345" cy="246221"/>
           </a:xfrm>
           <a:prstGeom prst="rect">
@@ -4107,14 +4034,14 @@
           <p:cNvCxnSpPr>
             <a:cxnSpLocks/>
             <a:stCxn id="12" idx="2"/>
-            <a:endCxn id="26" idx="0"/>
+            <a:endCxn id="5" idx="0"/>
           </p:cNvCxnSpPr>
           <p:nvPr/>
         </p:nvCxnSpPr>
         <p:spPr>
-          <a:xfrm flipH="1">
-            <a:off x="5509003" y="673932"/>
-            <a:ext cx="1876424" cy="409652"/>
+          <a:xfrm>
+            <a:off x="5497014" y="676213"/>
+            <a:ext cx="0" cy="438551"/>
           </a:xfrm>
           <a:prstGeom prst="straightConnector1">
             <a:avLst/>
@@ -4204,7 +4131,7 @@
         </p:nvSpPr>
         <p:spPr>
           <a:xfrm>
-            <a:off x="1826936" y="1108617"/>
+            <a:off x="1860832" y="1150344"/>
             <a:ext cx="1250461" cy="596264"/>
           </a:xfrm>
           <a:prstGeom prst="rect">
@@ -4246,105 +4173,6 @@
               </a:rPr>
               <a:t>Identity server</a:t>
             </a:r>
-          </a:p>
-          <a:p>
-            <a:pPr algn="ctr"/>
-            <a:endParaRPr lang="nl-BE" sz="1200" b="1" dirty="0">
-              <a:solidFill>
-                <a:schemeClr val="tx1"/>
-              </a:solidFill>
-            </a:endParaRPr>
-          </a:p>
-          <a:p>
-            <a:pPr algn="ctr"/>
-            <a:endParaRPr lang="en-US" sz="1200" b="1" dirty="0">
-              <a:solidFill>
-                <a:schemeClr val="tx1"/>
-              </a:solidFill>
-            </a:endParaRPr>
-          </a:p>
-        </p:txBody>
-      </p:sp>
-      <p:sp>
-        <p:nvSpPr>
-          <p:cNvPr id="131" name="Rectangle 130">
-            <a:extLst>
-              <a:ext uri="{FF2B5EF4-FFF2-40B4-BE49-F238E27FC236}">
-                <a16:creationId xmlns:a16="http://schemas.microsoft.com/office/drawing/2014/main" id="{AF3DBAF5-A923-4448-AE85-17DDDD9FDF24}"/>
-              </a:ext>
-            </a:extLst>
-          </p:cNvPr>
-          <p:cNvSpPr/>
-          <p:nvPr/>
-        </p:nvSpPr>
-        <p:spPr>
-          <a:xfrm>
-            <a:off x="8784064" y="1108616"/>
-            <a:ext cx="1250460" cy="596265"/>
-          </a:xfrm>
-          <a:prstGeom prst="rect">
-            <a:avLst/>
-          </a:prstGeom>
-          <a:noFill/>
-          <a:ln>
-            <a:solidFill>
-              <a:schemeClr val="tx1"/>
-            </a:solidFill>
-          </a:ln>
-        </p:spPr>
-        <p:style>
-          <a:lnRef idx="2">
-            <a:schemeClr val="accent1">
-              <a:shade val="50000"/>
-            </a:schemeClr>
-          </a:lnRef>
-          <a:fillRef idx="1">
-            <a:schemeClr val="accent1"/>
-          </a:fillRef>
-          <a:effectRef idx="0">
-            <a:schemeClr val="accent1"/>
-          </a:effectRef>
-          <a:fontRef idx="minor">
-            <a:schemeClr val="lt1"/>
-          </a:fontRef>
-        </p:style>
-        <p:txBody>
-          <a:bodyPr rtlCol="0" anchor="ctr"/>
-          <a:lstStyle/>
-          <a:p>
-            <a:pPr algn="ctr"/>
-            <a:endParaRPr lang="nl-BE" sz="1200" b="1" dirty="0">
-              <a:solidFill>
-                <a:schemeClr val="tx1"/>
-              </a:solidFill>
-            </a:endParaRPr>
-          </a:p>
-          <a:p>
-            <a:pPr algn="ctr"/>
-            <a:r>
-              <a:rPr lang="nl-BE" sz="1200" b="1" dirty="0" err="1">
-                <a:solidFill>
-                  <a:schemeClr val="tx1"/>
-                </a:solidFill>
-              </a:rPr>
-              <a:t>Authz</a:t>
-            </a:r>
-            <a:r>
-              <a:rPr lang="nl-BE" sz="1200" b="1" dirty="0">
-                <a:solidFill>
-                  <a:schemeClr val="tx1"/>
-                </a:solidFill>
-              </a:rPr>
-              <a:t>. Server</a:t>
-            </a:r>
-          </a:p>
-          <a:p>
-            <a:pPr algn="ctr"/>
-            <a:endParaRPr lang="nl-BE" sz="1200" b="1" dirty="0">
-              <a:solidFill>
-                <a:schemeClr val="tx1"/>
-              </a:solidFill>
-            </a:endParaRPr>
           </a:p>
           <a:p>
             <a:pPr algn="ctr"/>
@@ -4393,7 +4221,7 @@
         </p:blipFill>
         <p:spPr bwMode="auto">
           <a:xfrm>
-            <a:off x="6901139" y="156263"/>
+            <a:off x="5024713" y="189899"/>
             <a:ext cx="968575" cy="610466"/>
           </a:xfrm>
           <a:prstGeom prst="rect">
@@ -4413,10 +4241,10 @@
       </p:pic>
       <p:pic>
         <p:nvPicPr>
-          <p:cNvPr id="147" name="Picture 6" descr="Résultat de recherche d'images pour &quot;dotnet core svg&quot;">
+          <p:cNvPr id="165" name="Picture 2" descr="Résultat de recherche d'images pour &quot;openid logo svg&quot;">
             <a:extLst>
               <a:ext uri="{FF2B5EF4-FFF2-40B4-BE49-F238E27FC236}">
-                <a16:creationId xmlns:a16="http://schemas.microsoft.com/office/drawing/2014/main" id="{0E6DA2FF-775B-4CA7-938D-5249D73422F8}"/>
+                <a16:creationId xmlns:a16="http://schemas.microsoft.com/office/drawing/2014/main" id="{39DC4952-437E-4E9D-AF75-CE2C712C29F4}"/>
               </a:ext>
             </a:extLst>
           </p:cNvPr>
@@ -4440,8 +4268,8 @@
         </p:blipFill>
         <p:spPr bwMode="auto">
           <a:xfrm>
-            <a:off x="5299755" y="1305190"/>
-            <a:ext cx="377748" cy="377748"/>
+            <a:off x="2269802" y="1324950"/>
+            <a:ext cx="338228" cy="338228"/>
           </a:xfrm>
           <a:prstGeom prst="rect">
             <a:avLst/>
@@ -4458,12 +4286,286 @@
           </a:extLst>
         </p:spPr>
       </p:pic>
+      <p:sp>
+        <p:nvSpPr>
+          <p:cNvPr id="177" name="Cylindre 176">
+            <a:extLst>
+              <a:ext uri="{FF2B5EF4-FFF2-40B4-BE49-F238E27FC236}">
+                <a16:creationId xmlns:a16="http://schemas.microsoft.com/office/drawing/2014/main" id="{3200E1A2-39F8-476A-BC05-066633004643}"/>
+              </a:ext>
+            </a:extLst>
+          </p:cNvPr>
+          <p:cNvSpPr/>
+          <p:nvPr/>
+        </p:nvSpPr>
+        <p:spPr>
+          <a:xfrm rot="16200000">
+            <a:off x="4577091" y="2631787"/>
+            <a:ext cx="276999" cy="1462174"/>
+          </a:xfrm>
+          <a:prstGeom prst="can">
+            <a:avLst/>
+          </a:prstGeom>
+          <a:noFill/>
+          <a:ln>
+            <a:solidFill>
+              <a:schemeClr val="tx1"/>
+            </a:solidFill>
+          </a:ln>
+        </p:spPr>
+        <p:style>
+          <a:lnRef idx="2">
+            <a:schemeClr val="accent1">
+              <a:shade val="50000"/>
+            </a:schemeClr>
+          </a:lnRef>
+          <a:fillRef idx="1">
+            <a:schemeClr val="accent1"/>
+          </a:fillRef>
+          <a:effectRef idx="0">
+            <a:schemeClr val="accent1"/>
+          </a:effectRef>
+          <a:fontRef idx="minor">
+            <a:schemeClr val="lt1"/>
+          </a:fontRef>
+        </p:style>
+        <p:txBody>
+          <a:bodyPr rtlCol="0" anchor="ctr"/>
+          <a:lstStyle/>
+          <a:p>
+            <a:pPr algn="ctr"/>
+            <a:endParaRPr lang="fr-BE" dirty="0"/>
+          </a:p>
+        </p:txBody>
+      </p:sp>
+      <p:sp>
+        <p:nvSpPr>
+          <p:cNvPr id="178" name="ZoneTexte 177">
+            <a:extLst>
+              <a:ext uri="{FF2B5EF4-FFF2-40B4-BE49-F238E27FC236}">
+                <a16:creationId xmlns:a16="http://schemas.microsoft.com/office/drawing/2014/main" id="{BA87F82C-F4D3-4CC0-A6A8-653AE73F41CC}"/>
+              </a:ext>
+            </a:extLst>
+          </p:cNvPr>
+          <p:cNvSpPr txBox="1"/>
+          <p:nvPr/>
+        </p:nvSpPr>
+        <p:spPr>
+          <a:xfrm>
+            <a:off x="4035413" y="3208439"/>
+            <a:ext cx="1109840" cy="276999"/>
+          </a:xfrm>
+          <a:prstGeom prst="rect">
+            <a:avLst/>
+          </a:prstGeom>
+          <a:noFill/>
+        </p:spPr>
+        <p:txBody>
+          <a:bodyPr wrap="square" rtlCol="0">
+            <a:spAutoFit/>
+          </a:bodyPr>
+          <a:lstStyle/>
+          <a:p>
+            <a:r>
+              <a:rPr lang="fr-BE" sz="1200" b="1" dirty="0"/>
+              <a:t>Case plan</a:t>
+            </a:r>
+          </a:p>
+        </p:txBody>
+      </p:sp>
+      <p:sp>
+        <p:nvSpPr>
+          <p:cNvPr id="179" name="Cylindre 178">
+            <a:extLst>
+              <a:ext uri="{FF2B5EF4-FFF2-40B4-BE49-F238E27FC236}">
+                <a16:creationId xmlns:a16="http://schemas.microsoft.com/office/drawing/2014/main" id="{D7E45188-C021-4A41-B886-5E7A4C936785}"/>
+              </a:ext>
+            </a:extLst>
+          </p:cNvPr>
+          <p:cNvSpPr/>
+          <p:nvPr/>
+        </p:nvSpPr>
+        <p:spPr>
+          <a:xfrm rot="16200000">
+            <a:off x="4564512" y="2997195"/>
+            <a:ext cx="276999" cy="1462183"/>
+          </a:xfrm>
+          <a:prstGeom prst="can">
+            <a:avLst/>
+          </a:prstGeom>
+          <a:noFill/>
+          <a:ln>
+            <a:solidFill>
+              <a:schemeClr val="tx1"/>
+            </a:solidFill>
+          </a:ln>
+        </p:spPr>
+        <p:style>
+          <a:lnRef idx="2">
+            <a:schemeClr val="accent1">
+              <a:shade val="50000"/>
+            </a:schemeClr>
+          </a:lnRef>
+          <a:fillRef idx="1">
+            <a:schemeClr val="accent1"/>
+          </a:fillRef>
+          <a:effectRef idx="0">
+            <a:schemeClr val="accent1"/>
+          </a:effectRef>
+          <a:fontRef idx="minor">
+            <a:schemeClr val="lt1"/>
+          </a:fontRef>
+        </p:style>
+        <p:txBody>
+          <a:bodyPr rtlCol="0" anchor="ctr"/>
+          <a:lstStyle/>
+          <a:p>
+            <a:pPr algn="ctr"/>
+            <a:endParaRPr lang="fr-BE" dirty="0"/>
+          </a:p>
+        </p:txBody>
+      </p:sp>
+      <p:sp>
+        <p:nvSpPr>
+          <p:cNvPr id="180" name="ZoneTexte 179">
+            <a:extLst>
+              <a:ext uri="{FF2B5EF4-FFF2-40B4-BE49-F238E27FC236}">
+                <a16:creationId xmlns:a16="http://schemas.microsoft.com/office/drawing/2014/main" id="{380C38F2-159A-4225-863B-8DA759DC0EBD}"/>
+              </a:ext>
+            </a:extLst>
+          </p:cNvPr>
+          <p:cNvSpPr txBox="1"/>
+          <p:nvPr/>
+        </p:nvSpPr>
+        <p:spPr>
+          <a:xfrm>
+            <a:off x="3984503" y="3591930"/>
+            <a:ext cx="1462183" cy="276999"/>
+          </a:xfrm>
+          <a:prstGeom prst="rect">
+            <a:avLst/>
+          </a:prstGeom>
+          <a:noFill/>
+        </p:spPr>
+        <p:txBody>
+          <a:bodyPr wrap="square" rtlCol="0">
+            <a:spAutoFit/>
+          </a:bodyPr>
+          <a:lstStyle/>
+          <a:p>
+            <a:r>
+              <a:rPr lang="fr-BE" sz="1200" b="1" dirty="0"/>
+              <a:t>Case plan instance</a:t>
+            </a:r>
+          </a:p>
+        </p:txBody>
+      </p:sp>
+      <p:sp>
+        <p:nvSpPr>
+          <p:cNvPr id="183" name="Cylindre 182">
+            <a:extLst>
+              <a:ext uri="{FF2B5EF4-FFF2-40B4-BE49-F238E27FC236}">
+                <a16:creationId xmlns:a16="http://schemas.microsoft.com/office/drawing/2014/main" id="{2CB08635-676F-4D55-8F1F-B0CB96729D74}"/>
+              </a:ext>
+            </a:extLst>
+          </p:cNvPr>
+          <p:cNvSpPr/>
+          <p:nvPr/>
+        </p:nvSpPr>
+        <p:spPr>
+          <a:xfrm rot="16200000">
+            <a:off x="6494423" y="3009549"/>
+            <a:ext cx="276999" cy="1462183"/>
+          </a:xfrm>
+          <a:prstGeom prst="can">
+            <a:avLst/>
+          </a:prstGeom>
+          <a:noFill/>
+          <a:ln>
+            <a:solidFill>
+              <a:schemeClr val="tx1"/>
+            </a:solidFill>
+          </a:ln>
+        </p:spPr>
+        <p:style>
+          <a:lnRef idx="2">
+            <a:schemeClr val="accent1">
+              <a:shade val="50000"/>
+            </a:schemeClr>
+          </a:lnRef>
+          <a:fillRef idx="1">
+            <a:schemeClr val="accent1"/>
+          </a:fillRef>
+          <a:effectRef idx="0">
+            <a:schemeClr val="accent1"/>
+          </a:effectRef>
+          <a:fontRef idx="minor">
+            <a:schemeClr val="lt1"/>
+          </a:fontRef>
+        </p:style>
+        <p:txBody>
+          <a:bodyPr rtlCol="0" anchor="ctr"/>
+          <a:lstStyle/>
+          <a:p>
+            <a:pPr algn="ctr"/>
+            <a:endParaRPr lang="fr-BE" dirty="0"/>
+          </a:p>
+        </p:txBody>
+      </p:sp>
+      <p:sp>
+        <p:nvSpPr>
+          <p:cNvPr id="184" name="ZoneTexte 183">
+            <a:extLst>
+              <a:ext uri="{FF2B5EF4-FFF2-40B4-BE49-F238E27FC236}">
+                <a16:creationId xmlns:a16="http://schemas.microsoft.com/office/drawing/2014/main" id="{73EEA774-C404-4AE2-A1FC-A82E8DE40FB2}"/>
+              </a:ext>
+            </a:extLst>
+          </p:cNvPr>
+          <p:cNvSpPr txBox="1"/>
+          <p:nvPr/>
+        </p:nvSpPr>
+        <p:spPr>
+          <a:xfrm>
+            <a:off x="5945077" y="3590604"/>
+            <a:ext cx="1398743" cy="276999"/>
+          </a:xfrm>
+          <a:prstGeom prst="rect">
+            <a:avLst/>
+          </a:prstGeom>
+          <a:noFill/>
+        </p:spPr>
+        <p:txBody>
+          <a:bodyPr wrap="square" rtlCol="0">
+            <a:spAutoFit/>
+          </a:bodyPr>
+          <a:lstStyle/>
+          <a:p>
+            <a:r>
+              <a:rPr lang="fr-BE" sz="1200" b="1" dirty="0"/>
+              <a:t>Case </a:t>
+            </a:r>
+            <a:r>
+              <a:rPr lang="fr-BE" sz="1200" b="1" dirty="0" err="1"/>
+              <a:t>worker</a:t>
+            </a:r>
+            <a:r>
+              <a:rPr lang="fr-BE" sz="1200" b="1" dirty="0"/>
+              <a:t> </a:t>
+            </a:r>
+            <a:r>
+              <a:rPr lang="fr-BE" sz="1200" b="1" dirty="0" err="1"/>
+              <a:t>task</a:t>
+            </a:r>
+            <a:endParaRPr lang="fr-BE" sz="1200" b="1" dirty="0"/>
+          </a:p>
+        </p:txBody>
+      </p:sp>
       <p:pic>
         <p:nvPicPr>
-          <p:cNvPr id="165" name="Picture 2" descr="Résultat de recherche d'images pour &quot;openid logo svg&quot;">
+          <p:cNvPr id="203" name="Picture 6" descr="Résultat de recherche d'images pour &quot;dotnet core svg&quot;">
             <a:extLst>
               <a:ext uri="{FF2B5EF4-FFF2-40B4-BE49-F238E27FC236}">
-                <a16:creationId xmlns:a16="http://schemas.microsoft.com/office/drawing/2014/main" id="{39DC4952-437E-4E9D-AF75-CE2C712C29F4}"/>
+                <a16:creationId xmlns:a16="http://schemas.microsoft.com/office/drawing/2014/main" id="{1CDD5F4D-5778-427D-BB57-5F5F3A50A7FB}"/>
               </a:ext>
             </a:extLst>
           </p:cNvPr>
@@ -4487,631 +4589,6 @@
         </p:blipFill>
         <p:spPr bwMode="auto">
           <a:xfrm>
-            <a:off x="2269802" y="1324950"/>
-            <a:ext cx="338228" cy="338228"/>
-          </a:xfrm>
-          <a:prstGeom prst="rect">
-            <a:avLst/>
-          </a:prstGeom>
-          <a:noFill/>
-          <a:extLst>
-            <a:ext uri="{909E8E84-426E-40DD-AFC4-6F175D3DCCD1}">
-              <a14:hiddenFill xmlns:a14="http://schemas.microsoft.com/office/drawing/2010/main">
-                <a:solidFill>
-                  <a:srgbClr val="FFFFFF"/>
-                </a:solidFill>
-              </a14:hiddenFill>
-            </a:ext>
-          </a:extLst>
-        </p:spPr>
-      </p:pic>
-      <p:pic>
-        <p:nvPicPr>
-          <p:cNvPr id="166" name="Graphique 165">
-            <a:extLst>
-              <a:ext uri="{FF2B5EF4-FFF2-40B4-BE49-F238E27FC236}">
-                <a16:creationId xmlns:a16="http://schemas.microsoft.com/office/drawing/2014/main" id="{71A3C1BB-69CF-4121-A52B-D2171AE78FDE}"/>
-              </a:ext>
-            </a:extLst>
-          </p:cNvPr>
-          <p:cNvPicPr>
-            <a:picLocks noChangeAspect="1"/>
-          </p:cNvPicPr>
-          <p:nvPr/>
-        </p:nvPicPr>
-        <p:blipFill>
-          <a:blip r:embed="rId5" cstate="print">
-            <a:extLst>
-              <a:ext uri="{28A0092B-C50C-407E-A947-70E740481C1C}">
-                <a14:useLocalDpi xmlns:a14="http://schemas.microsoft.com/office/drawing/2010/main" val="0"/>
-              </a:ext>
-              <a:ext uri="{96DAC541-7B7A-43D3-8B79-37D633B846F1}">
-                <asvg:svgBlip xmlns:asvg="http://schemas.microsoft.com/office/drawing/2016/SVG/main" r:embed="rId6"/>
-              </a:ext>
-            </a:extLst>
-          </a:blip>
-          <a:stretch>
-            <a:fillRect/>
-          </a:stretch>
-        </p:blipFill>
-        <p:spPr>
-          <a:xfrm>
-            <a:off x="9191069" y="1342577"/>
-            <a:ext cx="387338" cy="387338"/>
-          </a:xfrm>
-          <a:prstGeom prst="rect">
-            <a:avLst/>
-          </a:prstGeom>
-        </p:spPr>
-      </p:pic>
-      <p:sp>
-        <p:nvSpPr>
-          <p:cNvPr id="177" name="Cylindre 176">
-            <a:extLst>
-              <a:ext uri="{FF2B5EF4-FFF2-40B4-BE49-F238E27FC236}">
-                <a16:creationId xmlns:a16="http://schemas.microsoft.com/office/drawing/2014/main" id="{3200E1A2-39F8-476A-BC05-066633004643}"/>
-              </a:ext>
-            </a:extLst>
-          </p:cNvPr>
-          <p:cNvSpPr/>
-          <p:nvPr/>
-        </p:nvSpPr>
-        <p:spPr>
-          <a:xfrm rot="16200000">
-            <a:off x="3881500" y="2738861"/>
-            <a:ext cx="276999" cy="1462174"/>
-          </a:xfrm>
-          <a:prstGeom prst="can">
-            <a:avLst/>
-          </a:prstGeom>
-          <a:noFill/>
-          <a:ln>
-            <a:solidFill>
-              <a:schemeClr val="tx1"/>
-            </a:solidFill>
-          </a:ln>
-        </p:spPr>
-        <p:style>
-          <a:lnRef idx="2">
-            <a:schemeClr val="accent1">
-              <a:shade val="50000"/>
-            </a:schemeClr>
-          </a:lnRef>
-          <a:fillRef idx="1">
-            <a:schemeClr val="accent1"/>
-          </a:fillRef>
-          <a:effectRef idx="0">
-            <a:schemeClr val="accent1"/>
-          </a:effectRef>
-          <a:fontRef idx="minor">
-            <a:schemeClr val="lt1"/>
-          </a:fontRef>
-        </p:style>
-        <p:txBody>
-          <a:bodyPr rtlCol="0" anchor="ctr"/>
-          <a:lstStyle/>
-          <a:p>
-            <a:pPr algn="ctr"/>
-            <a:endParaRPr lang="fr-BE" dirty="0"/>
-          </a:p>
-        </p:txBody>
-      </p:sp>
-      <p:sp>
-        <p:nvSpPr>
-          <p:cNvPr id="178" name="ZoneTexte 177">
-            <a:extLst>
-              <a:ext uri="{FF2B5EF4-FFF2-40B4-BE49-F238E27FC236}">
-                <a16:creationId xmlns:a16="http://schemas.microsoft.com/office/drawing/2014/main" id="{BA87F82C-F4D3-4CC0-A6A8-653AE73F41CC}"/>
-              </a:ext>
-            </a:extLst>
-          </p:cNvPr>
-          <p:cNvSpPr txBox="1"/>
-          <p:nvPr/>
-        </p:nvSpPr>
-        <p:spPr>
-          <a:xfrm>
-            <a:off x="3352353" y="3325452"/>
-            <a:ext cx="1109840" cy="276999"/>
-          </a:xfrm>
-          <a:prstGeom prst="rect">
-            <a:avLst/>
-          </a:prstGeom>
-          <a:noFill/>
-        </p:spPr>
-        <p:txBody>
-          <a:bodyPr wrap="square" rtlCol="0">
-            <a:spAutoFit/>
-          </a:bodyPr>
-          <a:lstStyle/>
-          <a:p>
-            <a:r>
-              <a:rPr lang="fr-BE" sz="1200" b="1" dirty="0"/>
-              <a:t>Case plan</a:t>
-            </a:r>
-          </a:p>
-        </p:txBody>
-      </p:sp>
-      <p:sp>
-        <p:nvSpPr>
-          <p:cNvPr id="179" name="Cylindre 178">
-            <a:extLst>
-              <a:ext uri="{FF2B5EF4-FFF2-40B4-BE49-F238E27FC236}">
-                <a16:creationId xmlns:a16="http://schemas.microsoft.com/office/drawing/2014/main" id="{D7E45188-C021-4A41-B886-5E7A4C936785}"/>
-              </a:ext>
-            </a:extLst>
-          </p:cNvPr>
-          <p:cNvSpPr/>
-          <p:nvPr/>
-        </p:nvSpPr>
-        <p:spPr>
-          <a:xfrm rot="16200000">
-            <a:off x="3887794" y="3131965"/>
-            <a:ext cx="276999" cy="1462183"/>
-          </a:xfrm>
-          <a:prstGeom prst="can">
-            <a:avLst/>
-          </a:prstGeom>
-          <a:noFill/>
-          <a:ln>
-            <a:solidFill>
-              <a:schemeClr val="tx1"/>
-            </a:solidFill>
-          </a:ln>
-        </p:spPr>
-        <p:style>
-          <a:lnRef idx="2">
-            <a:schemeClr val="accent1">
-              <a:shade val="50000"/>
-            </a:schemeClr>
-          </a:lnRef>
-          <a:fillRef idx="1">
-            <a:schemeClr val="accent1"/>
-          </a:fillRef>
-          <a:effectRef idx="0">
-            <a:schemeClr val="accent1"/>
-          </a:effectRef>
-          <a:fontRef idx="minor">
-            <a:schemeClr val="lt1"/>
-          </a:fontRef>
-        </p:style>
-        <p:txBody>
-          <a:bodyPr rtlCol="0" anchor="ctr"/>
-          <a:lstStyle/>
-          <a:p>
-            <a:pPr algn="ctr"/>
-            <a:endParaRPr lang="fr-BE" dirty="0"/>
-          </a:p>
-        </p:txBody>
-      </p:sp>
-      <p:sp>
-        <p:nvSpPr>
-          <p:cNvPr id="180" name="ZoneTexte 179">
-            <a:extLst>
-              <a:ext uri="{FF2B5EF4-FFF2-40B4-BE49-F238E27FC236}">
-                <a16:creationId xmlns:a16="http://schemas.microsoft.com/office/drawing/2014/main" id="{380C38F2-159A-4225-863B-8DA759DC0EBD}"/>
-              </a:ext>
-            </a:extLst>
-          </p:cNvPr>
-          <p:cNvSpPr txBox="1"/>
-          <p:nvPr/>
-        </p:nvSpPr>
-        <p:spPr>
-          <a:xfrm>
-            <a:off x="3358641" y="3718561"/>
-            <a:ext cx="1462183" cy="276999"/>
-          </a:xfrm>
-          <a:prstGeom prst="rect">
-            <a:avLst/>
-          </a:prstGeom>
-          <a:noFill/>
-        </p:spPr>
-        <p:txBody>
-          <a:bodyPr wrap="square" rtlCol="0">
-            <a:spAutoFit/>
-          </a:bodyPr>
-          <a:lstStyle/>
-          <a:p>
-            <a:r>
-              <a:rPr lang="fr-BE" sz="1200" b="1" dirty="0"/>
-              <a:t>Case plan instance</a:t>
-            </a:r>
-          </a:p>
-        </p:txBody>
-      </p:sp>
-      <p:sp>
-        <p:nvSpPr>
-          <p:cNvPr id="181" name="Cylindre 180">
-            <a:extLst>
-              <a:ext uri="{FF2B5EF4-FFF2-40B4-BE49-F238E27FC236}">
-                <a16:creationId xmlns:a16="http://schemas.microsoft.com/office/drawing/2014/main" id="{0ED381E1-87FF-4951-9456-F5147EB23CDE}"/>
-              </a:ext>
-            </a:extLst>
-          </p:cNvPr>
-          <p:cNvSpPr/>
-          <p:nvPr/>
-        </p:nvSpPr>
-        <p:spPr>
-          <a:xfrm rot="16200000">
-            <a:off x="5459674" y="2726410"/>
-            <a:ext cx="276999" cy="1462183"/>
-          </a:xfrm>
-          <a:prstGeom prst="can">
-            <a:avLst/>
-          </a:prstGeom>
-          <a:noFill/>
-          <a:ln>
-            <a:solidFill>
-              <a:schemeClr val="tx1"/>
-            </a:solidFill>
-          </a:ln>
-        </p:spPr>
-        <p:style>
-          <a:lnRef idx="2">
-            <a:schemeClr val="accent1">
-              <a:shade val="50000"/>
-            </a:schemeClr>
-          </a:lnRef>
-          <a:fillRef idx="1">
-            <a:schemeClr val="accent1"/>
-          </a:fillRef>
-          <a:effectRef idx="0">
-            <a:schemeClr val="accent1"/>
-          </a:effectRef>
-          <a:fontRef idx="minor">
-            <a:schemeClr val="lt1"/>
-          </a:fontRef>
-        </p:style>
-        <p:txBody>
-          <a:bodyPr rtlCol="0" anchor="ctr"/>
-          <a:lstStyle/>
-          <a:p>
-            <a:pPr algn="ctr"/>
-            <a:endParaRPr lang="fr-BE" dirty="0"/>
-          </a:p>
-        </p:txBody>
-      </p:sp>
-      <p:sp>
-        <p:nvSpPr>
-          <p:cNvPr id="182" name="ZoneTexte 181">
-            <a:extLst>
-              <a:ext uri="{FF2B5EF4-FFF2-40B4-BE49-F238E27FC236}">
-                <a16:creationId xmlns:a16="http://schemas.microsoft.com/office/drawing/2014/main" id="{F53EF884-40FD-46E7-9863-355030280AF6}"/>
-              </a:ext>
-            </a:extLst>
-          </p:cNvPr>
-          <p:cNvSpPr txBox="1"/>
-          <p:nvPr/>
-        </p:nvSpPr>
-        <p:spPr>
-          <a:xfrm>
-            <a:off x="4930522" y="3313006"/>
-            <a:ext cx="1109840" cy="276999"/>
-          </a:xfrm>
-          <a:prstGeom prst="rect">
-            <a:avLst/>
-          </a:prstGeom>
-          <a:noFill/>
-        </p:spPr>
-        <p:txBody>
-          <a:bodyPr wrap="square" rtlCol="0">
-            <a:spAutoFit/>
-          </a:bodyPr>
-          <a:lstStyle/>
-          <a:p>
-            <a:r>
-              <a:rPr lang="fr-BE" sz="1200" b="1" dirty="0" err="1"/>
-              <a:t>Form</a:t>
-            </a:r>
-            <a:r>
-              <a:rPr lang="fr-BE" sz="1200" b="1" dirty="0"/>
-              <a:t> instance</a:t>
-            </a:r>
-          </a:p>
-        </p:txBody>
-      </p:sp>
-      <p:sp>
-        <p:nvSpPr>
-          <p:cNvPr id="183" name="Cylindre 182">
-            <a:extLst>
-              <a:ext uri="{FF2B5EF4-FFF2-40B4-BE49-F238E27FC236}">
-                <a16:creationId xmlns:a16="http://schemas.microsoft.com/office/drawing/2014/main" id="{2CB08635-676F-4D55-8F1F-B0CB96729D74}"/>
-              </a:ext>
-            </a:extLst>
-          </p:cNvPr>
-          <p:cNvSpPr/>
-          <p:nvPr/>
-        </p:nvSpPr>
-        <p:spPr>
-          <a:xfrm rot="16200000">
-            <a:off x="5459675" y="3132295"/>
-            <a:ext cx="276999" cy="1462183"/>
-          </a:xfrm>
-          <a:prstGeom prst="can">
-            <a:avLst/>
-          </a:prstGeom>
-          <a:noFill/>
-          <a:ln>
-            <a:solidFill>
-              <a:schemeClr val="tx1"/>
-            </a:solidFill>
-          </a:ln>
-        </p:spPr>
-        <p:style>
-          <a:lnRef idx="2">
-            <a:schemeClr val="accent1">
-              <a:shade val="50000"/>
-            </a:schemeClr>
-          </a:lnRef>
-          <a:fillRef idx="1">
-            <a:schemeClr val="accent1"/>
-          </a:fillRef>
-          <a:effectRef idx="0">
-            <a:schemeClr val="accent1"/>
-          </a:effectRef>
-          <a:fontRef idx="minor">
-            <a:schemeClr val="lt1"/>
-          </a:fontRef>
-        </p:style>
-        <p:txBody>
-          <a:bodyPr rtlCol="0" anchor="ctr"/>
-          <a:lstStyle/>
-          <a:p>
-            <a:pPr algn="ctr"/>
-            <a:endParaRPr lang="fr-BE" dirty="0"/>
-          </a:p>
-        </p:txBody>
-      </p:sp>
-      <p:sp>
-        <p:nvSpPr>
-          <p:cNvPr id="184" name="ZoneTexte 183">
-            <a:extLst>
-              <a:ext uri="{FF2B5EF4-FFF2-40B4-BE49-F238E27FC236}">
-                <a16:creationId xmlns:a16="http://schemas.microsoft.com/office/drawing/2014/main" id="{73EEA774-C404-4AE2-A1FC-A82E8DE40FB2}"/>
-              </a:ext>
-            </a:extLst>
-          </p:cNvPr>
-          <p:cNvSpPr txBox="1"/>
-          <p:nvPr/>
-        </p:nvSpPr>
-        <p:spPr>
-          <a:xfrm>
-            <a:off x="4930522" y="3718891"/>
-            <a:ext cx="1398743" cy="276999"/>
-          </a:xfrm>
-          <a:prstGeom prst="rect">
-            <a:avLst/>
-          </a:prstGeom>
-          <a:noFill/>
-        </p:spPr>
-        <p:txBody>
-          <a:bodyPr wrap="square" rtlCol="0">
-            <a:spAutoFit/>
-          </a:bodyPr>
-          <a:lstStyle/>
-          <a:p>
-            <a:r>
-              <a:rPr lang="fr-BE" sz="1200" b="1" dirty="0"/>
-              <a:t>Case </a:t>
-            </a:r>
-            <a:r>
-              <a:rPr lang="fr-BE" sz="1200" b="1" dirty="0" err="1"/>
-              <a:t>worker</a:t>
-            </a:r>
-            <a:r>
-              <a:rPr lang="fr-BE" sz="1200" b="1" dirty="0"/>
-              <a:t> </a:t>
-            </a:r>
-            <a:r>
-              <a:rPr lang="fr-BE" sz="1200" b="1" dirty="0" err="1"/>
-              <a:t>task</a:t>
-            </a:r>
-            <a:endParaRPr lang="fr-BE" sz="1200" b="1" dirty="0"/>
-          </a:p>
-        </p:txBody>
-      </p:sp>
-      <p:sp>
-        <p:nvSpPr>
-          <p:cNvPr id="195" name="Cylindre 194">
-            <a:extLst>
-              <a:ext uri="{FF2B5EF4-FFF2-40B4-BE49-F238E27FC236}">
-                <a16:creationId xmlns:a16="http://schemas.microsoft.com/office/drawing/2014/main" id="{58A65E8F-D962-438A-8838-9342C18FE090}"/>
-              </a:ext>
-            </a:extLst>
-          </p:cNvPr>
-          <p:cNvSpPr/>
-          <p:nvPr/>
-        </p:nvSpPr>
-        <p:spPr>
-          <a:xfrm rot="16200000">
-            <a:off x="3881501" y="2738861"/>
-            <a:ext cx="276999" cy="1462174"/>
-          </a:xfrm>
-          <a:prstGeom prst="can">
-            <a:avLst/>
-          </a:prstGeom>
-          <a:noFill/>
-          <a:ln>
-            <a:solidFill>
-              <a:schemeClr val="tx1"/>
-            </a:solidFill>
-          </a:ln>
-        </p:spPr>
-        <p:style>
-          <a:lnRef idx="2">
-            <a:schemeClr val="accent1">
-              <a:shade val="50000"/>
-            </a:schemeClr>
-          </a:lnRef>
-          <a:fillRef idx="1">
-            <a:schemeClr val="accent1"/>
-          </a:fillRef>
-          <a:effectRef idx="0">
-            <a:schemeClr val="accent1"/>
-          </a:effectRef>
-          <a:fontRef idx="minor">
-            <a:schemeClr val="lt1"/>
-          </a:fontRef>
-        </p:style>
-        <p:txBody>
-          <a:bodyPr rtlCol="0" anchor="ctr"/>
-          <a:lstStyle/>
-          <a:p>
-            <a:pPr algn="ctr"/>
-            <a:endParaRPr lang="fr-BE" dirty="0"/>
-          </a:p>
-        </p:txBody>
-      </p:sp>
-      <p:sp>
-        <p:nvSpPr>
-          <p:cNvPr id="196" name="ZoneTexte 195">
-            <a:extLst>
-              <a:ext uri="{FF2B5EF4-FFF2-40B4-BE49-F238E27FC236}">
-                <a16:creationId xmlns:a16="http://schemas.microsoft.com/office/drawing/2014/main" id="{B4EEBCAD-3E39-43AE-8E18-EEBDE5BA1F27}"/>
-              </a:ext>
-            </a:extLst>
-          </p:cNvPr>
-          <p:cNvSpPr txBox="1"/>
-          <p:nvPr/>
-        </p:nvSpPr>
-        <p:spPr>
-          <a:xfrm>
-            <a:off x="3352354" y="3325452"/>
-            <a:ext cx="1109840" cy="276999"/>
-          </a:xfrm>
-          <a:prstGeom prst="rect">
-            <a:avLst/>
-          </a:prstGeom>
-          <a:noFill/>
-        </p:spPr>
-        <p:txBody>
-          <a:bodyPr wrap="square" rtlCol="0">
-            <a:spAutoFit/>
-          </a:bodyPr>
-          <a:lstStyle/>
-          <a:p>
-            <a:r>
-              <a:rPr lang="fr-BE" sz="1200" b="1" dirty="0"/>
-              <a:t>Case plan</a:t>
-            </a:r>
-          </a:p>
-        </p:txBody>
-      </p:sp>
-      <p:sp>
-        <p:nvSpPr>
-          <p:cNvPr id="197" name="Cylindre 196">
-            <a:extLst>
-              <a:ext uri="{FF2B5EF4-FFF2-40B4-BE49-F238E27FC236}">
-                <a16:creationId xmlns:a16="http://schemas.microsoft.com/office/drawing/2014/main" id="{264E002D-6B26-4FE8-9DC7-4294CF603EF0}"/>
-              </a:ext>
-            </a:extLst>
-          </p:cNvPr>
-          <p:cNvSpPr/>
-          <p:nvPr/>
-        </p:nvSpPr>
-        <p:spPr>
-          <a:xfrm rot="16200000">
-            <a:off x="7052713" y="2752533"/>
-            <a:ext cx="276999" cy="1462174"/>
-          </a:xfrm>
-          <a:prstGeom prst="can">
-            <a:avLst/>
-          </a:prstGeom>
-          <a:noFill/>
-          <a:ln>
-            <a:solidFill>
-              <a:schemeClr val="tx1"/>
-            </a:solidFill>
-          </a:ln>
-        </p:spPr>
-        <p:style>
-          <a:lnRef idx="2">
-            <a:schemeClr val="accent1">
-              <a:shade val="50000"/>
-            </a:schemeClr>
-          </a:lnRef>
-          <a:fillRef idx="1">
-            <a:schemeClr val="accent1"/>
-          </a:fillRef>
-          <a:effectRef idx="0">
-            <a:schemeClr val="accent1"/>
-          </a:effectRef>
-          <a:fontRef idx="minor">
-            <a:schemeClr val="lt1"/>
-          </a:fontRef>
-        </p:style>
-        <p:txBody>
-          <a:bodyPr rtlCol="0" anchor="ctr"/>
-          <a:lstStyle/>
-          <a:p>
-            <a:pPr algn="ctr"/>
-            <a:endParaRPr lang="fr-BE" dirty="0"/>
-          </a:p>
-        </p:txBody>
-      </p:sp>
-      <p:sp>
-        <p:nvSpPr>
-          <p:cNvPr id="198" name="ZoneTexte 197">
-            <a:extLst>
-              <a:ext uri="{FF2B5EF4-FFF2-40B4-BE49-F238E27FC236}">
-                <a16:creationId xmlns:a16="http://schemas.microsoft.com/office/drawing/2014/main" id="{EAC8BD04-CD4D-4F86-978D-02D0250982ED}"/>
-              </a:ext>
-            </a:extLst>
-          </p:cNvPr>
-          <p:cNvSpPr txBox="1"/>
-          <p:nvPr/>
-        </p:nvSpPr>
-        <p:spPr>
-          <a:xfrm>
-            <a:off x="6523566" y="3339124"/>
-            <a:ext cx="1109840" cy="276999"/>
-          </a:xfrm>
-          <a:prstGeom prst="rect">
-            <a:avLst/>
-          </a:prstGeom>
-          <a:noFill/>
-        </p:spPr>
-        <p:txBody>
-          <a:bodyPr wrap="square" rtlCol="0">
-            <a:spAutoFit/>
-          </a:bodyPr>
-          <a:lstStyle/>
-          <a:p>
-            <a:r>
-              <a:rPr lang="fr-BE" sz="1200" b="1" dirty="0"/>
-              <a:t>Case file</a:t>
-            </a:r>
-          </a:p>
-        </p:txBody>
-      </p:sp>
-      <p:pic>
-        <p:nvPicPr>
-          <p:cNvPr id="203" name="Picture 6" descr="Résultat de recherche d'images pour &quot;dotnet core svg&quot;">
-            <a:extLst>
-              <a:ext uri="{FF2B5EF4-FFF2-40B4-BE49-F238E27FC236}">
-                <a16:creationId xmlns:a16="http://schemas.microsoft.com/office/drawing/2014/main" id="{1CDD5F4D-5778-427D-BB57-5F5F3A50A7FB}"/>
-              </a:ext>
-            </a:extLst>
-          </p:cNvPr>
-          <p:cNvPicPr>
-            <a:picLocks noChangeAspect="1" noChangeArrowheads="1"/>
-          </p:cNvPicPr>
-          <p:nvPr/>
-        </p:nvPicPr>
-        <p:blipFill>
-          <a:blip r:embed="rId3" cstate="print">
-            <a:extLst>
-              <a:ext uri="{28A0092B-C50C-407E-A947-70E740481C1C}">
-                <a14:useLocalDpi xmlns:a14="http://schemas.microsoft.com/office/drawing/2010/main" val="0"/>
-              </a:ext>
-            </a:extLst>
-          </a:blip>
-          <a:srcRect/>
-          <a:stretch>
-            <a:fillRect/>
-          </a:stretch>
-        </p:blipFill>
-        <p:spPr bwMode="auto">
-          <a:xfrm>
             <a:off x="5320832" y="5711713"/>
             <a:ext cx="376340" cy="376340"/>
           </a:xfrm>
@@ -5145,7 +4622,7 @@
           <p:nvPr/>
         </p:nvPicPr>
         <p:blipFill>
-          <a:blip r:embed="rId3" cstate="print">
+          <a:blip r:embed="rId4" cstate="print">
             <a:extLst>
               <a:ext uri="{28A0092B-C50C-407E-A947-70E740481C1C}">
                 <a14:useLocalDpi xmlns:a14="http://schemas.microsoft.com/office/drawing/2010/main" val="0"/>
@@ -5159,7 +4636,7 @@
         </p:blipFill>
         <p:spPr bwMode="auto">
           <a:xfrm>
-            <a:off x="5320832" y="2271608"/>
+            <a:off x="5306770" y="1373340"/>
             <a:ext cx="376340" cy="376340"/>
           </a:xfrm>
           <a:prstGeom prst="rect">
@@ -5191,7 +4668,7 @@
         </p:nvSpPr>
         <p:spPr>
           <a:xfrm rot="16200000">
-            <a:off x="7052714" y="2752533"/>
+            <a:off x="6507539" y="2569049"/>
             <a:ext cx="276999" cy="1462174"/>
           </a:xfrm>
           <a:prstGeom prst="can">
@@ -5243,7 +4720,7 @@
         </p:nvSpPr>
         <p:spPr>
           <a:xfrm>
-            <a:off x="6523567" y="3339124"/>
+            <a:off x="5978392" y="3155640"/>
             <a:ext cx="1109840" cy="276999"/>
           </a:xfrm>
           <a:prstGeom prst="rect">
@@ -5264,51 +4741,6 @@
           </a:p>
         </p:txBody>
       </p:sp>
-      <p:cxnSp>
-        <p:nvCxnSpPr>
-          <p:cNvPr id="23" name="Connecteur droit avec flèche 22">
-            <a:extLst>
-              <a:ext uri="{FF2B5EF4-FFF2-40B4-BE49-F238E27FC236}">
-                <a16:creationId xmlns:a16="http://schemas.microsoft.com/office/drawing/2014/main" id="{C02D880A-6A27-427F-BB84-0D15AF8F932E}"/>
-              </a:ext>
-            </a:extLst>
-          </p:cNvPr>
-          <p:cNvCxnSpPr>
-            <a:stCxn id="26" idx="2"/>
-            <a:endCxn id="5" idx="0"/>
-          </p:cNvCxnSpPr>
-          <p:nvPr/>
-        </p:nvCxnSpPr>
-        <p:spPr>
-          <a:xfrm flipH="1">
-            <a:off x="5509002" y="1729915"/>
-            <a:ext cx="1" cy="287052"/>
-          </a:xfrm>
-          <a:prstGeom prst="straightConnector1">
-            <a:avLst/>
-          </a:prstGeom>
-          <a:ln>
-            <a:solidFill>
-              <a:schemeClr val="tx1"/>
-            </a:solidFill>
-            <a:tailEnd type="triangle"/>
-          </a:ln>
-        </p:spPr>
-        <p:style>
-          <a:lnRef idx="1">
-            <a:schemeClr val="accent1"/>
-          </a:lnRef>
-          <a:fillRef idx="0">
-            <a:schemeClr val="accent1"/>
-          </a:fillRef>
-          <a:effectRef idx="0">
-            <a:schemeClr val="accent1"/>
-          </a:effectRef>
-          <a:fontRef idx="minor">
-            <a:schemeClr val="tx1"/>
-          </a:fontRef>
-        </p:style>
-      </p:cxnSp>
       <p:cxnSp>
         <p:nvCxnSpPr>
           <p:cNvPr id="29" name="Connecteur droit avec flèche 28">
@@ -5327,8 +4759,8 @@
         </p:nvCxnSpPr>
         <p:spPr>
           <a:xfrm>
-            <a:off x="5509002" y="2683020"/>
-            <a:ext cx="1" cy="389075"/>
+            <a:off x="5497014" y="1780817"/>
+            <a:ext cx="0" cy="1114776"/>
           </a:xfrm>
           <a:prstGeom prst="straightConnector1">
             <a:avLst/>
@@ -5355,54 +4787,6 @@
           </a:fontRef>
         </p:style>
       </p:cxnSp>
-      <p:sp>
-        <p:nvSpPr>
-          <p:cNvPr id="73" name="ZoneTexte 72">
-            <a:extLst>
-              <a:ext uri="{FF2B5EF4-FFF2-40B4-BE49-F238E27FC236}">
-                <a16:creationId xmlns:a16="http://schemas.microsoft.com/office/drawing/2014/main" id="{CC9507B4-3BDC-4A84-9B6E-0D8E256F9644}"/>
-              </a:ext>
-            </a:extLst>
-          </p:cNvPr>
-          <p:cNvSpPr txBox="1"/>
-          <p:nvPr/>
-        </p:nvSpPr>
-        <p:spPr>
-          <a:xfrm>
-            <a:off x="5382968" y="444660"/>
-            <a:ext cx="1420357" cy="553998"/>
-          </a:xfrm>
-          <a:prstGeom prst="rect">
-            <a:avLst/>
-          </a:prstGeom>
-          <a:noFill/>
-        </p:spPr>
-        <p:txBody>
-          <a:bodyPr wrap="square" rtlCol="0">
-            <a:spAutoFit/>
-          </a:bodyPr>
-          <a:lstStyle/>
-          <a:p>
-            <a:r>
-              <a:rPr lang="fr-BE" sz="1000" dirty="0"/>
-              <a:t>Call Gateway  </a:t>
-            </a:r>
-            <a:r>
-              <a:rPr lang="fr-BE" sz="1000" dirty="0" err="1"/>
-              <a:t>operations</a:t>
-            </a:r>
-            <a:r>
-              <a:rPr lang="fr-BE" sz="1000" dirty="0"/>
-              <a:t> </a:t>
-            </a:r>
-            <a:r>
-              <a:rPr lang="fr-BE" sz="1000" dirty="0" err="1"/>
-              <a:t>synchronously</a:t>
-            </a:r>
-            <a:endParaRPr lang="fr-BE" sz="1000" dirty="0"/>
-          </a:p>
-        </p:txBody>
-      </p:sp>
       <p:cxnSp>
         <p:nvCxnSpPr>
           <p:cNvPr id="34" name="Connecteur droit avec flèche 33">
@@ -5413,6 +4797,7 @@
             </a:extLst>
           </p:cNvPr>
           <p:cNvCxnSpPr>
+            <a:cxnSpLocks/>
             <a:stCxn id="4" idx="0"/>
             <a:endCxn id="10" idx="2"/>
           </p:cNvCxnSpPr>
@@ -5420,8 +4805,8 @@
         </p:nvCxnSpPr>
         <p:spPr>
           <a:xfrm flipV="1">
-            <a:off x="5509003" y="4211152"/>
-            <a:ext cx="0" cy="1271625"/>
+            <a:off x="5494940" y="4034650"/>
+            <a:ext cx="2074" cy="1448125"/>
           </a:xfrm>
           <a:prstGeom prst="straightConnector1">
             <a:avLst/>
@@ -5449,201 +4834,6 @@
           </a:fontRef>
         </p:style>
       </p:cxnSp>
-      <p:cxnSp>
-        <p:nvCxnSpPr>
-          <p:cNvPr id="36" name="Connecteur : en angle 35">
-            <a:extLst>
-              <a:ext uri="{FF2B5EF4-FFF2-40B4-BE49-F238E27FC236}">
-                <a16:creationId xmlns:a16="http://schemas.microsoft.com/office/drawing/2014/main" id="{04CE7FE5-B2CA-4CC2-B01A-6BF109DAD86B}"/>
-              </a:ext>
-            </a:extLst>
-          </p:cNvPr>
-          <p:cNvCxnSpPr>
-            <a:cxnSpLocks/>
-            <a:endCxn id="166" idx="2"/>
-          </p:cNvCxnSpPr>
-          <p:nvPr/>
-        </p:nvCxnSpPr>
-        <p:spPr>
-          <a:xfrm flipV="1">
-            <a:off x="6144175" y="1729915"/>
-            <a:ext cx="3240563" cy="423249"/>
-          </a:xfrm>
-          <a:prstGeom prst="bentConnector2">
-            <a:avLst/>
-          </a:prstGeom>
-          <a:ln>
-            <a:solidFill>
-              <a:schemeClr val="tx1"/>
-            </a:solidFill>
-            <a:headEnd type="triangle"/>
-            <a:tailEnd type="triangle"/>
-          </a:ln>
-        </p:spPr>
-        <p:style>
-          <a:lnRef idx="1">
-            <a:schemeClr val="accent1"/>
-          </a:lnRef>
-          <a:fillRef idx="0">
-            <a:schemeClr val="accent1"/>
-          </a:fillRef>
-          <a:effectRef idx="0">
-            <a:schemeClr val="accent1"/>
-          </a:effectRef>
-          <a:fontRef idx="minor">
-            <a:schemeClr val="tx1"/>
-          </a:fontRef>
-        </p:style>
-      </p:cxnSp>
-      <p:sp>
-        <p:nvSpPr>
-          <p:cNvPr id="79" name="ZoneTexte 78">
-            <a:extLst>
-              <a:ext uri="{FF2B5EF4-FFF2-40B4-BE49-F238E27FC236}">
-                <a16:creationId xmlns:a16="http://schemas.microsoft.com/office/drawing/2014/main" id="{C3062AD8-4BA5-4329-99BA-E12C30C84F57}"/>
-              </a:ext>
-            </a:extLst>
-          </p:cNvPr>
-          <p:cNvSpPr txBox="1"/>
-          <p:nvPr/>
-        </p:nvSpPr>
-        <p:spPr>
-          <a:xfrm>
-            <a:off x="6635918" y="2119164"/>
-            <a:ext cx="2965345" cy="246221"/>
-          </a:xfrm>
-          <a:prstGeom prst="rect">
-            <a:avLst/>
-          </a:prstGeom>
-          <a:noFill/>
-        </p:spPr>
-        <p:txBody>
-          <a:bodyPr wrap="square" rtlCol="0">
-            <a:spAutoFit/>
-          </a:bodyPr>
-          <a:lstStyle/>
-          <a:p>
-            <a:r>
-              <a:rPr lang="fr-BE" sz="1000" dirty="0"/>
-              <a:t>Check </a:t>
-            </a:r>
-            <a:r>
-              <a:rPr lang="fr-BE" sz="1000" dirty="0" err="1"/>
-              <a:t>access</a:t>
-            </a:r>
-            <a:r>
-              <a:rPr lang="fr-BE" sz="1000" dirty="0"/>
-              <a:t> </a:t>
-            </a:r>
-            <a:r>
-              <a:rPr lang="fr-BE" sz="1000" dirty="0" err="1"/>
-              <a:t>token</a:t>
-            </a:r>
-            <a:r>
-              <a:rPr lang="fr-BE" sz="1000" dirty="0"/>
-              <a:t> signature</a:t>
-            </a:r>
-          </a:p>
-        </p:txBody>
-      </p:sp>
-      <p:cxnSp>
-        <p:nvCxnSpPr>
-          <p:cNvPr id="39" name="Connecteur : en angle 38">
-            <a:extLst>
-              <a:ext uri="{FF2B5EF4-FFF2-40B4-BE49-F238E27FC236}">
-                <a16:creationId xmlns:a16="http://schemas.microsoft.com/office/drawing/2014/main" id="{391E7F0A-14F0-413A-9AB3-F85870E36A67}"/>
-              </a:ext>
-            </a:extLst>
-          </p:cNvPr>
-          <p:cNvCxnSpPr>
-            <a:stCxn id="26" idx="3"/>
-            <a:endCxn id="131" idx="1"/>
-          </p:cNvCxnSpPr>
-          <p:nvPr/>
-        </p:nvCxnSpPr>
-        <p:spPr>
-          <a:xfrm flipV="1">
-            <a:off x="6156164" y="1406749"/>
-            <a:ext cx="2627900" cy="1"/>
-          </a:xfrm>
-          <a:prstGeom prst="bentConnector3">
-            <a:avLst/>
-          </a:prstGeom>
-          <a:ln>
-            <a:solidFill>
-              <a:schemeClr val="tx1"/>
-            </a:solidFill>
-            <a:headEnd type="triangle"/>
-            <a:tailEnd type="triangle"/>
-          </a:ln>
-        </p:spPr>
-        <p:style>
-          <a:lnRef idx="1">
-            <a:schemeClr val="accent1"/>
-          </a:lnRef>
-          <a:fillRef idx="0">
-            <a:schemeClr val="accent1"/>
-          </a:fillRef>
-          <a:effectRef idx="0">
-            <a:schemeClr val="accent1"/>
-          </a:effectRef>
-          <a:fontRef idx="minor">
-            <a:schemeClr val="tx1"/>
-          </a:fontRef>
-        </p:style>
-      </p:cxnSp>
-      <p:sp>
-        <p:nvSpPr>
-          <p:cNvPr id="83" name="ZoneTexte 82">
-            <a:extLst>
-              <a:ext uri="{FF2B5EF4-FFF2-40B4-BE49-F238E27FC236}">
-                <a16:creationId xmlns:a16="http://schemas.microsoft.com/office/drawing/2014/main" id="{FD62DC6D-8F24-4DAA-B830-810CFC1C597C}"/>
-              </a:ext>
-            </a:extLst>
-          </p:cNvPr>
-          <p:cNvSpPr txBox="1"/>
-          <p:nvPr/>
-        </p:nvSpPr>
-        <p:spPr>
-          <a:xfrm>
-            <a:off x="6281783" y="1147415"/>
-            <a:ext cx="2965345" cy="246221"/>
-          </a:xfrm>
-          <a:prstGeom prst="rect">
-            <a:avLst/>
-          </a:prstGeom>
-          <a:noFill/>
-        </p:spPr>
-        <p:txBody>
-          <a:bodyPr wrap="square" rtlCol="0">
-            <a:spAutoFit/>
-          </a:bodyPr>
-          <a:lstStyle/>
-          <a:p>
-            <a:r>
-              <a:rPr lang="fr-BE" sz="1000" dirty="0" err="1"/>
-              <a:t>Get</a:t>
-            </a:r>
-            <a:r>
-              <a:rPr lang="fr-BE" sz="1000" dirty="0"/>
-              <a:t> </a:t>
-            </a:r>
-            <a:r>
-              <a:rPr lang="fr-BE" sz="1000" dirty="0" err="1"/>
-              <a:t>access</a:t>
-            </a:r>
-            <a:r>
-              <a:rPr lang="fr-BE" sz="1000" dirty="0"/>
-              <a:t> </a:t>
-            </a:r>
-            <a:r>
-              <a:rPr lang="fr-BE" sz="1000" dirty="0" err="1"/>
-              <a:t>token</a:t>
-            </a:r>
-            <a:endParaRPr lang="fr-BE" sz="1000" dirty="0"/>
-          </a:p>
-        </p:txBody>
-      </p:sp>
       <p:cxnSp>
         <p:nvCxnSpPr>
           <p:cNvPr id="42" name="Connecteur : en angle 41">
@@ -5655,14 +4845,15 @@
           </p:cNvPr>
           <p:cNvCxnSpPr>
             <a:cxnSpLocks/>
+            <a:stCxn id="12" idx="1"/>
             <a:endCxn id="130" idx="0"/>
           </p:cNvCxnSpPr>
           <p:nvPr/>
         </p:nvCxnSpPr>
         <p:spPr>
           <a:xfrm rot="10800000" flipV="1">
-            <a:off x="2452167" y="196947"/>
-            <a:ext cx="4286098" cy="911670"/>
+            <a:off x="2486064" y="396820"/>
+            <a:ext cx="2363789" cy="753523"/>
           </a:xfrm>
           <a:prstGeom prst="bentConnector2">
             <a:avLst/>
@@ -5704,7 +4895,7 @@
         </p:nvSpPr>
         <p:spPr>
           <a:xfrm>
-            <a:off x="2438916" y="215275"/>
+            <a:off x="2590810" y="139827"/>
             <a:ext cx="1470512" cy="246221"/>
           </a:xfrm>
           <a:prstGeom prst="rect">
@@ -5742,280 +4933,6 @@
           </a:p>
         </p:txBody>
       </p:sp>
-      <p:cxnSp>
-        <p:nvCxnSpPr>
-          <p:cNvPr id="88" name="Connecteur : en angle 87">
-            <a:extLst>
-              <a:ext uri="{FF2B5EF4-FFF2-40B4-BE49-F238E27FC236}">
-                <a16:creationId xmlns:a16="http://schemas.microsoft.com/office/drawing/2014/main" id="{7931016D-1186-4314-A306-5F924683F95C}"/>
-              </a:ext>
-            </a:extLst>
-          </p:cNvPr>
-          <p:cNvCxnSpPr>
-            <a:cxnSpLocks/>
-            <a:stCxn id="26" idx="1"/>
-            <a:endCxn id="130" idx="3"/>
-          </p:cNvCxnSpPr>
-          <p:nvPr/>
-        </p:nvCxnSpPr>
-        <p:spPr>
-          <a:xfrm rot="10800000">
-            <a:off x="3077397" y="1406750"/>
-            <a:ext cx="1784444" cy="1"/>
-          </a:xfrm>
-          <a:prstGeom prst="bentConnector3">
-            <a:avLst/>
-          </a:prstGeom>
-          <a:ln>
-            <a:solidFill>
-              <a:schemeClr val="tx1"/>
-            </a:solidFill>
-            <a:headEnd type="triangle"/>
-            <a:tailEnd type="triangle"/>
-          </a:ln>
-        </p:spPr>
-        <p:style>
-          <a:lnRef idx="1">
-            <a:schemeClr val="accent1"/>
-          </a:lnRef>
-          <a:fillRef idx="0">
-            <a:schemeClr val="accent1"/>
-          </a:fillRef>
-          <a:effectRef idx="0">
-            <a:schemeClr val="accent1"/>
-          </a:effectRef>
-          <a:fontRef idx="minor">
-            <a:schemeClr val="tx1"/>
-          </a:fontRef>
-        </p:style>
-      </p:cxnSp>
-      <p:sp>
-        <p:nvSpPr>
-          <p:cNvPr id="92" name="ZoneTexte 91">
-            <a:extLst>
-              <a:ext uri="{FF2B5EF4-FFF2-40B4-BE49-F238E27FC236}">
-                <a16:creationId xmlns:a16="http://schemas.microsoft.com/office/drawing/2014/main" id="{F083DF70-4174-44C9-BAF6-C5C3BFFF449A}"/>
-              </a:ext>
-            </a:extLst>
-          </p:cNvPr>
-          <p:cNvSpPr txBox="1"/>
-          <p:nvPr/>
-        </p:nvSpPr>
-        <p:spPr>
-          <a:xfrm>
-            <a:off x="2520097" y="1827062"/>
-            <a:ext cx="2965345" cy="246221"/>
-          </a:xfrm>
-          <a:prstGeom prst="rect">
-            <a:avLst/>
-          </a:prstGeom>
-          <a:noFill/>
-        </p:spPr>
-        <p:txBody>
-          <a:bodyPr wrap="square" rtlCol="0">
-            <a:spAutoFit/>
-          </a:bodyPr>
-          <a:lstStyle/>
-          <a:p>
-            <a:r>
-              <a:rPr lang="fr-BE" sz="1000" dirty="0"/>
-              <a:t>Check </a:t>
-            </a:r>
-            <a:r>
-              <a:rPr lang="fr-BE" sz="1000" dirty="0" err="1"/>
-              <a:t>identity</a:t>
-            </a:r>
-            <a:r>
-              <a:rPr lang="fr-BE" sz="1000" dirty="0"/>
-              <a:t> </a:t>
-            </a:r>
-            <a:r>
-              <a:rPr lang="fr-BE" sz="1000" dirty="0" err="1"/>
-              <a:t>token</a:t>
-            </a:r>
-            <a:r>
-              <a:rPr lang="fr-BE" sz="1000" dirty="0"/>
-              <a:t> signature</a:t>
-            </a:r>
-          </a:p>
-        </p:txBody>
-      </p:sp>
-      <p:sp>
-        <p:nvSpPr>
-          <p:cNvPr id="97" name="Rectangle 96">
-            <a:extLst>
-              <a:ext uri="{FF2B5EF4-FFF2-40B4-BE49-F238E27FC236}">
-                <a16:creationId xmlns:a16="http://schemas.microsoft.com/office/drawing/2014/main" id="{3944D248-E283-41B4-BBDA-24E470B5F32A}"/>
-              </a:ext>
-            </a:extLst>
-          </p:cNvPr>
-          <p:cNvSpPr/>
-          <p:nvPr/>
-        </p:nvSpPr>
-        <p:spPr>
-          <a:xfrm>
-            <a:off x="4018747" y="258619"/>
-            <a:ext cx="1294323" cy="544914"/>
-          </a:xfrm>
-          <a:prstGeom prst="rect">
-            <a:avLst/>
-          </a:prstGeom>
-          <a:noFill/>
-          <a:ln>
-            <a:solidFill>
-              <a:schemeClr val="tx1"/>
-            </a:solidFill>
-          </a:ln>
-        </p:spPr>
-        <p:style>
-          <a:lnRef idx="2">
-            <a:schemeClr val="accent1">
-              <a:shade val="50000"/>
-            </a:schemeClr>
-          </a:lnRef>
-          <a:fillRef idx="1">
-            <a:schemeClr val="accent1"/>
-          </a:fillRef>
-          <a:effectRef idx="0">
-            <a:schemeClr val="accent1"/>
-          </a:effectRef>
-          <a:fontRef idx="minor">
-            <a:schemeClr val="lt1"/>
-          </a:fontRef>
-        </p:style>
-        <p:txBody>
-          <a:bodyPr rtlCol="0" anchor="ctr"/>
-          <a:lstStyle/>
-          <a:p>
-            <a:pPr algn="ctr"/>
-            <a:r>
-              <a:rPr lang="nl-BE" sz="1200" b="1" dirty="0" err="1">
-                <a:solidFill>
-                  <a:schemeClr val="tx1"/>
-                </a:solidFill>
-              </a:rPr>
-              <a:t>Admin</a:t>
-            </a:r>
-            <a:r>
-              <a:rPr lang="nl-BE" sz="1200" b="1" dirty="0">
-                <a:solidFill>
-                  <a:schemeClr val="tx1"/>
-                </a:solidFill>
-              </a:rPr>
-              <a:t> Website</a:t>
-            </a:r>
-          </a:p>
-          <a:p>
-            <a:pPr algn="ctr"/>
-            <a:endParaRPr lang="nl-BE" sz="1200" b="1" dirty="0">
-              <a:solidFill>
-                <a:schemeClr val="tx1"/>
-              </a:solidFill>
-            </a:endParaRPr>
-          </a:p>
-          <a:p>
-            <a:pPr algn="ctr"/>
-            <a:endParaRPr lang="en-US" sz="1200" b="1" dirty="0">
-              <a:solidFill>
-                <a:schemeClr val="tx1"/>
-              </a:solidFill>
-            </a:endParaRPr>
-          </a:p>
-        </p:txBody>
-      </p:sp>
-      <p:pic>
-        <p:nvPicPr>
-          <p:cNvPr id="98" name="Picture 4" descr="Résultat de recherche d'images pour &quot;angular svg&quot;">
-            <a:extLst>
-              <a:ext uri="{FF2B5EF4-FFF2-40B4-BE49-F238E27FC236}">
-                <a16:creationId xmlns:a16="http://schemas.microsoft.com/office/drawing/2014/main" id="{76923CFF-C5D8-4921-9063-833BF7E45195}"/>
-              </a:ext>
-            </a:extLst>
-          </p:cNvPr>
-          <p:cNvPicPr>
-            <a:picLocks noChangeAspect="1" noChangeArrowheads="1"/>
-          </p:cNvPicPr>
-          <p:nvPr/>
-        </p:nvPicPr>
-        <p:blipFill>
-          <a:blip r:embed="rId2" cstate="print">
-            <a:extLst>
-              <a:ext uri="{28A0092B-C50C-407E-A947-70E740481C1C}">
-                <a14:useLocalDpi xmlns:a14="http://schemas.microsoft.com/office/drawing/2010/main" val="0"/>
-              </a:ext>
-            </a:extLst>
-          </a:blip>
-          <a:srcRect/>
-          <a:stretch>
-            <a:fillRect/>
-          </a:stretch>
-        </p:blipFill>
-        <p:spPr bwMode="auto">
-          <a:xfrm>
-            <a:off x="4197977" y="325595"/>
-            <a:ext cx="968575" cy="610466"/>
-          </a:xfrm>
-          <a:prstGeom prst="rect">
-            <a:avLst/>
-          </a:prstGeom>
-          <a:noFill/>
-          <a:extLst>
-            <a:ext uri="{909E8E84-426E-40DD-AFC4-6F175D3DCCD1}">
-              <a14:hiddenFill xmlns:a14="http://schemas.microsoft.com/office/drawing/2010/main">
-                <a:solidFill>
-                  <a:srgbClr val="FFFFFF"/>
-                </a:solidFill>
-              </a14:hiddenFill>
-            </a:ext>
-          </a:extLst>
-        </p:spPr>
-      </p:pic>
-      <p:cxnSp>
-        <p:nvCxnSpPr>
-          <p:cNvPr id="99" name="Connecteur : en angle 98">
-            <a:extLst>
-              <a:ext uri="{FF2B5EF4-FFF2-40B4-BE49-F238E27FC236}">
-                <a16:creationId xmlns:a16="http://schemas.microsoft.com/office/drawing/2014/main" id="{554A22D6-ABEC-42AE-A109-05F1FEF3D16E}"/>
-              </a:ext>
-            </a:extLst>
-          </p:cNvPr>
-          <p:cNvCxnSpPr>
-            <a:cxnSpLocks/>
-            <a:stCxn id="130" idx="2"/>
-          </p:cNvCxnSpPr>
-          <p:nvPr/>
-        </p:nvCxnSpPr>
-        <p:spPr>
-          <a:xfrm rot="16200000" flipH="1">
-            <a:off x="3454468" y="702579"/>
-            <a:ext cx="405072" cy="2409675"/>
-          </a:xfrm>
-          <a:prstGeom prst="bentConnector2">
-            <a:avLst/>
-          </a:prstGeom>
-          <a:ln>
-            <a:solidFill>
-              <a:schemeClr val="tx1"/>
-            </a:solidFill>
-            <a:headEnd type="triangle"/>
-            <a:tailEnd type="triangle"/>
-          </a:ln>
-        </p:spPr>
-        <p:style>
-          <a:lnRef idx="1">
-            <a:schemeClr val="accent1"/>
-          </a:lnRef>
-          <a:fillRef idx="0">
-            <a:schemeClr val="accent1"/>
-          </a:fillRef>
-          <a:effectRef idx="0">
-            <a:schemeClr val="accent1"/>
-          </a:effectRef>
-          <a:fontRef idx="minor">
-            <a:schemeClr val="tx1"/>
-          </a:fontRef>
-        </p:style>
-      </p:cxnSp>
       <p:sp>
         <p:nvSpPr>
           <p:cNvPr id="102" name="ZoneTexte 101">
@@ -6030,7 +4947,7 @@
         </p:nvSpPr>
         <p:spPr>
           <a:xfrm>
-            <a:off x="3112177" y="1143839"/>
+            <a:off x="3143031" y="1159994"/>
             <a:ext cx="2965345" cy="246221"/>
           </a:xfrm>
           <a:prstGeom prst="rect">
@@ -6069,22 +4986,23 @@
       </p:sp>
       <p:cxnSp>
         <p:nvCxnSpPr>
-          <p:cNvPr id="112" name="Connecteur droit avec flèche 111">
+          <p:cNvPr id="19" name="Connecteur droit avec flèche 18">
             <a:extLst>
               <a:ext uri="{FF2B5EF4-FFF2-40B4-BE49-F238E27FC236}">
-                <a16:creationId xmlns:a16="http://schemas.microsoft.com/office/drawing/2014/main" id="{67B4097C-8BAF-45EF-91F7-9CFB227253FE}"/>
+                <a16:creationId xmlns:a16="http://schemas.microsoft.com/office/drawing/2014/main" id="{2E0315C5-3265-4C32-9721-9B5B2BA4A322}"/>
               </a:ext>
             </a:extLst>
           </p:cNvPr>
           <p:cNvCxnSpPr>
-            <a:cxnSpLocks/>
+            <a:stCxn id="5" idx="1"/>
+            <a:endCxn id="130" idx="3"/>
           </p:cNvCxnSpPr>
           <p:nvPr/>
         </p:nvCxnSpPr>
         <p:spPr>
-          <a:xfrm>
-            <a:off x="4676775" y="803533"/>
-            <a:ext cx="881065" cy="275294"/>
+          <a:xfrm flipH="1">
+            <a:off x="3111293" y="1447791"/>
+            <a:ext cx="1738559" cy="685"/>
           </a:xfrm>
           <a:prstGeom prst="straightConnector1">
             <a:avLst/>
@@ -6112,106 +5030,6 @@
           </a:fontRef>
         </p:style>
       </p:cxnSp>
-      <p:cxnSp>
-        <p:nvCxnSpPr>
-          <p:cNvPr id="116" name="Connecteur : en angle 115">
-            <a:extLst>
-              <a:ext uri="{FF2B5EF4-FFF2-40B4-BE49-F238E27FC236}">
-                <a16:creationId xmlns:a16="http://schemas.microsoft.com/office/drawing/2014/main" id="{49EB06DD-8AB5-4E57-8B77-4F6DCB532992}"/>
-              </a:ext>
-            </a:extLst>
-          </p:cNvPr>
-          <p:cNvCxnSpPr>
-            <a:cxnSpLocks/>
-            <a:stCxn id="97" idx="1"/>
-          </p:cNvCxnSpPr>
-          <p:nvPr/>
-        </p:nvCxnSpPr>
-        <p:spPr>
-          <a:xfrm rot="10800000" flipV="1">
-            <a:off x="2688649" y="531075"/>
-            <a:ext cx="1330099" cy="560851"/>
-          </a:xfrm>
-          <a:prstGeom prst="bentConnector3">
-            <a:avLst>
-              <a:gd name="adj1" fmla="val 99841"/>
-            </a:avLst>
-          </a:prstGeom>
-          <a:ln>
-            <a:solidFill>
-              <a:schemeClr val="tx1"/>
-            </a:solidFill>
-            <a:headEnd type="triangle"/>
-            <a:tailEnd type="triangle"/>
-          </a:ln>
-        </p:spPr>
-        <p:style>
-          <a:lnRef idx="1">
-            <a:schemeClr val="accent1"/>
-          </a:lnRef>
-          <a:fillRef idx="0">
-            <a:schemeClr val="accent1"/>
-          </a:fillRef>
-          <a:effectRef idx="0">
-            <a:schemeClr val="accent1"/>
-          </a:effectRef>
-          <a:fontRef idx="minor">
-            <a:schemeClr val="tx1"/>
-          </a:fontRef>
-        </p:style>
-      </p:cxnSp>
-      <p:sp>
-        <p:nvSpPr>
-          <p:cNvPr id="121" name="ZoneTexte 120">
-            <a:extLst>
-              <a:ext uri="{FF2B5EF4-FFF2-40B4-BE49-F238E27FC236}">
-                <a16:creationId xmlns:a16="http://schemas.microsoft.com/office/drawing/2014/main" id="{9A082B6A-4B68-44E7-97F8-6B180AE39C2B}"/>
-              </a:ext>
-            </a:extLst>
-          </p:cNvPr>
-          <p:cNvSpPr txBox="1"/>
-          <p:nvPr/>
-        </p:nvSpPr>
-        <p:spPr>
-          <a:xfrm>
-            <a:off x="2661350" y="550607"/>
-            <a:ext cx="1470512" cy="246221"/>
-          </a:xfrm>
-          <a:prstGeom prst="rect">
-            <a:avLst/>
-          </a:prstGeom>
-          <a:noFill/>
-        </p:spPr>
-        <p:txBody>
-          <a:bodyPr wrap="square" rtlCol="0">
-            <a:spAutoFit/>
-          </a:bodyPr>
-          <a:lstStyle/>
-          <a:p>
-            <a:r>
-              <a:rPr lang="fr-BE" sz="1000" dirty="0" err="1"/>
-              <a:t>Get</a:t>
-            </a:r>
-            <a:r>
-              <a:rPr lang="fr-BE" sz="1000" dirty="0"/>
-              <a:t> an </a:t>
-            </a:r>
-            <a:r>
-              <a:rPr lang="fr-BE" sz="1000" dirty="0" err="1"/>
-              <a:t>identity</a:t>
-            </a:r>
-            <a:r>
-              <a:rPr lang="fr-BE" sz="1000" dirty="0"/>
-              <a:t> </a:t>
-            </a:r>
-            <a:r>
-              <a:rPr lang="fr-BE" sz="1000" dirty="0" err="1"/>
-              <a:t>token</a:t>
-            </a:r>
-            <a:endParaRPr lang="fr-BE" sz="1000" dirty="0"/>
-          </a:p>
-        </p:txBody>
-      </p:sp>
     </p:spTree>
     <p:extLst>
       <p:ext uri="{BB962C8B-B14F-4D97-AF65-F5344CB8AC3E}">
@@ -7625,609 +6443,6 @@
       </p:cxnSp>
       <p:sp>
         <p:nvSpPr>
-          <p:cNvPr id="123" name="Rectangle 122">
-            <a:extLst>
-              <a:ext uri="{FF2B5EF4-FFF2-40B4-BE49-F238E27FC236}">
-                <a16:creationId xmlns:a16="http://schemas.microsoft.com/office/drawing/2014/main" id="{C15933D1-52A4-40E1-BBD2-A73FD4150D26}"/>
-              </a:ext>
-            </a:extLst>
-          </p:cNvPr>
-          <p:cNvSpPr/>
-          <p:nvPr/>
-        </p:nvSpPr>
-        <p:spPr>
-          <a:xfrm>
-            <a:off x="8499025" y="1971484"/>
-            <a:ext cx="1256210" cy="441663"/>
-          </a:xfrm>
-          <a:prstGeom prst="rect">
-            <a:avLst/>
-          </a:prstGeom>
-          <a:solidFill>
-            <a:schemeClr val="accent2"/>
-          </a:solidFill>
-          <a:ln>
-            <a:solidFill>
-              <a:schemeClr val="tx1"/>
-            </a:solidFill>
-          </a:ln>
-        </p:spPr>
-        <p:style>
-          <a:lnRef idx="2">
-            <a:schemeClr val="accent1">
-              <a:shade val="50000"/>
-            </a:schemeClr>
-          </a:lnRef>
-          <a:fillRef idx="1">
-            <a:schemeClr val="accent1"/>
-          </a:fillRef>
-          <a:effectRef idx="0">
-            <a:schemeClr val="accent1"/>
-          </a:effectRef>
-          <a:fontRef idx="minor">
-            <a:schemeClr val="lt1"/>
-          </a:fontRef>
-        </p:style>
-        <p:txBody>
-          <a:bodyPr rtlCol="0" anchor="ctr"/>
-          <a:lstStyle/>
-          <a:p>
-            <a:pPr algn="ctr"/>
-            <a:r>
-              <a:rPr lang="fr-BE" sz="1000" dirty="0">
-                <a:solidFill>
-                  <a:schemeClr val="tx1"/>
-                </a:solidFill>
-              </a:rPr>
-              <a:t>&lt;&lt;</a:t>
-            </a:r>
-            <a:r>
-              <a:rPr lang="fr-BE" sz="1000" dirty="0" err="1">
-                <a:solidFill>
-                  <a:schemeClr val="tx1"/>
-                </a:solidFill>
-              </a:rPr>
-              <a:t>aggregate</a:t>
-            </a:r>
-            <a:r>
-              <a:rPr lang="fr-BE" sz="1000" dirty="0">
-                <a:solidFill>
-                  <a:schemeClr val="tx1"/>
-                </a:solidFill>
-              </a:rPr>
-              <a:t> root&gt;&gt;</a:t>
-            </a:r>
-          </a:p>
-          <a:p>
-            <a:pPr algn="ctr"/>
-            <a:r>
-              <a:rPr lang="fr-BE" sz="1000" dirty="0" err="1">
-                <a:solidFill>
-                  <a:schemeClr val="tx1"/>
-                </a:solidFill>
-              </a:rPr>
-              <a:t>Form</a:t>
-            </a:r>
-            <a:r>
-              <a:rPr lang="fr-BE" sz="1000" dirty="0">
-                <a:solidFill>
-                  <a:schemeClr val="tx1"/>
-                </a:solidFill>
-              </a:rPr>
-              <a:t> instance</a:t>
-            </a:r>
-          </a:p>
-        </p:txBody>
-      </p:sp>
-      <p:cxnSp>
-        <p:nvCxnSpPr>
-          <p:cNvPr id="124" name="Connecteur droit avec flèche 123">
-            <a:extLst>
-              <a:ext uri="{FF2B5EF4-FFF2-40B4-BE49-F238E27FC236}">
-                <a16:creationId xmlns:a16="http://schemas.microsoft.com/office/drawing/2014/main" id="{B4C50575-3104-4619-8120-1FE5463CF9BA}"/>
-              </a:ext>
-            </a:extLst>
-          </p:cNvPr>
-          <p:cNvCxnSpPr>
-            <a:cxnSpLocks/>
-            <a:stCxn id="123" idx="2"/>
-            <a:endCxn id="94" idx="0"/>
-          </p:cNvCxnSpPr>
-          <p:nvPr/>
-        </p:nvCxnSpPr>
-        <p:spPr>
-          <a:xfrm flipH="1">
-            <a:off x="7203937" y="2413147"/>
-            <a:ext cx="1923193" cy="441663"/>
-          </a:xfrm>
-          <a:prstGeom prst="straightConnector1">
-            <a:avLst/>
-          </a:prstGeom>
-          <a:ln>
-            <a:solidFill>
-              <a:schemeClr val="tx1"/>
-            </a:solidFill>
-            <a:tailEnd type="triangle"/>
-          </a:ln>
-        </p:spPr>
-        <p:style>
-          <a:lnRef idx="1">
-            <a:schemeClr val="accent1"/>
-          </a:lnRef>
-          <a:fillRef idx="0">
-            <a:schemeClr val="accent1"/>
-          </a:fillRef>
-          <a:effectRef idx="0">
-            <a:schemeClr val="accent1"/>
-          </a:effectRef>
-          <a:fontRef idx="minor">
-            <a:schemeClr val="tx1"/>
-          </a:fontRef>
-        </p:style>
-      </p:cxnSp>
-      <p:sp>
-        <p:nvSpPr>
-          <p:cNvPr id="128" name="Rectangle 127">
-            <a:extLst>
-              <a:ext uri="{FF2B5EF4-FFF2-40B4-BE49-F238E27FC236}">
-                <a16:creationId xmlns:a16="http://schemas.microsoft.com/office/drawing/2014/main" id="{C73BC3F0-BEF0-4D19-A41A-F04AA955E50E}"/>
-              </a:ext>
-            </a:extLst>
-          </p:cNvPr>
-          <p:cNvSpPr/>
-          <p:nvPr/>
-        </p:nvSpPr>
-        <p:spPr>
-          <a:xfrm>
-            <a:off x="8503623" y="1267534"/>
-            <a:ext cx="1251612" cy="441663"/>
-          </a:xfrm>
-          <a:prstGeom prst="rect">
-            <a:avLst/>
-          </a:prstGeom>
-          <a:noFill/>
-          <a:ln>
-            <a:solidFill>
-              <a:schemeClr val="tx1"/>
-            </a:solidFill>
-          </a:ln>
-        </p:spPr>
-        <p:style>
-          <a:lnRef idx="2">
-            <a:schemeClr val="accent1">
-              <a:shade val="50000"/>
-            </a:schemeClr>
-          </a:lnRef>
-          <a:fillRef idx="1">
-            <a:schemeClr val="accent1"/>
-          </a:fillRef>
-          <a:effectRef idx="0">
-            <a:schemeClr val="accent1"/>
-          </a:effectRef>
-          <a:fontRef idx="minor">
-            <a:schemeClr val="lt1"/>
-          </a:fontRef>
-        </p:style>
-        <p:txBody>
-          <a:bodyPr rtlCol="0" anchor="ctr"/>
-          <a:lstStyle/>
-          <a:p>
-            <a:pPr algn="ctr"/>
-            <a:r>
-              <a:rPr lang="fr-BE" sz="1000" dirty="0">
-                <a:solidFill>
-                  <a:schemeClr val="tx1"/>
-                </a:solidFill>
-              </a:rPr>
-              <a:t>&lt;&lt;value </a:t>
-            </a:r>
-            <a:r>
-              <a:rPr lang="fr-BE" sz="1000" dirty="0" err="1">
-                <a:solidFill>
-                  <a:schemeClr val="tx1"/>
-                </a:solidFill>
-              </a:rPr>
-              <a:t>object</a:t>
-            </a:r>
-            <a:r>
-              <a:rPr lang="fr-BE" sz="1000" dirty="0">
-                <a:solidFill>
-                  <a:schemeClr val="tx1"/>
-                </a:solidFill>
-              </a:rPr>
-              <a:t>&gt;&gt;</a:t>
-            </a:r>
-          </a:p>
-          <a:p>
-            <a:pPr algn="ctr"/>
-            <a:r>
-              <a:rPr lang="fr-BE" sz="1000" dirty="0" err="1">
-                <a:solidFill>
-                  <a:schemeClr val="tx1"/>
-                </a:solidFill>
-              </a:rPr>
-              <a:t>Form</a:t>
-            </a:r>
-            <a:r>
-              <a:rPr lang="fr-BE" sz="1000" dirty="0">
-                <a:solidFill>
-                  <a:schemeClr val="tx1"/>
-                </a:solidFill>
-              </a:rPr>
-              <a:t> </a:t>
-            </a:r>
-            <a:r>
-              <a:rPr lang="fr-BE" sz="1000" dirty="0" err="1">
-                <a:solidFill>
-                  <a:schemeClr val="tx1"/>
-                </a:solidFill>
-              </a:rPr>
-              <a:t>element</a:t>
-            </a:r>
-            <a:r>
-              <a:rPr lang="fr-BE" sz="1000" dirty="0">
-                <a:solidFill>
-                  <a:schemeClr val="tx1"/>
-                </a:solidFill>
-              </a:rPr>
-              <a:t> </a:t>
-            </a:r>
-            <a:r>
-              <a:rPr lang="fr-BE" sz="1000" dirty="0" err="1">
-                <a:solidFill>
-                  <a:schemeClr val="tx1"/>
-                </a:solidFill>
-              </a:rPr>
-              <a:t>istance</a:t>
-            </a:r>
-            <a:endParaRPr lang="fr-BE" sz="1000" dirty="0">
-              <a:solidFill>
-                <a:schemeClr val="tx1"/>
-              </a:solidFill>
-            </a:endParaRPr>
-          </a:p>
-        </p:txBody>
-      </p:sp>
-      <p:cxnSp>
-        <p:nvCxnSpPr>
-          <p:cNvPr id="129" name="Connecteur droit avec flèche 128">
-            <a:extLst>
-              <a:ext uri="{FF2B5EF4-FFF2-40B4-BE49-F238E27FC236}">
-                <a16:creationId xmlns:a16="http://schemas.microsoft.com/office/drawing/2014/main" id="{D39360A1-13ED-4256-87E0-C098D3B143A0}"/>
-              </a:ext>
-            </a:extLst>
-          </p:cNvPr>
-          <p:cNvCxnSpPr>
-            <a:cxnSpLocks/>
-            <a:stCxn id="123" idx="0"/>
-            <a:endCxn id="128" idx="2"/>
-          </p:cNvCxnSpPr>
-          <p:nvPr/>
-        </p:nvCxnSpPr>
-        <p:spPr>
-          <a:xfrm flipV="1">
-            <a:off x="9127130" y="1709197"/>
-            <a:ext cx="2299" cy="262287"/>
-          </a:xfrm>
-          <a:prstGeom prst="straightConnector1">
-            <a:avLst/>
-          </a:prstGeom>
-          <a:ln>
-            <a:solidFill>
-              <a:schemeClr val="tx1"/>
-            </a:solidFill>
-            <a:tailEnd type="triangle"/>
-          </a:ln>
-        </p:spPr>
-        <p:style>
-          <a:lnRef idx="1">
-            <a:schemeClr val="accent1"/>
-          </a:lnRef>
-          <a:fillRef idx="0">
-            <a:schemeClr val="accent1"/>
-          </a:fillRef>
-          <a:effectRef idx="0">
-            <a:schemeClr val="accent1"/>
-          </a:effectRef>
-          <a:fontRef idx="minor">
-            <a:schemeClr val="tx1"/>
-          </a:fontRef>
-        </p:style>
-      </p:cxnSp>
-      <p:sp>
-        <p:nvSpPr>
-          <p:cNvPr id="136" name="Rectangle 135">
-            <a:extLst>
-              <a:ext uri="{FF2B5EF4-FFF2-40B4-BE49-F238E27FC236}">
-                <a16:creationId xmlns:a16="http://schemas.microsoft.com/office/drawing/2014/main" id="{C4FD8ED8-F453-4414-8C04-37460E82C325}"/>
-              </a:ext>
-            </a:extLst>
-          </p:cNvPr>
-          <p:cNvSpPr/>
-          <p:nvPr/>
-        </p:nvSpPr>
-        <p:spPr>
-          <a:xfrm>
-            <a:off x="10121667" y="1971484"/>
-            <a:ext cx="1256210" cy="441663"/>
-          </a:xfrm>
-          <a:prstGeom prst="rect">
-            <a:avLst/>
-          </a:prstGeom>
-          <a:solidFill>
-            <a:schemeClr val="accent2"/>
-          </a:solidFill>
-          <a:ln>
-            <a:solidFill>
-              <a:schemeClr val="tx1"/>
-            </a:solidFill>
-          </a:ln>
-        </p:spPr>
-        <p:style>
-          <a:lnRef idx="2">
-            <a:schemeClr val="accent1">
-              <a:shade val="50000"/>
-            </a:schemeClr>
-          </a:lnRef>
-          <a:fillRef idx="1">
-            <a:schemeClr val="accent1"/>
-          </a:fillRef>
-          <a:effectRef idx="0">
-            <a:schemeClr val="accent1"/>
-          </a:effectRef>
-          <a:fontRef idx="minor">
-            <a:schemeClr val="lt1"/>
-          </a:fontRef>
-        </p:style>
-        <p:txBody>
-          <a:bodyPr rtlCol="0" anchor="ctr"/>
-          <a:lstStyle/>
-          <a:p>
-            <a:pPr algn="ctr"/>
-            <a:r>
-              <a:rPr lang="fr-BE" sz="1000" dirty="0">
-                <a:solidFill>
-                  <a:schemeClr val="tx1"/>
-                </a:solidFill>
-              </a:rPr>
-              <a:t>&lt;&lt;</a:t>
-            </a:r>
-            <a:r>
-              <a:rPr lang="fr-BE" sz="1000" dirty="0" err="1">
-                <a:solidFill>
-                  <a:schemeClr val="tx1"/>
-                </a:solidFill>
-              </a:rPr>
-              <a:t>aggregate</a:t>
-            </a:r>
-            <a:r>
-              <a:rPr lang="fr-BE" sz="1000" dirty="0">
-                <a:solidFill>
-                  <a:schemeClr val="tx1"/>
-                </a:solidFill>
-              </a:rPr>
-              <a:t> root&gt;&gt;</a:t>
-            </a:r>
-          </a:p>
-          <a:p>
-            <a:pPr algn="ctr"/>
-            <a:r>
-              <a:rPr lang="fr-BE" sz="1000" dirty="0" err="1">
-                <a:solidFill>
-                  <a:schemeClr val="tx1"/>
-                </a:solidFill>
-              </a:rPr>
-              <a:t>Form</a:t>
-            </a:r>
-            <a:endParaRPr lang="fr-BE" sz="1000" dirty="0">
-              <a:solidFill>
-                <a:schemeClr val="tx1"/>
-              </a:solidFill>
-            </a:endParaRPr>
-          </a:p>
-        </p:txBody>
-      </p:sp>
-      <p:cxnSp>
-        <p:nvCxnSpPr>
-          <p:cNvPr id="137" name="Connecteur droit avec flèche 136">
-            <a:extLst>
-              <a:ext uri="{FF2B5EF4-FFF2-40B4-BE49-F238E27FC236}">
-                <a16:creationId xmlns:a16="http://schemas.microsoft.com/office/drawing/2014/main" id="{541BFB42-6690-4D73-951D-44E5A12D7E5D}"/>
-              </a:ext>
-            </a:extLst>
-          </p:cNvPr>
-          <p:cNvCxnSpPr>
-            <a:cxnSpLocks/>
-            <a:stCxn id="123" idx="3"/>
-            <a:endCxn id="136" idx="1"/>
-          </p:cNvCxnSpPr>
-          <p:nvPr/>
-        </p:nvCxnSpPr>
-        <p:spPr>
-          <a:xfrm>
-            <a:off x="9755235" y="2192316"/>
-            <a:ext cx="366432" cy="0"/>
-          </a:xfrm>
-          <a:prstGeom prst="straightConnector1">
-            <a:avLst/>
-          </a:prstGeom>
-          <a:ln>
-            <a:solidFill>
-              <a:schemeClr val="tx1"/>
-            </a:solidFill>
-            <a:tailEnd type="triangle"/>
-          </a:ln>
-        </p:spPr>
-        <p:style>
-          <a:lnRef idx="1">
-            <a:schemeClr val="accent1"/>
-          </a:lnRef>
-          <a:fillRef idx="0">
-            <a:schemeClr val="accent1"/>
-          </a:fillRef>
-          <a:effectRef idx="0">
-            <a:schemeClr val="accent1"/>
-          </a:effectRef>
-          <a:fontRef idx="minor">
-            <a:schemeClr val="tx1"/>
-          </a:fontRef>
-        </p:style>
-      </p:cxnSp>
-      <p:sp>
-        <p:nvSpPr>
-          <p:cNvPr id="140" name="Rectangle 139">
-            <a:extLst>
-              <a:ext uri="{FF2B5EF4-FFF2-40B4-BE49-F238E27FC236}">
-                <a16:creationId xmlns:a16="http://schemas.microsoft.com/office/drawing/2014/main" id="{255A8582-E597-4A81-8C71-4092EC94F879}"/>
-              </a:ext>
-            </a:extLst>
-          </p:cNvPr>
-          <p:cNvSpPr/>
-          <p:nvPr/>
-        </p:nvSpPr>
-        <p:spPr>
-          <a:xfrm>
-            <a:off x="10121667" y="1267534"/>
-            <a:ext cx="1251612" cy="441663"/>
-          </a:xfrm>
-          <a:prstGeom prst="rect">
-            <a:avLst/>
-          </a:prstGeom>
-          <a:noFill/>
-          <a:ln>
-            <a:solidFill>
-              <a:schemeClr val="tx1"/>
-            </a:solidFill>
-          </a:ln>
-        </p:spPr>
-        <p:style>
-          <a:lnRef idx="2">
-            <a:schemeClr val="accent1">
-              <a:shade val="50000"/>
-            </a:schemeClr>
-          </a:lnRef>
-          <a:fillRef idx="1">
-            <a:schemeClr val="accent1"/>
-          </a:fillRef>
-          <a:effectRef idx="0">
-            <a:schemeClr val="accent1"/>
-          </a:effectRef>
-          <a:fontRef idx="minor">
-            <a:schemeClr val="lt1"/>
-          </a:fontRef>
-        </p:style>
-        <p:txBody>
-          <a:bodyPr rtlCol="0" anchor="ctr"/>
-          <a:lstStyle/>
-          <a:p>
-            <a:pPr algn="ctr"/>
-            <a:r>
-              <a:rPr lang="fr-BE" sz="1000" dirty="0">
-                <a:solidFill>
-                  <a:schemeClr val="tx1"/>
-                </a:solidFill>
-              </a:rPr>
-              <a:t>&lt;&lt;value </a:t>
-            </a:r>
-            <a:r>
-              <a:rPr lang="fr-BE" sz="1000" dirty="0" err="1">
-                <a:solidFill>
-                  <a:schemeClr val="tx1"/>
-                </a:solidFill>
-              </a:rPr>
-              <a:t>object</a:t>
-            </a:r>
-            <a:r>
-              <a:rPr lang="fr-BE" sz="1000" dirty="0">
-                <a:solidFill>
-                  <a:schemeClr val="tx1"/>
-                </a:solidFill>
-              </a:rPr>
-              <a:t>&gt;&gt;</a:t>
-            </a:r>
-          </a:p>
-          <a:p>
-            <a:pPr algn="ctr"/>
-            <a:r>
-              <a:rPr lang="fr-BE" sz="1000" dirty="0" err="1">
-                <a:solidFill>
-                  <a:schemeClr val="tx1"/>
-                </a:solidFill>
-              </a:rPr>
-              <a:t>Form</a:t>
-            </a:r>
-            <a:r>
-              <a:rPr lang="fr-BE" sz="1000" dirty="0">
-                <a:solidFill>
-                  <a:schemeClr val="tx1"/>
-                </a:solidFill>
-              </a:rPr>
-              <a:t> </a:t>
-            </a:r>
-            <a:r>
-              <a:rPr lang="fr-BE" sz="1000" dirty="0" err="1">
-                <a:solidFill>
-                  <a:schemeClr val="tx1"/>
-                </a:solidFill>
-              </a:rPr>
-              <a:t>element</a:t>
-            </a:r>
-            <a:endParaRPr lang="fr-BE" sz="1000" dirty="0">
-              <a:solidFill>
-                <a:schemeClr val="tx1"/>
-              </a:solidFill>
-            </a:endParaRPr>
-          </a:p>
-        </p:txBody>
-      </p:sp>
-      <p:cxnSp>
-        <p:nvCxnSpPr>
-          <p:cNvPr id="141" name="Connecteur droit avec flèche 140">
-            <a:extLst>
-              <a:ext uri="{FF2B5EF4-FFF2-40B4-BE49-F238E27FC236}">
-                <a16:creationId xmlns:a16="http://schemas.microsoft.com/office/drawing/2014/main" id="{79A1C52C-18B0-4722-9B6D-E3789C0EF617}"/>
-              </a:ext>
-            </a:extLst>
-          </p:cNvPr>
-          <p:cNvCxnSpPr>
-            <a:cxnSpLocks/>
-            <a:stCxn id="136" idx="0"/>
-            <a:endCxn id="140" idx="2"/>
-          </p:cNvCxnSpPr>
-          <p:nvPr/>
-        </p:nvCxnSpPr>
-        <p:spPr>
-          <a:xfrm flipH="1" flipV="1">
-            <a:off x="10747473" y="1709197"/>
-            <a:ext cx="2299" cy="262287"/>
-          </a:xfrm>
-          <a:prstGeom prst="straightConnector1">
-            <a:avLst/>
-          </a:prstGeom>
-          <a:ln>
-            <a:solidFill>
-              <a:schemeClr val="tx1"/>
-            </a:solidFill>
-            <a:tailEnd type="triangle"/>
-          </a:ln>
-        </p:spPr>
-        <p:style>
-          <a:lnRef idx="1">
-            <a:schemeClr val="accent1"/>
-          </a:lnRef>
-          <a:fillRef idx="0">
-            <a:schemeClr val="accent1"/>
-          </a:fillRef>
-          <a:effectRef idx="0">
-            <a:schemeClr val="accent1"/>
-          </a:effectRef>
-          <a:fontRef idx="minor">
-            <a:schemeClr val="tx1"/>
-          </a:fontRef>
-        </p:style>
-      </p:cxnSp>
-      <p:sp>
-        <p:nvSpPr>
           <p:cNvPr id="144" name="Rectangle 143">
             <a:extLst>
               <a:ext uri="{FF2B5EF4-FFF2-40B4-BE49-F238E27FC236}">
@@ -8631,188 +6846,6 @@
             <a:r>
               <a:rPr lang="nl-BE" sz="1200" b="1" dirty="0" err="1"/>
               <a:t>instance</a:t>
-            </a:r>
-            <a:endParaRPr lang="en-US" sz="1200" b="1" dirty="0"/>
-          </a:p>
-        </p:txBody>
-      </p:sp>
-      <p:sp>
-        <p:nvSpPr>
-          <p:cNvPr id="158" name="Rectangle 157">
-            <a:extLst>
-              <a:ext uri="{FF2B5EF4-FFF2-40B4-BE49-F238E27FC236}">
-                <a16:creationId xmlns:a16="http://schemas.microsoft.com/office/drawing/2014/main" id="{B081CE17-0AAB-4701-AED2-BB375A7885EC}"/>
-              </a:ext>
-            </a:extLst>
-          </p:cNvPr>
-          <p:cNvSpPr/>
-          <p:nvPr/>
-        </p:nvSpPr>
-        <p:spPr>
-          <a:xfrm>
-            <a:off x="8236376" y="901700"/>
-            <a:ext cx="1754859" cy="1667641"/>
-          </a:xfrm>
-          <a:prstGeom prst="rect">
-            <a:avLst/>
-          </a:prstGeom>
-          <a:noFill/>
-          <a:ln>
-            <a:solidFill>
-              <a:schemeClr val="tx1"/>
-            </a:solidFill>
-            <a:prstDash val="dash"/>
-          </a:ln>
-        </p:spPr>
-        <p:style>
-          <a:lnRef idx="2">
-            <a:schemeClr val="accent1">
-              <a:shade val="50000"/>
-            </a:schemeClr>
-          </a:lnRef>
-          <a:fillRef idx="1">
-            <a:schemeClr val="accent1"/>
-          </a:fillRef>
-          <a:effectRef idx="0">
-            <a:schemeClr val="accent1"/>
-          </a:effectRef>
-          <a:fontRef idx="minor">
-            <a:schemeClr val="lt1"/>
-          </a:fontRef>
-        </p:style>
-        <p:txBody>
-          <a:bodyPr rtlCol="0" anchor="ctr"/>
-          <a:lstStyle/>
-          <a:p>
-            <a:pPr algn="ctr"/>
-            <a:endParaRPr lang="en-US"/>
-          </a:p>
-        </p:txBody>
-      </p:sp>
-      <p:sp>
-        <p:nvSpPr>
-          <p:cNvPr id="159" name="TextBox 40">
-            <a:extLst>
-              <a:ext uri="{FF2B5EF4-FFF2-40B4-BE49-F238E27FC236}">
-                <a16:creationId xmlns:a16="http://schemas.microsoft.com/office/drawing/2014/main" id="{C7707BDC-3BF1-4EA3-A1A8-487654737FEC}"/>
-              </a:ext>
-            </a:extLst>
-          </p:cNvPr>
-          <p:cNvSpPr txBox="1"/>
-          <p:nvPr/>
-        </p:nvSpPr>
-        <p:spPr>
-          <a:xfrm>
-            <a:off x="8225779" y="917622"/>
-            <a:ext cx="1083695" cy="276999"/>
-          </a:xfrm>
-          <a:prstGeom prst="rect">
-            <a:avLst/>
-          </a:prstGeom>
-          <a:noFill/>
-        </p:spPr>
-        <p:txBody>
-          <a:bodyPr wrap="none" rtlCol="0">
-            <a:spAutoFit/>
-          </a:bodyPr>
-          <a:lstStyle/>
-          <a:p>
-            <a:r>
-              <a:rPr lang="nl-BE" sz="1200" b="1" dirty="0"/>
-              <a:t>Form </a:t>
-            </a:r>
-            <a:r>
-              <a:rPr lang="nl-BE" sz="1200" b="1" dirty="0" err="1"/>
-              <a:t>instance</a:t>
-            </a:r>
-            <a:endParaRPr lang="en-US" sz="1200" b="1" dirty="0"/>
-          </a:p>
-        </p:txBody>
-      </p:sp>
-      <p:sp>
-        <p:nvSpPr>
-          <p:cNvPr id="160" name="Rectangle 159">
-            <a:extLst>
-              <a:ext uri="{FF2B5EF4-FFF2-40B4-BE49-F238E27FC236}">
-                <a16:creationId xmlns:a16="http://schemas.microsoft.com/office/drawing/2014/main" id="{CD5CD226-8AAD-4322-9175-4EF9821E0AE9}"/>
-              </a:ext>
-            </a:extLst>
-          </p:cNvPr>
-          <p:cNvSpPr/>
-          <p:nvPr/>
-        </p:nvSpPr>
-        <p:spPr>
-          <a:xfrm>
-            <a:off x="10017884" y="901700"/>
-            <a:ext cx="1754859" cy="1667641"/>
-          </a:xfrm>
-          <a:prstGeom prst="rect">
-            <a:avLst/>
-          </a:prstGeom>
-          <a:noFill/>
-          <a:ln>
-            <a:solidFill>
-              <a:schemeClr val="tx1"/>
-            </a:solidFill>
-            <a:prstDash val="dash"/>
-          </a:ln>
-        </p:spPr>
-        <p:style>
-          <a:lnRef idx="2">
-            <a:schemeClr val="accent1">
-              <a:shade val="50000"/>
-            </a:schemeClr>
-          </a:lnRef>
-          <a:fillRef idx="1">
-            <a:schemeClr val="accent1"/>
-          </a:fillRef>
-          <a:effectRef idx="0">
-            <a:schemeClr val="accent1"/>
-          </a:effectRef>
-          <a:fontRef idx="minor">
-            <a:schemeClr val="lt1"/>
-          </a:fontRef>
-        </p:style>
-        <p:txBody>
-          <a:bodyPr rtlCol="0" anchor="ctr"/>
-          <a:lstStyle/>
-          <a:p>
-            <a:pPr algn="ctr"/>
-            <a:endParaRPr lang="en-US"/>
-          </a:p>
-        </p:txBody>
-      </p:sp>
-      <p:sp>
-        <p:nvSpPr>
-          <p:cNvPr id="161" name="TextBox 40">
-            <a:extLst>
-              <a:ext uri="{FF2B5EF4-FFF2-40B4-BE49-F238E27FC236}">
-                <a16:creationId xmlns:a16="http://schemas.microsoft.com/office/drawing/2014/main" id="{ED23067F-D3ED-4C3A-859A-BE5377218B8C}"/>
-              </a:ext>
-            </a:extLst>
-          </p:cNvPr>
-          <p:cNvSpPr txBox="1"/>
-          <p:nvPr/>
-        </p:nvSpPr>
-        <p:spPr>
-          <a:xfrm>
-            <a:off x="10005488" y="880119"/>
-            <a:ext cx="516232" cy="276999"/>
-          </a:xfrm>
-          <a:prstGeom prst="rect">
-            <a:avLst/>
-          </a:prstGeom>
-          <a:noFill/>
-        </p:spPr>
-        <p:txBody>
-          <a:bodyPr wrap="none" rtlCol="0">
-            <a:spAutoFit/>
-          </a:bodyPr>
-          <a:lstStyle/>
-          <a:p>
-            <a:r>
-              <a:rPr lang="nl-BE" sz="1200" b="1" dirty="0"/>
-              <a:t>Form</a:t>
             </a:r>
             <a:endParaRPr lang="en-US" sz="1200" b="1" dirty="0"/>
           </a:p>

</xml_diff>